<commit_message>
Deploying to gh-pages from @ Minee-Liane-Choi/MineeChoiLab@907762a3d9cbef3f0dc8c084ea97121df3dc5ac4 🚀
</commit_message>
<xml_diff>
--- a/images/BRePAIR.pptx
+++ b/images/BRePAIR.pptx
@@ -3331,10 +3331,10 @@
       </p:grpSpPr>
       <p:grpSp>
         <p:nvGrpSpPr>
-          <p:cNvPr id="8" name="Group 7">
+          <p:cNvPr id="6" name="Group 5">
             <a:extLst>
               <a:ext uri="{FF2B5EF4-FFF2-40B4-BE49-F238E27FC236}">
-                <a16:creationId xmlns:a16="http://schemas.microsoft.com/office/drawing/2014/main" id="{CA49AB85-EFEB-4724-B98B-09387E6B5CE2}"/>
+                <a16:creationId xmlns:a16="http://schemas.microsoft.com/office/drawing/2014/main" id="{FAD73A32-A02B-4138-AA17-47A3C74E72C4}"/>
               </a:ext>
             </a:extLst>
           </p:cNvPr>
@@ -3343,242 +3343,200 @@
         </p:nvGrpSpPr>
         <p:grpSpPr>
           <a:xfrm>
-            <a:off x="800835" y="598351"/>
+            <a:off x="4448910" y="2336663"/>
             <a:ext cx="952560" cy="910756"/>
-            <a:chOff x="2923005" y="2949121"/>
+            <a:chOff x="800835" y="598351"/>
             <a:chExt cx="952560" cy="910756"/>
           </a:xfrm>
         </p:grpSpPr>
-        <p:grpSp>
-          <p:nvGrpSpPr>
-            <p:cNvPr id="3" name="Group 2">
+        <p:sp>
+          <p:nvSpPr>
+            <p:cNvPr id="13" name="Rectangle: Rounded Corners 12">
               <a:extLst>
                 <a:ext uri="{FF2B5EF4-FFF2-40B4-BE49-F238E27FC236}">
-                  <a16:creationId xmlns:a16="http://schemas.microsoft.com/office/drawing/2014/main" id="{2DC1A990-E3BC-47E7-BB8D-239067C13AE4}"/>
+                  <a16:creationId xmlns:a16="http://schemas.microsoft.com/office/drawing/2014/main" id="{FE014D9C-C0EE-4500-A18D-2907C88A6D4B}"/>
                 </a:ext>
               </a:extLst>
             </p:cNvPr>
-            <p:cNvGrpSpPr/>
+            <p:cNvSpPr>
+              <a:spLocks noChangeAspect="1"/>
+            </p:cNvSpPr>
             <p:nvPr/>
-          </p:nvGrpSpPr>
-          <p:grpSpPr>
+          </p:nvSpPr>
+          <p:spPr>
             <a:xfrm>
-              <a:off x="2923005" y="3001902"/>
+              <a:off x="800835" y="651132"/>
               <a:ext cx="411423" cy="411423"/>
-              <a:chOff x="2923005" y="3001902"/>
-              <a:chExt cx="411423" cy="411423"/>
             </a:xfrm>
-          </p:grpSpPr>
-          <p:sp>
-            <p:nvSpPr>
-              <p:cNvPr id="13" name="Rectangle: Rounded Corners 12">
-                <a:extLst>
-                  <a:ext uri="{FF2B5EF4-FFF2-40B4-BE49-F238E27FC236}">
-                    <a16:creationId xmlns:a16="http://schemas.microsoft.com/office/drawing/2014/main" id="{FE014D9C-C0EE-4500-A18D-2907C88A6D4B}"/>
-                  </a:ext>
-                </a:extLst>
-              </p:cNvPr>
-              <p:cNvSpPr>
-                <a:spLocks noChangeAspect="1"/>
-              </p:cNvSpPr>
-              <p:nvPr/>
-            </p:nvSpPr>
-            <p:spPr>
-              <a:xfrm>
-                <a:off x="2923005" y="3001902"/>
-                <a:ext cx="411423" cy="411423"/>
-              </a:xfrm>
-              <a:prstGeom prst="roundRect">
-                <a:avLst>
-                  <a:gd name="adj" fmla="val 11026"/>
-                </a:avLst>
-              </a:prstGeom>
-              <a:solidFill>
-                <a:srgbClr val="FF6600"/>
-              </a:solidFill>
-              <a:ln>
-                <a:noFill/>
-              </a:ln>
-            </p:spPr>
-            <p:style>
-              <a:lnRef idx="2">
-                <a:schemeClr val="accent1">
-                  <a:shade val="50000"/>
-                </a:schemeClr>
-              </a:lnRef>
-              <a:fillRef idx="1">
-                <a:schemeClr val="accent1"/>
-              </a:fillRef>
-              <a:effectRef idx="0">
-                <a:schemeClr val="accent1"/>
-              </a:effectRef>
-              <a:fontRef idx="minor">
-                <a:schemeClr val="lt1"/>
-              </a:fontRef>
-            </p:style>
-            <p:txBody>
-              <a:bodyPr rtlCol="0" anchor="ctr"/>
-              <a:lstStyle/>
-              <a:p>
-                <a:pPr algn="ctr"/>
-                <a:endParaRPr lang="en-US"/>
-              </a:p>
-            </p:txBody>
-          </p:sp>
-          <p:pic>
-            <p:nvPicPr>
-              <p:cNvPr id="14" name="Picture 13" descr="A picture containing night sky&#10;&#10;Description automatically generated">
-                <a:extLst>
-                  <a:ext uri="{FF2B5EF4-FFF2-40B4-BE49-F238E27FC236}">
-                    <a16:creationId xmlns:a16="http://schemas.microsoft.com/office/drawing/2014/main" id="{2A3B0C72-863A-4ED1-B70A-EDD430A27264}"/>
-                  </a:ext>
-                </a:extLst>
-              </p:cNvPr>
-              <p:cNvPicPr>
-                <a:picLocks noChangeAspect="1"/>
-              </p:cNvPicPr>
-              <p:nvPr/>
-            </p:nvPicPr>
-            <p:blipFill>
-              <a:blip r:embed="rId2">
-                <a:extLst>
-                  <a:ext uri="{28A0092B-C50C-407E-A947-70E740481C1C}">
-                    <a14:useLocalDpi xmlns:a14="http://schemas.microsoft.com/office/drawing/2010/main" val="0"/>
-                  </a:ext>
-                </a:extLst>
-              </a:blip>
-              <a:stretch>
-                <a:fillRect/>
-              </a:stretch>
-            </p:blipFill>
-            <p:spPr>
-              <a:xfrm>
-                <a:off x="2945226" y="3029670"/>
-                <a:ext cx="355374" cy="369220"/>
-              </a:xfrm>
-              <a:prstGeom prst="rect">
-                <a:avLst/>
-              </a:prstGeom>
+            <a:prstGeom prst="roundRect">
+              <a:avLst>
+                <a:gd name="adj" fmla="val 11026"/>
+              </a:avLst>
+            </a:prstGeom>
+            <a:solidFill>
+              <a:srgbClr val="FF3399"/>
+            </a:solidFill>
+            <a:ln>
               <a:noFill/>
-              <a:ln>
-                <a:noFill/>
-              </a:ln>
-            </p:spPr>
-          </p:pic>
-        </p:grpSp>
-        <p:grpSp>
-          <p:nvGrpSpPr>
-            <p:cNvPr id="4" name="Group 3">
+            </a:ln>
+          </p:spPr>
+          <p:style>
+            <a:lnRef idx="2">
+              <a:schemeClr val="accent1">
+                <a:shade val="50000"/>
+              </a:schemeClr>
+            </a:lnRef>
+            <a:fillRef idx="1">
+              <a:schemeClr val="accent1"/>
+            </a:fillRef>
+            <a:effectRef idx="0">
+              <a:schemeClr val="accent1"/>
+            </a:effectRef>
+            <a:fontRef idx="minor">
+              <a:schemeClr val="lt1"/>
+            </a:fontRef>
+          </p:style>
+          <p:txBody>
+            <a:bodyPr rtlCol="0" anchor="ctr"/>
+            <a:lstStyle/>
+            <a:p>
+              <a:pPr algn="ctr"/>
+              <a:endParaRPr lang="en-US"/>
+            </a:p>
+          </p:txBody>
+        </p:sp>
+        <p:pic>
+          <p:nvPicPr>
+            <p:cNvPr id="14" name="Picture 13" descr="A picture containing night sky&#10;&#10;Description automatically generated">
               <a:extLst>
                 <a:ext uri="{FF2B5EF4-FFF2-40B4-BE49-F238E27FC236}">
-                  <a16:creationId xmlns:a16="http://schemas.microsoft.com/office/drawing/2014/main" id="{E6F2E65D-D9F8-4939-94B8-8DC52D5FD807}"/>
+                  <a16:creationId xmlns:a16="http://schemas.microsoft.com/office/drawing/2014/main" id="{2A3B0C72-863A-4ED1-B70A-EDD430A27264}"/>
                 </a:ext>
               </a:extLst>
             </p:cNvPr>
-            <p:cNvGrpSpPr/>
+            <p:cNvPicPr>
+              <a:picLocks noChangeAspect="1"/>
+            </p:cNvPicPr>
             <p:nvPr/>
-          </p:nvGrpSpPr>
-          <p:grpSpPr>
+          </p:nvPicPr>
+          <p:blipFill>
+            <a:blip r:embed="rId2">
+              <a:extLst>
+                <a:ext uri="{28A0092B-C50C-407E-A947-70E740481C1C}">
+                  <a14:useLocalDpi xmlns:a14="http://schemas.microsoft.com/office/drawing/2010/main" val="0"/>
+                </a:ext>
+              </a:extLst>
+            </a:blip>
+            <a:stretch>
+              <a:fillRect/>
+            </a:stretch>
+          </p:blipFill>
+          <p:spPr>
             <a:xfrm>
-              <a:off x="2923005" y="3448454"/>
+              <a:off x="823056" y="678900"/>
+              <a:ext cx="355374" cy="369220"/>
+            </a:xfrm>
+            <a:prstGeom prst="rect">
+              <a:avLst/>
+            </a:prstGeom>
+            <a:noFill/>
+            <a:ln>
+              <a:noFill/>
+            </a:ln>
+          </p:spPr>
+        </p:pic>
+        <p:sp>
+          <p:nvSpPr>
+            <p:cNvPr id="16" name="Rectangle: Rounded Corners 15">
+              <a:extLst>
+                <a:ext uri="{FF2B5EF4-FFF2-40B4-BE49-F238E27FC236}">
+                  <a16:creationId xmlns:a16="http://schemas.microsoft.com/office/drawing/2014/main" id="{6B091E36-A1AA-4910-AF0C-6AC0089D6564}"/>
+                </a:ext>
+              </a:extLst>
+            </p:cNvPr>
+            <p:cNvSpPr>
+              <a:spLocks noChangeAspect="1"/>
+            </p:cNvSpPr>
+            <p:nvPr/>
+          </p:nvSpPr>
+          <p:spPr>
+            <a:xfrm>
+              <a:off x="800835" y="1097684"/>
               <a:ext cx="411423" cy="411423"/>
-              <a:chOff x="2923005" y="3453994"/>
-              <a:chExt cx="411423" cy="411423"/>
             </a:xfrm>
-          </p:grpSpPr>
-          <p:sp>
-            <p:nvSpPr>
-              <p:cNvPr id="16" name="Rectangle: Rounded Corners 15">
-                <a:extLst>
-                  <a:ext uri="{FF2B5EF4-FFF2-40B4-BE49-F238E27FC236}">
-                    <a16:creationId xmlns:a16="http://schemas.microsoft.com/office/drawing/2014/main" id="{6B091E36-A1AA-4910-AF0C-6AC0089D6564}"/>
-                  </a:ext>
-                </a:extLst>
-              </p:cNvPr>
-              <p:cNvSpPr>
-                <a:spLocks noChangeAspect="1"/>
-              </p:cNvSpPr>
-              <p:nvPr/>
-            </p:nvSpPr>
-            <p:spPr>
-              <a:xfrm>
-                <a:off x="2923005" y="3453994"/>
-                <a:ext cx="411423" cy="411423"/>
-              </a:xfrm>
-              <a:prstGeom prst="roundRect">
-                <a:avLst>
-                  <a:gd name="adj" fmla="val 11026"/>
-                </a:avLst>
-              </a:prstGeom>
-              <a:solidFill>
-                <a:srgbClr val="00B0F0"/>
-              </a:solidFill>
-              <a:ln>
-                <a:noFill/>
-              </a:ln>
-            </p:spPr>
-            <p:style>
-              <a:lnRef idx="2">
-                <a:schemeClr val="accent1">
-                  <a:shade val="50000"/>
-                </a:schemeClr>
-              </a:lnRef>
-              <a:fillRef idx="1">
-                <a:schemeClr val="accent1"/>
-              </a:fillRef>
-              <a:effectRef idx="0">
-                <a:schemeClr val="accent1"/>
-              </a:effectRef>
-              <a:fontRef idx="minor">
-                <a:schemeClr val="lt1"/>
-              </a:fontRef>
-            </p:style>
-            <p:txBody>
-              <a:bodyPr rtlCol="0" anchor="ctr"/>
-              <a:lstStyle/>
-              <a:p>
-                <a:pPr algn="ctr"/>
-                <a:endParaRPr lang="en-US"/>
-              </a:p>
-            </p:txBody>
-          </p:sp>
-          <p:pic>
-            <p:nvPicPr>
-              <p:cNvPr id="18" name="Picture 17" descr="A black rectangle with a black background&#10;&#10;Description automatically generated with low confidence">
-                <a:extLst>
-                  <a:ext uri="{FF2B5EF4-FFF2-40B4-BE49-F238E27FC236}">
-                    <a16:creationId xmlns:a16="http://schemas.microsoft.com/office/drawing/2014/main" id="{C9F906B9-EB39-4D5D-8459-341927611163}"/>
-                  </a:ext>
-                </a:extLst>
-              </p:cNvPr>
-              <p:cNvPicPr>
-                <a:picLocks noChangeAspect="1"/>
-              </p:cNvPicPr>
-              <p:nvPr/>
-            </p:nvPicPr>
-            <p:blipFill>
-              <a:blip r:embed="rId3">
-                <a:extLst>
-                  <a:ext uri="{28A0092B-C50C-407E-A947-70E740481C1C}">
-                    <a14:useLocalDpi xmlns:a14="http://schemas.microsoft.com/office/drawing/2010/main" val="0"/>
-                  </a:ext>
-                </a:extLst>
-              </a:blip>
-              <a:stretch>
-                <a:fillRect/>
-              </a:stretch>
-            </p:blipFill>
-            <p:spPr>
-              <a:xfrm>
-                <a:off x="2941952" y="3467031"/>
-                <a:ext cx="377595" cy="378343"/>
-              </a:xfrm>
-              <a:prstGeom prst="rect">
-                <a:avLst/>
-              </a:prstGeom>
-            </p:spPr>
-          </p:pic>
-        </p:grpSp>
+            <a:prstGeom prst="roundRect">
+              <a:avLst>
+                <a:gd name="adj" fmla="val 11026"/>
+              </a:avLst>
+            </a:prstGeom>
+            <a:solidFill>
+              <a:srgbClr val="3399FF"/>
+            </a:solidFill>
+            <a:ln>
+              <a:noFill/>
+            </a:ln>
+          </p:spPr>
+          <p:style>
+            <a:lnRef idx="2">
+              <a:schemeClr val="accent1">
+                <a:shade val="50000"/>
+              </a:schemeClr>
+            </a:lnRef>
+            <a:fillRef idx="1">
+              <a:schemeClr val="accent1"/>
+            </a:fillRef>
+            <a:effectRef idx="0">
+              <a:schemeClr val="accent1"/>
+            </a:effectRef>
+            <a:fontRef idx="minor">
+              <a:schemeClr val="lt1"/>
+            </a:fontRef>
+          </p:style>
+          <p:txBody>
+            <a:bodyPr rtlCol="0" anchor="ctr"/>
+            <a:lstStyle/>
+            <a:p>
+              <a:pPr algn="ctr"/>
+              <a:endParaRPr lang="en-US"/>
+            </a:p>
+          </p:txBody>
+        </p:sp>
+        <p:pic>
+          <p:nvPicPr>
+            <p:cNvPr id="18" name="Picture 17" descr="A black rectangle with a black background&#10;&#10;Description automatically generated with low confidence">
+              <a:extLst>
+                <a:ext uri="{FF2B5EF4-FFF2-40B4-BE49-F238E27FC236}">
+                  <a16:creationId xmlns:a16="http://schemas.microsoft.com/office/drawing/2014/main" id="{C9F906B9-EB39-4D5D-8459-341927611163}"/>
+                </a:ext>
+              </a:extLst>
+            </p:cNvPr>
+            <p:cNvPicPr>
+              <a:picLocks noChangeAspect="1"/>
+            </p:cNvPicPr>
+            <p:nvPr/>
+          </p:nvPicPr>
+          <p:blipFill>
+            <a:blip r:embed="rId3">
+              <a:extLst>
+                <a:ext uri="{28A0092B-C50C-407E-A947-70E740481C1C}">
+                  <a14:useLocalDpi xmlns:a14="http://schemas.microsoft.com/office/drawing/2010/main" val="0"/>
+                </a:ext>
+              </a:extLst>
+            </a:blip>
+            <a:stretch>
+              <a:fillRect/>
+            </a:stretch>
+          </p:blipFill>
+          <p:spPr>
+            <a:xfrm>
+              <a:off x="819782" y="1110721"/>
+              <a:ext cx="377595" cy="378343"/>
+            </a:xfrm>
+            <a:prstGeom prst="rect">
+              <a:avLst/>
+            </a:prstGeom>
+          </p:spPr>
+        </p:pic>
         <p:grpSp>
           <p:nvGrpSpPr>
             <p:cNvPr id="5" name="Group 4">
@@ -3593,7 +3551,7 @@
           </p:nvGrpSpPr>
           <p:grpSpPr>
             <a:xfrm>
-              <a:off x="3366544" y="3448454"/>
+              <a:off x="1244374" y="1097684"/>
               <a:ext cx="423768" cy="411423"/>
               <a:chOff x="3372084" y="3453994"/>
               <a:chExt cx="423768" cy="411423"/>
@@ -3706,7 +3664,7 @@
           </p:nvGrpSpPr>
           <p:grpSpPr>
             <a:xfrm rot="1720764">
-              <a:off x="3464142" y="2949121"/>
+              <a:off x="1341972" y="598351"/>
               <a:ext cx="411423" cy="411423"/>
               <a:chOff x="3378258" y="3001902"/>
               <a:chExt cx="411423" cy="411423"/>
@@ -3820,7 +3778,7 @@
         </p:nvGrpSpPr>
         <p:grpSpPr>
           <a:xfrm>
-            <a:off x="2551942" y="437309"/>
+            <a:off x="6349242" y="1527921"/>
             <a:ext cx="1898179" cy="1961232"/>
             <a:chOff x="3525873" y="613521"/>
             <a:chExt cx="1898179" cy="1961232"/>
@@ -3891,7 +3849,7 @@
                   </a:avLst>
                 </a:prstGeom>
                 <a:solidFill>
-                  <a:srgbClr val="FF6600"/>
+                  <a:srgbClr val="FF3399"/>
                 </a:solidFill>
                 <a:ln>
                   <a:noFill/>
@@ -4008,7 +3966,7 @@
                   </a:avLst>
                 </a:prstGeom>
                 <a:solidFill>
-                  <a:srgbClr val="00B0F0"/>
+                  <a:srgbClr val="3399FF"/>
                 </a:solidFill>
                 <a:ln>
                   <a:noFill/>
@@ -4396,7 +4354,7 @@
                 <a:avLst/>
               </a:prstGeom>
               <a:solidFill>
-                <a:srgbClr val="0066FF"/>
+                <a:srgbClr val="0070C0"/>
               </a:solidFill>
               <a:ln>
                 <a:noFill/>
@@ -4509,7 +4467,7 @@
                 <a:r>
                   <a:rPr lang="en-US" sz="1600" b="1" i="1" dirty="0" err="1">
                     <a:solidFill>
-                      <a:srgbClr val="0066FF"/>
+                      <a:srgbClr val="3399FF"/>
                     </a:solidFill>
                     <a:latin typeface="Verdana" panose="020B0604030504040204" pitchFamily="34" charset="0"/>
                   </a:rPr>
@@ -4518,7 +4476,7 @@
                 <a:r>
                   <a:rPr lang="en-US" sz="1600" b="1" dirty="0" err="1">
                     <a:solidFill>
-                      <a:srgbClr val="0066FF"/>
+                      <a:srgbClr val="3399FF"/>
                     </a:solidFill>
                     <a:latin typeface="Verdana" panose="020B0604030504040204" pitchFamily="34" charset="0"/>
                   </a:rPr>
@@ -4529,6 +4487,9 @@
                     <a:solidFill>
                       <a:schemeClr val="bg1"/>
                     </a:solidFill>
+                    <a:highlight>
+                      <a:srgbClr val="3399FF"/>
+                    </a:highlight>
                     <a:latin typeface="Verdana" panose="020B0604030504040204" pitchFamily="34" charset="0"/>
                   </a:rPr>
                   <a:t>A</a:t>
@@ -4538,6 +4499,9 @@
                     <a:solidFill>
                       <a:schemeClr val="bg1"/>
                     </a:solidFill>
+                    <a:highlight>
+                      <a:srgbClr val="3399FF"/>
+                    </a:highlight>
                     <a:latin typeface="Verdana" panose="020B0604030504040204" pitchFamily="34" charset="0"/>
                   </a:rPr>
                   <a:t>I</a:t>
@@ -4545,7 +4509,7 @@
                 <a:r>
                   <a:rPr lang="en-US" sz="1600" b="1" dirty="0" err="1">
                     <a:solidFill>
-                      <a:srgbClr val="0066FF"/>
+                      <a:srgbClr val="3399FF"/>
                     </a:solidFill>
                     <a:latin typeface="Verdana" panose="020B0604030504040204" pitchFamily="34" charset="0"/>
                   </a:rPr>
@@ -4553,13 +4517,2720 @@
                 </a:r>
                 <a:endParaRPr lang="en-US" sz="1600" dirty="0">
                   <a:solidFill>
-                    <a:srgbClr val="0066FF"/>
+                    <a:srgbClr val="3399FF"/>
                   </a:solidFill>
                 </a:endParaRPr>
               </a:p>
             </p:txBody>
           </p:sp>
         </p:grpSp>
+      </p:grpSp>
+      <p:grpSp>
+        <p:nvGrpSpPr>
+          <p:cNvPr id="97" name="Group 96">
+            <a:extLst>
+              <a:ext uri="{FF2B5EF4-FFF2-40B4-BE49-F238E27FC236}">
+                <a16:creationId xmlns:a16="http://schemas.microsoft.com/office/drawing/2014/main" id="{483246DE-3134-4B12-AA2F-2863C741A1AC}"/>
+              </a:ext>
+            </a:extLst>
+          </p:cNvPr>
+          <p:cNvGrpSpPr/>
+          <p:nvPr/>
+        </p:nvGrpSpPr>
+        <p:grpSpPr>
+          <a:xfrm>
+            <a:off x="4463648" y="3592719"/>
+            <a:ext cx="959545" cy="916943"/>
+            <a:chOff x="4463648" y="3592719"/>
+            <a:chExt cx="959545" cy="916943"/>
+          </a:xfrm>
+        </p:grpSpPr>
+        <p:grpSp>
+          <p:nvGrpSpPr>
+            <p:cNvPr id="93" name="Group 92">
+              <a:extLst>
+                <a:ext uri="{FF2B5EF4-FFF2-40B4-BE49-F238E27FC236}">
+                  <a16:creationId xmlns:a16="http://schemas.microsoft.com/office/drawing/2014/main" id="{B5132635-FBDE-4EAA-BD10-B14F64D2C540}"/>
+                </a:ext>
+              </a:extLst>
+            </p:cNvPr>
+            <p:cNvGrpSpPr/>
+            <p:nvPr/>
+          </p:nvGrpSpPr>
+          <p:grpSpPr>
+            <a:xfrm rot="1863789">
+              <a:off x="5011770" y="3592719"/>
+              <a:ext cx="411423" cy="506673"/>
+              <a:chOff x="5004965" y="3565991"/>
+              <a:chExt cx="411423" cy="506673"/>
+            </a:xfrm>
+          </p:grpSpPr>
+          <p:sp>
+            <p:nvSpPr>
+              <p:cNvPr id="87" name="Freeform: Shape 86">
+                <a:extLst>
+                  <a:ext uri="{FF2B5EF4-FFF2-40B4-BE49-F238E27FC236}">
+                    <a16:creationId xmlns:a16="http://schemas.microsoft.com/office/drawing/2014/main" id="{967B953C-1242-46AD-8EF9-96E2ABF72490}"/>
+                  </a:ext>
+                </a:extLst>
+              </p:cNvPr>
+              <p:cNvSpPr>
+                <a:spLocks noChangeAspect="1"/>
+              </p:cNvSpPr>
+              <p:nvPr/>
+            </p:nvSpPr>
+            <p:spPr>
+              <a:xfrm rot="16200000">
+                <a:off x="4957340" y="3613616"/>
+                <a:ext cx="506673" cy="411423"/>
+              </a:xfrm>
+              <a:custGeom>
+                <a:avLst/>
+                <a:gdLst>
+                  <a:gd name="connsiteX0" fmla="*/ 506673 w 506673"/>
+                  <a:gd name="connsiteY0" fmla="*/ 45363 h 411423"/>
+                  <a:gd name="connsiteX1" fmla="*/ 506673 w 506673"/>
+                  <a:gd name="connsiteY1" fmla="*/ 366060 h 411423"/>
+                  <a:gd name="connsiteX2" fmla="*/ 461310 w 506673"/>
+                  <a:gd name="connsiteY2" fmla="*/ 411423 h 411423"/>
+                  <a:gd name="connsiteX3" fmla="*/ 140613 w 506673"/>
+                  <a:gd name="connsiteY3" fmla="*/ 411423 h 411423"/>
+                  <a:gd name="connsiteX4" fmla="*/ 95250 w 506673"/>
+                  <a:gd name="connsiteY4" fmla="*/ 366060 h 411423"/>
+                  <a:gd name="connsiteX5" fmla="*/ 95250 w 506673"/>
+                  <a:gd name="connsiteY5" fmla="*/ 310247 h 411423"/>
+                  <a:gd name="connsiteX6" fmla="*/ 83571 w 506673"/>
+                  <a:gd name="connsiteY6" fmla="*/ 318121 h 411423"/>
+                  <a:gd name="connsiteX7" fmla="*/ 60156 w 506673"/>
+                  <a:gd name="connsiteY7" fmla="*/ 322848 h 411423"/>
+                  <a:gd name="connsiteX8" fmla="*/ 0 w 506673"/>
+                  <a:gd name="connsiteY8" fmla="*/ 262692 h 411423"/>
+                  <a:gd name="connsiteX9" fmla="*/ 60156 w 506673"/>
+                  <a:gd name="connsiteY9" fmla="*/ 202536 h 411423"/>
+                  <a:gd name="connsiteX10" fmla="*/ 83571 w 506673"/>
+                  <a:gd name="connsiteY10" fmla="*/ 207264 h 411423"/>
+                  <a:gd name="connsiteX11" fmla="*/ 95250 w 506673"/>
+                  <a:gd name="connsiteY11" fmla="*/ 215138 h 411423"/>
+                  <a:gd name="connsiteX12" fmla="*/ 95250 w 506673"/>
+                  <a:gd name="connsiteY12" fmla="*/ 45363 h 411423"/>
+                  <a:gd name="connsiteX13" fmla="*/ 140613 w 506673"/>
+                  <a:gd name="connsiteY13" fmla="*/ 0 h 411423"/>
+                  <a:gd name="connsiteX14" fmla="*/ 277493 w 506673"/>
+                  <a:gd name="connsiteY14" fmla="*/ 0 h 411423"/>
+                  <a:gd name="connsiteX15" fmla="*/ 274379 w 506673"/>
+                  <a:gd name="connsiteY15" fmla="*/ 15425 h 411423"/>
+                  <a:gd name="connsiteX16" fmla="*/ 359440 w 506673"/>
+                  <a:gd name="connsiteY16" fmla="*/ 100486 h 411423"/>
+                  <a:gd name="connsiteX17" fmla="*/ 444501 w 506673"/>
+                  <a:gd name="connsiteY17" fmla="*/ 15425 h 411423"/>
+                  <a:gd name="connsiteX18" fmla="*/ 441387 w 506673"/>
+                  <a:gd name="connsiteY18" fmla="*/ 0 h 411423"/>
+                  <a:gd name="connsiteX19" fmla="*/ 461310 w 506673"/>
+                  <a:gd name="connsiteY19" fmla="*/ 0 h 411423"/>
+                  <a:gd name="connsiteX20" fmla="*/ 506673 w 506673"/>
+                  <a:gd name="connsiteY20" fmla="*/ 45363 h 411423"/>
+                </a:gdLst>
+                <a:ahLst/>
+                <a:cxnLst>
+                  <a:cxn ang="0">
+                    <a:pos x="connsiteX0" y="connsiteY0"/>
+                  </a:cxn>
+                  <a:cxn ang="0">
+                    <a:pos x="connsiteX1" y="connsiteY1"/>
+                  </a:cxn>
+                  <a:cxn ang="0">
+                    <a:pos x="connsiteX2" y="connsiteY2"/>
+                  </a:cxn>
+                  <a:cxn ang="0">
+                    <a:pos x="connsiteX3" y="connsiteY3"/>
+                  </a:cxn>
+                  <a:cxn ang="0">
+                    <a:pos x="connsiteX4" y="connsiteY4"/>
+                  </a:cxn>
+                  <a:cxn ang="0">
+                    <a:pos x="connsiteX5" y="connsiteY5"/>
+                  </a:cxn>
+                  <a:cxn ang="0">
+                    <a:pos x="connsiteX6" y="connsiteY6"/>
+                  </a:cxn>
+                  <a:cxn ang="0">
+                    <a:pos x="connsiteX7" y="connsiteY7"/>
+                  </a:cxn>
+                  <a:cxn ang="0">
+                    <a:pos x="connsiteX8" y="connsiteY8"/>
+                  </a:cxn>
+                  <a:cxn ang="0">
+                    <a:pos x="connsiteX9" y="connsiteY9"/>
+                  </a:cxn>
+                  <a:cxn ang="0">
+                    <a:pos x="connsiteX10" y="connsiteY10"/>
+                  </a:cxn>
+                  <a:cxn ang="0">
+                    <a:pos x="connsiteX11" y="connsiteY11"/>
+                  </a:cxn>
+                  <a:cxn ang="0">
+                    <a:pos x="connsiteX12" y="connsiteY12"/>
+                  </a:cxn>
+                  <a:cxn ang="0">
+                    <a:pos x="connsiteX13" y="connsiteY13"/>
+                  </a:cxn>
+                  <a:cxn ang="0">
+                    <a:pos x="connsiteX14" y="connsiteY14"/>
+                  </a:cxn>
+                  <a:cxn ang="0">
+                    <a:pos x="connsiteX15" y="connsiteY15"/>
+                  </a:cxn>
+                  <a:cxn ang="0">
+                    <a:pos x="connsiteX16" y="connsiteY16"/>
+                  </a:cxn>
+                  <a:cxn ang="0">
+                    <a:pos x="connsiteX17" y="connsiteY17"/>
+                  </a:cxn>
+                  <a:cxn ang="0">
+                    <a:pos x="connsiteX18" y="connsiteY18"/>
+                  </a:cxn>
+                  <a:cxn ang="0">
+                    <a:pos x="connsiteX19" y="connsiteY19"/>
+                  </a:cxn>
+                  <a:cxn ang="0">
+                    <a:pos x="connsiteX20" y="connsiteY20"/>
+                  </a:cxn>
+                </a:cxnLst>
+                <a:rect l="l" t="t" r="r" b="b"/>
+                <a:pathLst>
+                  <a:path w="506673" h="411423">
+                    <a:moveTo>
+                      <a:pt x="506673" y="45363"/>
+                    </a:moveTo>
+                    <a:lnTo>
+                      <a:pt x="506673" y="366060"/>
+                    </a:lnTo>
+                    <a:cubicBezTo>
+                      <a:pt x="506673" y="391113"/>
+                      <a:pt x="486363" y="411423"/>
+                      <a:pt x="461310" y="411423"/>
+                    </a:cubicBezTo>
+                    <a:lnTo>
+                      <a:pt x="140613" y="411423"/>
+                    </a:lnTo>
+                    <a:cubicBezTo>
+                      <a:pt x="115560" y="411423"/>
+                      <a:pt x="95250" y="391113"/>
+                      <a:pt x="95250" y="366060"/>
+                    </a:cubicBezTo>
+                    <a:lnTo>
+                      <a:pt x="95250" y="310247"/>
+                    </a:lnTo>
+                    <a:lnTo>
+                      <a:pt x="83571" y="318121"/>
+                    </a:lnTo>
+                    <a:cubicBezTo>
+                      <a:pt x="76374" y="321165"/>
+                      <a:pt x="68462" y="322848"/>
+                      <a:pt x="60156" y="322848"/>
+                    </a:cubicBezTo>
+                    <a:cubicBezTo>
+                      <a:pt x="26933" y="322848"/>
+                      <a:pt x="0" y="295915"/>
+                      <a:pt x="0" y="262692"/>
+                    </a:cubicBezTo>
+                    <a:cubicBezTo>
+                      <a:pt x="0" y="229469"/>
+                      <a:pt x="26933" y="202536"/>
+                      <a:pt x="60156" y="202536"/>
+                    </a:cubicBezTo>
+                    <a:cubicBezTo>
+                      <a:pt x="68462" y="202536"/>
+                      <a:pt x="76374" y="204220"/>
+                      <a:pt x="83571" y="207264"/>
+                    </a:cubicBezTo>
+                    <a:lnTo>
+                      <a:pt x="95250" y="215138"/>
+                    </a:lnTo>
+                    <a:lnTo>
+                      <a:pt x="95250" y="45363"/>
+                    </a:lnTo>
+                    <a:cubicBezTo>
+                      <a:pt x="95250" y="20310"/>
+                      <a:pt x="115560" y="0"/>
+                      <a:pt x="140613" y="0"/>
+                    </a:cubicBezTo>
+                    <a:lnTo>
+                      <a:pt x="277493" y="0"/>
+                    </a:lnTo>
+                    <a:lnTo>
+                      <a:pt x="274379" y="15425"/>
+                    </a:lnTo>
+                    <a:cubicBezTo>
+                      <a:pt x="274379" y="62403"/>
+                      <a:pt x="312462" y="100486"/>
+                      <a:pt x="359440" y="100486"/>
+                    </a:cubicBezTo>
+                    <a:cubicBezTo>
+                      <a:pt x="406418" y="100486"/>
+                      <a:pt x="444501" y="62403"/>
+                      <a:pt x="444501" y="15425"/>
+                    </a:cubicBezTo>
+                    <a:lnTo>
+                      <a:pt x="441387" y="0"/>
+                    </a:lnTo>
+                    <a:lnTo>
+                      <a:pt x="461310" y="0"/>
+                    </a:lnTo>
+                    <a:cubicBezTo>
+                      <a:pt x="486363" y="0"/>
+                      <a:pt x="506673" y="20310"/>
+                      <a:pt x="506673" y="45363"/>
+                    </a:cubicBezTo>
+                    <a:close/>
+                  </a:path>
+                </a:pathLst>
+              </a:custGeom>
+              <a:solidFill>
+                <a:srgbClr val="92D050"/>
+              </a:solidFill>
+              <a:ln>
+                <a:noFill/>
+              </a:ln>
+            </p:spPr>
+            <p:style>
+              <a:lnRef idx="2">
+                <a:schemeClr val="accent1">
+                  <a:shade val="50000"/>
+                </a:schemeClr>
+              </a:lnRef>
+              <a:fillRef idx="1">
+                <a:schemeClr val="accent1"/>
+              </a:fillRef>
+              <a:effectRef idx="0">
+                <a:schemeClr val="accent1"/>
+              </a:effectRef>
+              <a:fontRef idx="minor">
+                <a:schemeClr val="lt1"/>
+              </a:fontRef>
+            </p:style>
+            <p:txBody>
+              <a:bodyPr wrap="square" rtlCol="0" anchor="ctr">
+                <a:noAutofit/>
+              </a:bodyPr>
+              <a:lstStyle/>
+              <a:p>
+                <a:pPr algn="ctr"/>
+                <a:endParaRPr lang="en-US"/>
+              </a:p>
+            </p:txBody>
+          </p:sp>
+          <p:pic>
+            <p:nvPicPr>
+              <p:cNvPr id="88" name="Picture 87" descr="Shape&#10;&#10;Description automatically generated with medium confidence">
+                <a:extLst>
+                  <a:ext uri="{FF2B5EF4-FFF2-40B4-BE49-F238E27FC236}">
+                    <a16:creationId xmlns:a16="http://schemas.microsoft.com/office/drawing/2014/main" id="{5DEF2295-03D8-41D0-A1E8-F23A4F8ABD35}"/>
+                  </a:ext>
+                </a:extLst>
+              </p:cNvPr>
+              <p:cNvPicPr>
+                <a:picLocks noChangeAspect="1"/>
+              </p:cNvPicPr>
+              <p:nvPr/>
+            </p:nvPicPr>
+            <p:blipFill>
+              <a:blip r:embed="rId5">
+                <a:extLst>
+                  <a:ext uri="{28A0092B-C50C-407E-A947-70E740481C1C}">
+                    <a14:useLocalDpi xmlns:a14="http://schemas.microsoft.com/office/drawing/2010/main" val="0"/>
+                  </a:ext>
+                </a:extLst>
+              </a:blip>
+              <a:stretch>
+                <a:fillRect/>
+              </a:stretch>
+            </p:blipFill>
+            <p:spPr>
+              <a:xfrm rot="21582343">
+                <a:off x="5111803" y="3625465"/>
+                <a:ext cx="290443" cy="253233"/>
+              </a:xfrm>
+              <a:prstGeom prst="rect">
+                <a:avLst/>
+              </a:prstGeom>
+            </p:spPr>
+          </p:pic>
+        </p:grpSp>
+        <p:grpSp>
+          <p:nvGrpSpPr>
+            <p:cNvPr id="96" name="Group 95">
+              <a:extLst>
+                <a:ext uri="{FF2B5EF4-FFF2-40B4-BE49-F238E27FC236}">
+                  <a16:creationId xmlns:a16="http://schemas.microsoft.com/office/drawing/2014/main" id="{555D9AB7-0E18-4322-BE3E-39E9B1DDBFB1}"/>
+                </a:ext>
+              </a:extLst>
+            </p:cNvPr>
+            <p:cNvGrpSpPr/>
+            <p:nvPr/>
+          </p:nvGrpSpPr>
+          <p:grpSpPr>
+            <a:xfrm>
+              <a:off x="4803373" y="4098239"/>
+              <a:ext cx="506673" cy="411423"/>
+              <a:chOff x="4803373" y="4098239"/>
+              <a:chExt cx="506673" cy="411423"/>
+            </a:xfrm>
+          </p:grpSpPr>
+          <p:sp>
+            <p:nvSpPr>
+              <p:cNvPr id="84" name="Freeform: Shape 83">
+                <a:extLst>
+                  <a:ext uri="{FF2B5EF4-FFF2-40B4-BE49-F238E27FC236}">
+                    <a16:creationId xmlns:a16="http://schemas.microsoft.com/office/drawing/2014/main" id="{1110C7CA-FC90-4DA4-A98C-BB0CBA94415A}"/>
+                  </a:ext>
+                </a:extLst>
+              </p:cNvPr>
+              <p:cNvSpPr>
+                <a:spLocks noChangeAspect="1"/>
+              </p:cNvSpPr>
+              <p:nvPr/>
+            </p:nvSpPr>
+            <p:spPr>
+              <a:xfrm>
+                <a:off x="4803373" y="4098239"/>
+                <a:ext cx="506673" cy="411423"/>
+              </a:xfrm>
+              <a:custGeom>
+                <a:avLst/>
+                <a:gdLst>
+                  <a:gd name="connsiteX0" fmla="*/ 506673 w 506673"/>
+                  <a:gd name="connsiteY0" fmla="*/ 45363 h 411423"/>
+                  <a:gd name="connsiteX1" fmla="*/ 506673 w 506673"/>
+                  <a:gd name="connsiteY1" fmla="*/ 366060 h 411423"/>
+                  <a:gd name="connsiteX2" fmla="*/ 461310 w 506673"/>
+                  <a:gd name="connsiteY2" fmla="*/ 411423 h 411423"/>
+                  <a:gd name="connsiteX3" fmla="*/ 140613 w 506673"/>
+                  <a:gd name="connsiteY3" fmla="*/ 411423 h 411423"/>
+                  <a:gd name="connsiteX4" fmla="*/ 95250 w 506673"/>
+                  <a:gd name="connsiteY4" fmla="*/ 366060 h 411423"/>
+                  <a:gd name="connsiteX5" fmla="*/ 95250 w 506673"/>
+                  <a:gd name="connsiteY5" fmla="*/ 310247 h 411423"/>
+                  <a:gd name="connsiteX6" fmla="*/ 83571 w 506673"/>
+                  <a:gd name="connsiteY6" fmla="*/ 318121 h 411423"/>
+                  <a:gd name="connsiteX7" fmla="*/ 60156 w 506673"/>
+                  <a:gd name="connsiteY7" fmla="*/ 322848 h 411423"/>
+                  <a:gd name="connsiteX8" fmla="*/ 0 w 506673"/>
+                  <a:gd name="connsiteY8" fmla="*/ 262692 h 411423"/>
+                  <a:gd name="connsiteX9" fmla="*/ 60156 w 506673"/>
+                  <a:gd name="connsiteY9" fmla="*/ 202536 h 411423"/>
+                  <a:gd name="connsiteX10" fmla="*/ 83571 w 506673"/>
+                  <a:gd name="connsiteY10" fmla="*/ 207264 h 411423"/>
+                  <a:gd name="connsiteX11" fmla="*/ 95250 w 506673"/>
+                  <a:gd name="connsiteY11" fmla="*/ 215138 h 411423"/>
+                  <a:gd name="connsiteX12" fmla="*/ 95250 w 506673"/>
+                  <a:gd name="connsiteY12" fmla="*/ 45363 h 411423"/>
+                  <a:gd name="connsiteX13" fmla="*/ 140613 w 506673"/>
+                  <a:gd name="connsiteY13" fmla="*/ 0 h 411423"/>
+                  <a:gd name="connsiteX14" fmla="*/ 277493 w 506673"/>
+                  <a:gd name="connsiteY14" fmla="*/ 0 h 411423"/>
+                  <a:gd name="connsiteX15" fmla="*/ 274379 w 506673"/>
+                  <a:gd name="connsiteY15" fmla="*/ 15425 h 411423"/>
+                  <a:gd name="connsiteX16" fmla="*/ 359440 w 506673"/>
+                  <a:gd name="connsiteY16" fmla="*/ 100486 h 411423"/>
+                  <a:gd name="connsiteX17" fmla="*/ 444501 w 506673"/>
+                  <a:gd name="connsiteY17" fmla="*/ 15425 h 411423"/>
+                  <a:gd name="connsiteX18" fmla="*/ 441387 w 506673"/>
+                  <a:gd name="connsiteY18" fmla="*/ 0 h 411423"/>
+                  <a:gd name="connsiteX19" fmla="*/ 461310 w 506673"/>
+                  <a:gd name="connsiteY19" fmla="*/ 0 h 411423"/>
+                  <a:gd name="connsiteX20" fmla="*/ 506673 w 506673"/>
+                  <a:gd name="connsiteY20" fmla="*/ 45363 h 411423"/>
+                </a:gdLst>
+                <a:ahLst/>
+                <a:cxnLst>
+                  <a:cxn ang="0">
+                    <a:pos x="connsiteX0" y="connsiteY0"/>
+                  </a:cxn>
+                  <a:cxn ang="0">
+                    <a:pos x="connsiteX1" y="connsiteY1"/>
+                  </a:cxn>
+                  <a:cxn ang="0">
+                    <a:pos x="connsiteX2" y="connsiteY2"/>
+                  </a:cxn>
+                  <a:cxn ang="0">
+                    <a:pos x="connsiteX3" y="connsiteY3"/>
+                  </a:cxn>
+                  <a:cxn ang="0">
+                    <a:pos x="connsiteX4" y="connsiteY4"/>
+                  </a:cxn>
+                  <a:cxn ang="0">
+                    <a:pos x="connsiteX5" y="connsiteY5"/>
+                  </a:cxn>
+                  <a:cxn ang="0">
+                    <a:pos x="connsiteX6" y="connsiteY6"/>
+                  </a:cxn>
+                  <a:cxn ang="0">
+                    <a:pos x="connsiteX7" y="connsiteY7"/>
+                  </a:cxn>
+                  <a:cxn ang="0">
+                    <a:pos x="connsiteX8" y="connsiteY8"/>
+                  </a:cxn>
+                  <a:cxn ang="0">
+                    <a:pos x="connsiteX9" y="connsiteY9"/>
+                  </a:cxn>
+                  <a:cxn ang="0">
+                    <a:pos x="connsiteX10" y="connsiteY10"/>
+                  </a:cxn>
+                  <a:cxn ang="0">
+                    <a:pos x="connsiteX11" y="connsiteY11"/>
+                  </a:cxn>
+                  <a:cxn ang="0">
+                    <a:pos x="connsiteX12" y="connsiteY12"/>
+                  </a:cxn>
+                  <a:cxn ang="0">
+                    <a:pos x="connsiteX13" y="connsiteY13"/>
+                  </a:cxn>
+                  <a:cxn ang="0">
+                    <a:pos x="connsiteX14" y="connsiteY14"/>
+                  </a:cxn>
+                  <a:cxn ang="0">
+                    <a:pos x="connsiteX15" y="connsiteY15"/>
+                  </a:cxn>
+                  <a:cxn ang="0">
+                    <a:pos x="connsiteX16" y="connsiteY16"/>
+                  </a:cxn>
+                  <a:cxn ang="0">
+                    <a:pos x="connsiteX17" y="connsiteY17"/>
+                  </a:cxn>
+                  <a:cxn ang="0">
+                    <a:pos x="connsiteX18" y="connsiteY18"/>
+                  </a:cxn>
+                  <a:cxn ang="0">
+                    <a:pos x="connsiteX19" y="connsiteY19"/>
+                  </a:cxn>
+                  <a:cxn ang="0">
+                    <a:pos x="connsiteX20" y="connsiteY20"/>
+                  </a:cxn>
+                </a:cxnLst>
+                <a:rect l="l" t="t" r="r" b="b"/>
+                <a:pathLst>
+                  <a:path w="506673" h="411423">
+                    <a:moveTo>
+                      <a:pt x="506673" y="45363"/>
+                    </a:moveTo>
+                    <a:lnTo>
+                      <a:pt x="506673" y="366060"/>
+                    </a:lnTo>
+                    <a:cubicBezTo>
+                      <a:pt x="506673" y="391113"/>
+                      <a:pt x="486363" y="411423"/>
+                      <a:pt x="461310" y="411423"/>
+                    </a:cubicBezTo>
+                    <a:lnTo>
+                      <a:pt x="140613" y="411423"/>
+                    </a:lnTo>
+                    <a:cubicBezTo>
+                      <a:pt x="115560" y="411423"/>
+                      <a:pt x="95250" y="391113"/>
+                      <a:pt x="95250" y="366060"/>
+                    </a:cubicBezTo>
+                    <a:lnTo>
+                      <a:pt x="95250" y="310247"/>
+                    </a:lnTo>
+                    <a:lnTo>
+                      <a:pt x="83571" y="318121"/>
+                    </a:lnTo>
+                    <a:cubicBezTo>
+                      <a:pt x="76374" y="321165"/>
+                      <a:pt x="68462" y="322848"/>
+                      <a:pt x="60156" y="322848"/>
+                    </a:cubicBezTo>
+                    <a:cubicBezTo>
+                      <a:pt x="26933" y="322848"/>
+                      <a:pt x="0" y="295915"/>
+                      <a:pt x="0" y="262692"/>
+                    </a:cubicBezTo>
+                    <a:cubicBezTo>
+                      <a:pt x="0" y="229469"/>
+                      <a:pt x="26933" y="202536"/>
+                      <a:pt x="60156" y="202536"/>
+                    </a:cubicBezTo>
+                    <a:cubicBezTo>
+                      <a:pt x="68462" y="202536"/>
+                      <a:pt x="76374" y="204220"/>
+                      <a:pt x="83571" y="207264"/>
+                    </a:cubicBezTo>
+                    <a:lnTo>
+                      <a:pt x="95250" y="215138"/>
+                    </a:lnTo>
+                    <a:lnTo>
+                      <a:pt x="95250" y="45363"/>
+                    </a:lnTo>
+                    <a:cubicBezTo>
+                      <a:pt x="95250" y="20310"/>
+                      <a:pt x="115560" y="0"/>
+                      <a:pt x="140613" y="0"/>
+                    </a:cubicBezTo>
+                    <a:lnTo>
+                      <a:pt x="277493" y="0"/>
+                    </a:lnTo>
+                    <a:lnTo>
+                      <a:pt x="274379" y="15425"/>
+                    </a:lnTo>
+                    <a:cubicBezTo>
+                      <a:pt x="274379" y="62403"/>
+                      <a:pt x="312462" y="100486"/>
+                      <a:pt x="359440" y="100486"/>
+                    </a:cubicBezTo>
+                    <a:cubicBezTo>
+                      <a:pt x="406418" y="100486"/>
+                      <a:pt x="444501" y="62403"/>
+                      <a:pt x="444501" y="15425"/>
+                    </a:cubicBezTo>
+                    <a:lnTo>
+                      <a:pt x="441387" y="0"/>
+                    </a:lnTo>
+                    <a:lnTo>
+                      <a:pt x="461310" y="0"/>
+                    </a:lnTo>
+                    <a:cubicBezTo>
+                      <a:pt x="486363" y="0"/>
+                      <a:pt x="506673" y="20310"/>
+                      <a:pt x="506673" y="45363"/>
+                    </a:cubicBezTo>
+                    <a:close/>
+                  </a:path>
+                </a:pathLst>
+              </a:custGeom>
+              <a:solidFill>
+                <a:schemeClr val="accent4"/>
+              </a:solidFill>
+              <a:ln>
+                <a:noFill/>
+              </a:ln>
+            </p:spPr>
+            <p:style>
+              <a:lnRef idx="2">
+                <a:schemeClr val="accent1">
+                  <a:shade val="50000"/>
+                </a:schemeClr>
+              </a:lnRef>
+              <a:fillRef idx="1">
+                <a:schemeClr val="accent1"/>
+              </a:fillRef>
+              <a:effectRef idx="0">
+                <a:schemeClr val="accent1"/>
+              </a:effectRef>
+              <a:fontRef idx="minor">
+                <a:schemeClr val="lt1"/>
+              </a:fontRef>
+            </p:style>
+            <p:txBody>
+              <a:bodyPr wrap="square" rtlCol="0" anchor="ctr">
+                <a:noAutofit/>
+              </a:bodyPr>
+              <a:lstStyle/>
+              <a:p>
+                <a:pPr algn="ctr"/>
+                <a:endParaRPr lang="en-US"/>
+              </a:p>
+            </p:txBody>
+          </p:sp>
+          <p:pic>
+            <p:nvPicPr>
+              <p:cNvPr id="90" name="Picture 89" descr="A picture containing looking, dark&#10;&#10;Description automatically generated">
+                <a:extLst>
+                  <a:ext uri="{FF2B5EF4-FFF2-40B4-BE49-F238E27FC236}">
+                    <a16:creationId xmlns:a16="http://schemas.microsoft.com/office/drawing/2014/main" id="{CA329C34-B38D-4A52-A4B8-A8E27B311949}"/>
+                  </a:ext>
+                </a:extLst>
+              </p:cNvPr>
+              <p:cNvPicPr>
+                <a:picLocks noChangeAspect="1"/>
+              </p:cNvPicPr>
+              <p:nvPr/>
+            </p:nvPicPr>
+            <p:blipFill>
+              <a:blip r:embed="rId4">
+                <a:extLst>
+                  <a:ext uri="{28A0092B-C50C-407E-A947-70E740481C1C}">
+                    <a14:useLocalDpi xmlns:a14="http://schemas.microsoft.com/office/drawing/2010/main" val="0"/>
+                  </a:ext>
+                </a:extLst>
+              </a:blip>
+              <a:stretch>
+                <a:fillRect/>
+              </a:stretch>
+            </p:blipFill>
+            <p:spPr>
+              <a:xfrm rot="19063852">
+                <a:off x="4930991" y="4244038"/>
+                <a:ext cx="323982" cy="167197"/>
+              </a:xfrm>
+              <a:prstGeom prst="rect">
+                <a:avLst/>
+              </a:prstGeom>
+            </p:spPr>
+          </p:pic>
+        </p:grpSp>
+        <p:grpSp>
+          <p:nvGrpSpPr>
+            <p:cNvPr id="95" name="Group 94">
+              <a:extLst>
+                <a:ext uri="{FF2B5EF4-FFF2-40B4-BE49-F238E27FC236}">
+                  <a16:creationId xmlns:a16="http://schemas.microsoft.com/office/drawing/2014/main" id="{B370A35A-7313-4829-BE29-7CEED837BED0}"/>
+                </a:ext>
+              </a:extLst>
+            </p:cNvPr>
+            <p:cNvGrpSpPr/>
+            <p:nvPr/>
+          </p:nvGrpSpPr>
+          <p:grpSpPr>
+            <a:xfrm>
+              <a:off x="4463648" y="4002989"/>
+              <a:ext cx="411423" cy="506673"/>
+              <a:chOff x="4463648" y="4002989"/>
+              <a:chExt cx="411423" cy="506673"/>
+            </a:xfrm>
+          </p:grpSpPr>
+          <p:sp>
+            <p:nvSpPr>
+              <p:cNvPr id="85" name="Freeform: Shape 84">
+                <a:extLst>
+                  <a:ext uri="{FF2B5EF4-FFF2-40B4-BE49-F238E27FC236}">
+                    <a16:creationId xmlns:a16="http://schemas.microsoft.com/office/drawing/2014/main" id="{66EF2578-65A6-4556-B3AD-74DD2D959BE2}"/>
+                  </a:ext>
+                </a:extLst>
+              </p:cNvPr>
+              <p:cNvSpPr>
+                <a:spLocks noChangeAspect="1"/>
+              </p:cNvSpPr>
+              <p:nvPr/>
+            </p:nvSpPr>
+            <p:spPr>
+              <a:xfrm rot="5400000">
+                <a:off x="4416023" y="4050614"/>
+                <a:ext cx="506673" cy="411423"/>
+              </a:xfrm>
+              <a:custGeom>
+                <a:avLst/>
+                <a:gdLst>
+                  <a:gd name="connsiteX0" fmla="*/ 506673 w 506673"/>
+                  <a:gd name="connsiteY0" fmla="*/ 45363 h 411423"/>
+                  <a:gd name="connsiteX1" fmla="*/ 506673 w 506673"/>
+                  <a:gd name="connsiteY1" fmla="*/ 366060 h 411423"/>
+                  <a:gd name="connsiteX2" fmla="*/ 461310 w 506673"/>
+                  <a:gd name="connsiteY2" fmla="*/ 411423 h 411423"/>
+                  <a:gd name="connsiteX3" fmla="*/ 140613 w 506673"/>
+                  <a:gd name="connsiteY3" fmla="*/ 411423 h 411423"/>
+                  <a:gd name="connsiteX4" fmla="*/ 95250 w 506673"/>
+                  <a:gd name="connsiteY4" fmla="*/ 366060 h 411423"/>
+                  <a:gd name="connsiteX5" fmla="*/ 95250 w 506673"/>
+                  <a:gd name="connsiteY5" fmla="*/ 310247 h 411423"/>
+                  <a:gd name="connsiteX6" fmla="*/ 83571 w 506673"/>
+                  <a:gd name="connsiteY6" fmla="*/ 318121 h 411423"/>
+                  <a:gd name="connsiteX7" fmla="*/ 60156 w 506673"/>
+                  <a:gd name="connsiteY7" fmla="*/ 322848 h 411423"/>
+                  <a:gd name="connsiteX8" fmla="*/ 0 w 506673"/>
+                  <a:gd name="connsiteY8" fmla="*/ 262692 h 411423"/>
+                  <a:gd name="connsiteX9" fmla="*/ 60156 w 506673"/>
+                  <a:gd name="connsiteY9" fmla="*/ 202536 h 411423"/>
+                  <a:gd name="connsiteX10" fmla="*/ 83571 w 506673"/>
+                  <a:gd name="connsiteY10" fmla="*/ 207264 h 411423"/>
+                  <a:gd name="connsiteX11" fmla="*/ 95250 w 506673"/>
+                  <a:gd name="connsiteY11" fmla="*/ 215138 h 411423"/>
+                  <a:gd name="connsiteX12" fmla="*/ 95250 w 506673"/>
+                  <a:gd name="connsiteY12" fmla="*/ 45363 h 411423"/>
+                  <a:gd name="connsiteX13" fmla="*/ 140613 w 506673"/>
+                  <a:gd name="connsiteY13" fmla="*/ 0 h 411423"/>
+                  <a:gd name="connsiteX14" fmla="*/ 277493 w 506673"/>
+                  <a:gd name="connsiteY14" fmla="*/ 0 h 411423"/>
+                  <a:gd name="connsiteX15" fmla="*/ 274379 w 506673"/>
+                  <a:gd name="connsiteY15" fmla="*/ 15425 h 411423"/>
+                  <a:gd name="connsiteX16" fmla="*/ 359440 w 506673"/>
+                  <a:gd name="connsiteY16" fmla="*/ 100486 h 411423"/>
+                  <a:gd name="connsiteX17" fmla="*/ 444501 w 506673"/>
+                  <a:gd name="connsiteY17" fmla="*/ 15425 h 411423"/>
+                  <a:gd name="connsiteX18" fmla="*/ 441387 w 506673"/>
+                  <a:gd name="connsiteY18" fmla="*/ 0 h 411423"/>
+                  <a:gd name="connsiteX19" fmla="*/ 461310 w 506673"/>
+                  <a:gd name="connsiteY19" fmla="*/ 0 h 411423"/>
+                  <a:gd name="connsiteX20" fmla="*/ 506673 w 506673"/>
+                  <a:gd name="connsiteY20" fmla="*/ 45363 h 411423"/>
+                </a:gdLst>
+                <a:ahLst/>
+                <a:cxnLst>
+                  <a:cxn ang="0">
+                    <a:pos x="connsiteX0" y="connsiteY0"/>
+                  </a:cxn>
+                  <a:cxn ang="0">
+                    <a:pos x="connsiteX1" y="connsiteY1"/>
+                  </a:cxn>
+                  <a:cxn ang="0">
+                    <a:pos x="connsiteX2" y="connsiteY2"/>
+                  </a:cxn>
+                  <a:cxn ang="0">
+                    <a:pos x="connsiteX3" y="connsiteY3"/>
+                  </a:cxn>
+                  <a:cxn ang="0">
+                    <a:pos x="connsiteX4" y="connsiteY4"/>
+                  </a:cxn>
+                  <a:cxn ang="0">
+                    <a:pos x="connsiteX5" y="connsiteY5"/>
+                  </a:cxn>
+                  <a:cxn ang="0">
+                    <a:pos x="connsiteX6" y="connsiteY6"/>
+                  </a:cxn>
+                  <a:cxn ang="0">
+                    <a:pos x="connsiteX7" y="connsiteY7"/>
+                  </a:cxn>
+                  <a:cxn ang="0">
+                    <a:pos x="connsiteX8" y="connsiteY8"/>
+                  </a:cxn>
+                  <a:cxn ang="0">
+                    <a:pos x="connsiteX9" y="connsiteY9"/>
+                  </a:cxn>
+                  <a:cxn ang="0">
+                    <a:pos x="connsiteX10" y="connsiteY10"/>
+                  </a:cxn>
+                  <a:cxn ang="0">
+                    <a:pos x="connsiteX11" y="connsiteY11"/>
+                  </a:cxn>
+                  <a:cxn ang="0">
+                    <a:pos x="connsiteX12" y="connsiteY12"/>
+                  </a:cxn>
+                  <a:cxn ang="0">
+                    <a:pos x="connsiteX13" y="connsiteY13"/>
+                  </a:cxn>
+                  <a:cxn ang="0">
+                    <a:pos x="connsiteX14" y="connsiteY14"/>
+                  </a:cxn>
+                  <a:cxn ang="0">
+                    <a:pos x="connsiteX15" y="connsiteY15"/>
+                  </a:cxn>
+                  <a:cxn ang="0">
+                    <a:pos x="connsiteX16" y="connsiteY16"/>
+                  </a:cxn>
+                  <a:cxn ang="0">
+                    <a:pos x="connsiteX17" y="connsiteY17"/>
+                  </a:cxn>
+                  <a:cxn ang="0">
+                    <a:pos x="connsiteX18" y="connsiteY18"/>
+                  </a:cxn>
+                  <a:cxn ang="0">
+                    <a:pos x="connsiteX19" y="connsiteY19"/>
+                  </a:cxn>
+                  <a:cxn ang="0">
+                    <a:pos x="connsiteX20" y="connsiteY20"/>
+                  </a:cxn>
+                </a:cxnLst>
+                <a:rect l="l" t="t" r="r" b="b"/>
+                <a:pathLst>
+                  <a:path w="506673" h="411423">
+                    <a:moveTo>
+                      <a:pt x="506673" y="45363"/>
+                    </a:moveTo>
+                    <a:lnTo>
+                      <a:pt x="506673" y="366060"/>
+                    </a:lnTo>
+                    <a:cubicBezTo>
+                      <a:pt x="506673" y="391113"/>
+                      <a:pt x="486363" y="411423"/>
+                      <a:pt x="461310" y="411423"/>
+                    </a:cubicBezTo>
+                    <a:lnTo>
+                      <a:pt x="140613" y="411423"/>
+                    </a:lnTo>
+                    <a:cubicBezTo>
+                      <a:pt x="115560" y="411423"/>
+                      <a:pt x="95250" y="391113"/>
+                      <a:pt x="95250" y="366060"/>
+                    </a:cubicBezTo>
+                    <a:lnTo>
+                      <a:pt x="95250" y="310247"/>
+                    </a:lnTo>
+                    <a:lnTo>
+                      <a:pt x="83571" y="318121"/>
+                    </a:lnTo>
+                    <a:cubicBezTo>
+                      <a:pt x="76374" y="321165"/>
+                      <a:pt x="68462" y="322848"/>
+                      <a:pt x="60156" y="322848"/>
+                    </a:cubicBezTo>
+                    <a:cubicBezTo>
+                      <a:pt x="26933" y="322848"/>
+                      <a:pt x="0" y="295915"/>
+                      <a:pt x="0" y="262692"/>
+                    </a:cubicBezTo>
+                    <a:cubicBezTo>
+                      <a:pt x="0" y="229469"/>
+                      <a:pt x="26933" y="202536"/>
+                      <a:pt x="60156" y="202536"/>
+                    </a:cubicBezTo>
+                    <a:cubicBezTo>
+                      <a:pt x="68462" y="202536"/>
+                      <a:pt x="76374" y="204220"/>
+                      <a:pt x="83571" y="207264"/>
+                    </a:cubicBezTo>
+                    <a:lnTo>
+                      <a:pt x="95250" y="215138"/>
+                    </a:lnTo>
+                    <a:lnTo>
+                      <a:pt x="95250" y="45363"/>
+                    </a:lnTo>
+                    <a:cubicBezTo>
+                      <a:pt x="95250" y="20310"/>
+                      <a:pt x="115560" y="0"/>
+                      <a:pt x="140613" y="0"/>
+                    </a:cubicBezTo>
+                    <a:lnTo>
+                      <a:pt x="277493" y="0"/>
+                    </a:lnTo>
+                    <a:lnTo>
+                      <a:pt x="274379" y="15425"/>
+                    </a:lnTo>
+                    <a:cubicBezTo>
+                      <a:pt x="274379" y="62403"/>
+                      <a:pt x="312462" y="100486"/>
+                      <a:pt x="359440" y="100486"/>
+                    </a:cubicBezTo>
+                    <a:cubicBezTo>
+                      <a:pt x="406418" y="100486"/>
+                      <a:pt x="444501" y="62403"/>
+                      <a:pt x="444501" y="15425"/>
+                    </a:cubicBezTo>
+                    <a:lnTo>
+                      <a:pt x="441387" y="0"/>
+                    </a:lnTo>
+                    <a:lnTo>
+                      <a:pt x="461310" y="0"/>
+                    </a:lnTo>
+                    <a:cubicBezTo>
+                      <a:pt x="486363" y="0"/>
+                      <a:pt x="506673" y="20310"/>
+                      <a:pt x="506673" y="45363"/>
+                    </a:cubicBezTo>
+                    <a:close/>
+                  </a:path>
+                </a:pathLst>
+              </a:custGeom>
+              <a:solidFill>
+                <a:srgbClr val="3399FF"/>
+              </a:solidFill>
+              <a:ln>
+                <a:noFill/>
+              </a:ln>
+            </p:spPr>
+            <p:style>
+              <a:lnRef idx="2">
+                <a:schemeClr val="accent1">
+                  <a:shade val="50000"/>
+                </a:schemeClr>
+              </a:lnRef>
+              <a:fillRef idx="1">
+                <a:schemeClr val="accent1"/>
+              </a:fillRef>
+              <a:effectRef idx="0">
+                <a:schemeClr val="accent1"/>
+              </a:effectRef>
+              <a:fontRef idx="minor">
+                <a:schemeClr val="lt1"/>
+              </a:fontRef>
+            </p:style>
+            <p:txBody>
+              <a:bodyPr wrap="square" rtlCol="0" anchor="ctr">
+                <a:noAutofit/>
+              </a:bodyPr>
+              <a:lstStyle/>
+              <a:p>
+                <a:pPr algn="ctr"/>
+                <a:endParaRPr lang="en-US"/>
+              </a:p>
+            </p:txBody>
+          </p:sp>
+          <p:pic>
+            <p:nvPicPr>
+              <p:cNvPr id="91" name="Picture 90" descr="A black rectangle with a black background&#10;&#10;Description automatically generated with low confidence">
+                <a:extLst>
+                  <a:ext uri="{FF2B5EF4-FFF2-40B4-BE49-F238E27FC236}">
+                    <a16:creationId xmlns:a16="http://schemas.microsoft.com/office/drawing/2014/main" id="{4A8CBAF9-3932-457A-9552-7874627C6D10}"/>
+                  </a:ext>
+                </a:extLst>
+              </p:cNvPr>
+              <p:cNvPicPr>
+                <a:picLocks noChangeAspect="1"/>
+              </p:cNvPicPr>
+              <p:nvPr/>
+            </p:nvPicPr>
+            <p:blipFill>
+              <a:blip r:embed="rId3">
+                <a:extLst>
+                  <a:ext uri="{28A0092B-C50C-407E-A947-70E740481C1C}">
+                    <a14:useLocalDpi xmlns:a14="http://schemas.microsoft.com/office/drawing/2010/main" val="0"/>
+                  </a:ext>
+                </a:extLst>
+              </a:blip>
+              <a:stretch>
+                <a:fillRect/>
+              </a:stretch>
+            </p:blipFill>
+            <p:spPr>
+              <a:xfrm>
+                <a:off x="4483625" y="4140358"/>
+                <a:ext cx="303301" cy="303902"/>
+              </a:xfrm>
+              <a:prstGeom prst="rect">
+                <a:avLst/>
+              </a:prstGeom>
+            </p:spPr>
+          </p:pic>
+        </p:grpSp>
+        <p:grpSp>
+          <p:nvGrpSpPr>
+            <p:cNvPr id="94" name="Group 93">
+              <a:extLst>
+                <a:ext uri="{FF2B5EF4-FFF2-40B4-BE49-F238E27FC236}">
+                  <a16:creationId xmlns:a16="http://schemas.microsoft.com/office/drawing/2014/main" id="{992841DC-16C2-466C-B714-324D2FF6A6C1}"/>
+                </a:ext>
+              </a:extLst>
+            </p:cNvPr>
+            <p:cNvGrpSpPr/>
+            <p:nvPr/>
+          </p:nvGrpSpPr>
+          <p:grpSpPr>
+            <a:xfrm>
+              <a:off x="4463648" y="3663533"/>
+              <a:ext cx="506673" cy="411423"/>
+              <a:chOff x="4463648" y="3663533"/>
+              <a:chExt cx="506673" cy="411423"/>
+            </a:xfrm>
+          </p:grpSpPr>
+          <p:sp>
+            <p:nvSpPr>
+              <p:cNvPr id="86" name="Freeform: Shape 85">
+                <a:extLst>
+                  <a:ext uri="{FF2B5EF4-FFF2-40B4-BE49-F238E27FC236}">
+                    <a16:creationId xmlns:a16="http://schemas.microsoft.com/office/drawing/2014/main" id="{092681AA-2BFF-4A82-8224-0FDDB9A55598}"/>
+                  </a:ext>
+                </a:extLst>
+              </p:cNvPr>
+              <p:cNvSpPr>
+                <a:spLocks noChangeAspect="1"/>
+              </p:cNvSpPr>
+              <p:nvPr/>
+            </p:nvSpPr>
+            <p:spPr>
+              <a:xfrm rot="10800000">
+                <a:off x="4463648" y="3663533"/>
+                <a:ext cx="506673" cy="411423"/>
+              </a:xfrm>
+              <a:custGeom>
+                <a:avLst/>
+                <a:gdLst>
+                  <a:gd name="connsiteX0" fmla="*/ 506673 w 506673"/>
+                  <a:gd name="connsiteY0" fmla="*/ 45363 h 411423"/>
+                  <a:gd name="connsiteX1" fmla="*/ 506673 w 506673"/>
+                  <a:gd name="connsiteY1" fmla="*/ 366060 h 411423"/>
+                  <a:gd name="connsiteX2" fmla="*/ 461310 w 506673"/>
+                  <a:gd name="connsiteY2" fmla="*/ 411423 h 411423"/>
+                  <a:gd name="connsiteX3" fmla="*/ 140613 w 506673"/>
+                  <a:gd name="connsiteY3" fmla="*/ 411423 h 411423"/>
+                  <a:gd name="connsiteX4" fmla="*/ 95250 w 506673"/>
+                  <a:gd name="connsiteY4" fmla="*/ 366060 h 411423"/>
+                  <a:gd name="connsiteX5" fmla="*/ 95250 w 506673"/>
+                  <a:gd name="connsiteY5" fmla="*/ 310247 h 411423"/>
+                  <a:gd name="connsiteX6" fmla="*/ 83571 w 506673"/>
+                  <a:gd name="connsiteY6" fmla="*/ 318121 h 411423"/>
+                  <a:gd name="connsiteX7" fmla="*/ 60156 w 506673"/>
+                  <a:gd name="connsiteY7" fmla="*/ 322848 h 411423"/>
+                  <a:gd name="connsiteX8" fmla="*/ 0 w 506673"/>
+                  <a:gd name="connsiteY8" fmla="*/ 262692 h 411423"/>
+                  <a:gd name="connsiteX9" fmla="*/ 60156 w 506673"/>
+                  <a:gd name="connsiteY9" fmla="*/ 202536 h 411423"/>
+                  <a:gd name="connsiteX10" fmla="*/ 83571 w 506673"/>
+                  <a:gd name="connsiteY10" fmla="*/ 207264 h 411423"/>
+                  <a:gd name="connsiteX11" fmla="*/ 95250 w 506673"/>
+                  <a:gd name="connsiteY11" fmla="*/ 215138 h 411423"/>
+                  <a:gd name="connsiteX12" fmla="*/ 95250 w 506673"/>
+                  <a:gd name="connsiteY12" fmla="*/ 45363 h 411423"/>
+                  <a:gd name="connsiteX13" fmla="*/ 140613 w 506673"/>
+                  <a:gd name="connsiteY13" fmla="*/ 0 h 411423"/>
+                  <a:gd name="connsiteX14" fmla="*/ 277493 w 506673"/>
+                  <a:gd name="connsiteY14" fmla="*/ 0 h 411423"/>
+                  <a:gd name="connsiteX15" fmla="*/ 274379 w 506673"/>
+                  <a:gd name="connsiteY15" fmla="*/ 15425 h 411423"/>
+                  <a:gd name="connsiteX16" fmla="*/ 359440 w 506673"/>
+                  <a:gd name="connsiteY16" fmla="*/ 100486 h 411423"/>
+                  <a:gd name="connsiteX17" fmla="*/ 444501 w 506673"/>
+                  <a:gd name="connsiteY17" fmla="*/ 15425 h 411423"/>
+                  <a:gd name="connsiteX18" fmla="*/ 441387 w 506673"/>
+                  <a:gd name="connsiteY18" fmla="*/ 0 h 411423"/>
+                  <a:gd name="connsiteX19" fmla="*/ 461310 w 506673"/>
+                  <a:gd name="connsiteY19" fmla="*/ 0 h 411423"/>
+                  <a:gd name="connsiteX20" fmla="*/ 506673 w 506673"/>
+                  <a:gd name="connsiteY20" fmla="*/ 45363 h 411423"/>
+                </a:gdLst>
+                <a:ahLst/>
+                <a:cxnLst>
+                  <a:cxn ang="0">
+                    <a:pos x="connsiteX0" y="connsiteY0"/>
+                  </a:cxn>
+                  <a:cxn ang="0">
+                    <a:pos x="connsiteX1" y="connsiteY1"/>
+                  </a:cxn>
+                  <a:cxn ang="0">
+                    <a:pos x="connsiteX2" y="connsiteY2"/>
+                  </a:cxn>
+                  <a:cxn ang="0">
+                    <a:pos x="connsiteX3" y="connsiteY3"/>
+                  </a:cxn>
+                  <a:cxn ang="0">
+                    <a:pos x="connsiteX4" y="connsiteY4"/>
+                  </a:cxn>
+                  <a:cxn ang="0">
+                    <a:pos x="connsiteX5" y="connsiteY5"/>
+                  </a:cxn>
+                  <a:cxn ang="0">
+                    <a:pos x="connsiteX6" y="connsiteY6"/>
+                  </a:cxn>
+                  <a:cxn ang="0">
+                    <a:pos x="connsiteX7" y="connsiteY7"/>
+                  </a:cxn>
+                  <a:cxn ang="0">
+                    <a:pos x="connsiteX8" y="connsiteY8"/>
+                  </a:cxn>
+                  <a:cxn ang="0">
+                    <a:pos x="connsiteX9" y="connsiteY9"/>
+                  </a:cxn>
+                  <a:cxn ang="0">
+                    <a:pos x="connsiteX10" y="connsiteY10"/>
+                  </a:cxn>
+                  <a:cxn ang="0">
+                    <a:pos x="connsiteX11" y="connsiteY11"/>
+                  </a:cxn>
+                  <a:cxn ang="0">
+                    <a:pos x="connsiteX12" y="connsiteY12"/>
+                  </a:cxn>
+                  <a:cxn ang="0">
+                    <a:pos x="connsiteX13" y="connsiteY13"/>
+                  </a:cxn>
+                  <a:cxn ang="0">
+                    <a:pos x="connsiteX14" y="connsiteY14"/>
+                  </a:cxn>
+                  <a:cxn ang="0">
+                    <a:pos x="connsiteX15" y="connsiteY15"/>
+                  </a:cxn>
+                  <a:cxn ang="0">
+                    <a:pos x="connsiteX16" y="connsiteY16"/>
+                  </a:cxn>
+                  <a:cxn ang="0">
+                    <a:pos x="connsiteX17" y="connsiteY17"/>
+                  </a:cxn>
+                  <a:cxn ang="0">
+                    <a:pos x="connsiteX18" y="connsiteY18"/>
+                  </a:cxn>
+                  <a:cxn ang="0">
+                    <a:pos x="connsiteX19" y="connsiteY19"/>
+                  </a:cxn>
+                  <a:cxn ang="0">
+                    <a:pos x="connsiteX20" y="connsiteY20"/>
+                  </a:cxn>
+                </a:cxnLst>
+                <a:rect l="l" t="t" r="r" b="b"/>
+                <a:pathLst>
+                  <a:path w="506673" h="411423">
+                    <a:moveTo>
+                      <a:pt x="506673" y="45363"/>
+                    </a:moveTo>
+                    <a:lnTo>
+                      <a:pt x="506673" y="366060"/>
+                    </a:lnTo>
+                    <a:cubicBezTo>
+                      <a:pt x="506673" y="391113"/>
+                      <a:pt x="486363" y="411423"/>
+                      <a:pt x="461310" y="411423"/>
+                    </a:cubicBezTo>
+                    <a:lnTo>
+                      <a:pt x="140613" y="411423"/>
+                    </a:lnTo>
+                    <a:cubicBezTo>
+                      <a:pt x="115560" y="411423"/>
+                      <a:pt x="95250" y="391113"/>
+                      <a:pt x="95250" y="366060"/>
+                    </a:cubicBezTo>
+                    <a:lnTo>
+                      <a:pt x="95250" y="310247"/>
+                    </a:lnTo>
+                    <a:lnTo>
+                      <a:pt x="83571" y="318121"/>
+                    </a:lnTo>
+                    <a:cubicBezTo>
+                      <a:pt x="76374" y="321165"/>
+                      <a:pt x="68462" y="322848"/>
+                      <a:pt x="60156" y="322848"/>
+                    </a:cubicBezTo>
+                    <a:cubicBezTo>
+                      <a:pt x="26933" y="322848"/>
+                      <a:pt x="0" y="295915"/>
+                      <a:pt x="0" y="262692"/>
+                    </a:cubicBezTo>
+                    <a:cubicBezTo>
+                      <a:pt x="0" y="229469"/>
+                      <a:pt x="26933" y="202536"/>
+                      <a:pt x="60156" y="202536"/>
+                    </a:cubicBezTo>
+                    <a:cubicBezTo>
+                      <a:pt x="68462" y="202536"/>
+                      <a:pt x="76374" y="204220"/>
+                      <a:pt x="83571" y="207264"/>
+                    </a:cubicBezTo>
+                    <a:lnTo>
+                      <a:pt x="95250" y="215138"/>
+                    </a:lnTo>
+                    <a:lnTo>
+                      <a:pt x="95250" y="45363"/>
+                    </a:lnTo>
+                    <a:cubicBezTo>
+                      <a:pt x="95250" y="20310"/>
+                      <a:pt x="115560" y="0"/>
+                      <a:pt x="140613" y="0"/>
+                    </a:cubicBezTo>
+                    <a:lnTo>
+                      <a:pt x="277493" y="0"/>
+                    </a:lnTo>
+                    <a:lnTo>
+                      <a:pt x="274379" y="15425"/>
+                    </a:lnTo>
+                    <a:cubicBezTo>
+                      <a:pt x="274379" y="62403"/>
+                      <a:pt x="312462" y="100486"/>
+                      <a:pt x="359440" y="100486"/>
+                    </a:cubicBezTo>
+                    <a:cubicBezTo>
+                      <a:pt x="406418" y="100486"/>
+                      <a:pt x="444501" y="62403"/>
+                      <a:pt x="444501" y="15425"/>
+                    </a:cubicBezTo>
+                    <a:lnTo>
+                      <a:pt x="441387" y="0"/>
+                    </a:lnTo>
+                    <a:lnTo>
+                      <a:pt x="461310" y="0"/>
+                    </a:lnTo>
+                    <a:cubicBezTo>
+                      <a:pt x="486363" y="0"/>
+                      <a:pt x="506673" y="20310"/>
+                      <a:pt x="506673" y="45363"/>
+                    </a:cubicBezTo>
+                    <a:close/>
+                  </a:path>
+                </a:pathLst>
+              </a:custGeom>
+              <a:solidFill>
+                <a:srgbClr val="FF3399"/>
+              </a:solidFill>
+              <a:ln>
+                <a:noFill/>
+              </a:ln>
+            </p:spPr>
+            <p:style>
+              <a:lnRef idx="2">
+                <a:schemeClr val="accent1">
+                  <a:shade val="50000"/>
+                </a:schemeClr>
+              </a:lnRef>
+              <a:fillRef idx="1">
+                <a:schemeClr val="accent1"/>
+              </a:fillRef>
+              <a:effectRef idx="0">
+                <a:schemeClr val="accent1"/>
+              </a:effectRef>
+              <a:fontRef idx="minor">
+                <a:schemeClr val="lt1"/>
+              </a:fontRef>
+            </p:style>
+            <p:txBody>
+              <a:bodyPr wrap="square" rtlCol="0" anchor="ctr">
+                <a:noAutofit/>
+              </a:bodyPr>
+              <a:lstStyle/>
+              <a:p>
+                <a:pPr algn="ctr"/>
+                <a:endParaRPr lang="en-US"/>
+              </a:p>
+            </p:txBody>
+          </p:sp>
+          <p:pic>
+            <p:nvPicPr>
+              <p:cNvPr id="92" name="Picture 91" descr="A picture containing night sky&#10;&#10;Description automatically generated">
+                <a:extLst>
+                  <a:ext uri="{FF2B5EF4-FFF2-40B4-BE49-F238E27FC236}">
+                    <a16:creationId xmlns:a16="http://schemas.microsoft.com/office/drawing/2014/main" id="{8B534C98-A366-4536-B564-7B4DB6551CA0}"/>
+                  </a:ext>
+                </a:extLst>
+              </p:cNvPr>
+              <p:cNvPicPr>
+                <a:picLocks noChangeAspect="1"/>
+              </p:cNvPicPr>
+              <p:nvPr/>
+            </p:nvPicPr>
+            <p:blipFill>
+              <a:blip r:embed="rId2">
+                <a:extLst>
+                  <a:ext uri="{28A0092B-C50C-407E-A947-70E740481C1C}">
+                    <a14:useLocalDpi xmlns:a14="http://schemas.microsoft.com/office/drawing/2010/main" val="0"/>
+                  </a:ext>
+                </a:extLst>
+              </a:blip>
+              <a:stretch>
+                <a:fillRect/>
+              </a:stretch>
+            </p:blipFill>
+            <p:spPr>
+              <a:xfrm flipH="1">
+                <a:off x="4531795" y="3692954"/>
+                <a:ext cx="262895" cy="273138"/>
+              </a:xfrm>
+              <a:prstGeom prst="rect">
+                <a:avLst/>
+              </a:prstGeom>
+              <a:noFill/>
+              <a:ln>
+                <a:noFill/>
+              </a:ln>
+            </p:spPr>
+          </p:pic>
+        </p:grpSp>
+      </p:grpSp>
+      <p:grpSp>
+        <p:nvGrpSpPr>
+          <p:cNvPr id="112" name="Group 111">
+            <a:extLst>
+              <a:ext uri="{FF2B5EF4-FFF2-40B4-BE49-F238E27FC236}">
+                <a16:creationId xmlns:a16="http://schemas.microsoft.com/office/drawing/2014/main" id="{025B908C-A340-4A01-A824-CB382884FC3D}"/>
+              </a:ext>
+            </a:extLst>
+          </p:cNvPr>
+          <p:cNvGrpSpPr/>
+          <p:nvPr/>
+        </p:nvGrpSpPr>
+        <p:grpSpPr>
+          <a:xfrm>
+            <a:off x="6307764" y="4011202"/>
+            <a:ext cx="1911052" cy="2036868"/>
+            <a:chOff x="6307764" y="4011202"/>
+            <a:chExt cx="1911052" cy="2036868"/>
+          </a:xfrm>
+        </p:grpSpPr>
+        <p:grpSp>
+          <p:nvGrpSpPr>
+            <p:cNvPr id="98" name="Group 97">
+              <a:extLst>
+                <a:ext uri="{FF2B5EF4-FFF2-40B4-BE49-F238E27FC236}">
+                  <a16:creationId xmlns:a16="http://schemas.microsoft.com/office/drawing/2014/main" id="{5CB70F1F-175D-4DAA-A35E-E98E244E247D}"/>
+                </a:ext>
+              </a:extLst>
+            </p:cNvPr>
+            <p:cNvGrpSpPr>
+              <a:grpSpLocks noChangeAspect="1"/>
+            </p:cNvGrpSpPr>
+            <p:nvPr/>
+          </p:nvGrpSpPr>
+          <p:grpSpPr>
+            <a:xfrm>
+              <a:off x="6485607" y="4011202"/>
+              <a:ext cx="1733209" cy="1656258"/>
+              <a:chOff x="4463648" y="3592719"/>
+              <a:chExt cx="959545" cy="916943"/>
+            </a:xfrm>
+          </p:grpSpPr>
+          <p:grpSp>
+            <p:nvGrpSpPr>
+              <p:cNvPr id="99" name="Group 98">
+                <a:extLst>
+                  <a:ext uri="{FF2B5EF4-FFF2-40B4-BE49-F238E27FC236}">
+                    <a16:creationId xmlns:a16="http://schemas.microsoft.com/office/drawing/2014/main" id="{C969539E-56B7-4C4F-8AB1-3EAA60B6D9AA}"/>
+                  </a:ext>
+                </a:extLst>
+              </p:cNvPr>
+              <p:cNvGrpSpPr/>
+              <p:nvPr/>
+            </p:nvGrpSpPr>
+            <p:grpSpPr>
+              <a:xfrm rot="1863789">
+                <a:off x="5011770" y="3592719"/>
+                <a:ext cx="411423" cy="506673"/>
+                <a:chOff x="5004965" y="3565991"/>
+                <a:chExt cx="411423" cy="506673"/>
+              </a:xfrm>
+            </p:grpSpPr>
+            <p:sp>
+              <p:nvSpPr>
+                <p:cNvPr id="109" name="Freeform: Shape 108">
+                  <a:extLst>
+                    <a:ext uri="{FF2B5EF4-FFF2-40B4-BE49-F238E27FC236}">
+                      <a16:creationId xmlns:a16="http://schemas.microsoft.com/office/drawing/2014/main" id="{F5F01804-32CE-4E60-9A4E-21C5A8A13AC1}"/>
+                    </a:ext>
+                  </a:extLst>
+                </p:cNvPr>
+                <p:cNvSpPr>
+                  <a:spLocks noChangeAspect="1"/>
+                </p:cNvSpPr>
+                <p:nvPr/>
+              </p:nvSpPr>
+              <p:spPr>
+                <a:xfrm rot="16200000">
+                  <a:off x="4957340" y="3613616"/>
+                  <a:ext cx="506673" cy="411423"/>
+                </a:xfrm>
+                <a:custGeom>
+                  <a:avLst/>
+                  <a:gdLst>
+                    <a:gd name="connsiteX0" fmla="*/ 506673 w 506673"/>
+                    <a:gd name="connsiteY0" fmla="*/ 45363 h 411423"/>
+                    <a:gd name="connsiteX1" fmla="*/ 506673 w 506673"/>
+                    <a:gd name="connsiteY1" fmla="*/ 366060 h 411423"/>
+                    <a:gd name="connsiteX2" fmla="*/ 461310 w 506673"/>
+                    <a:gd name="connsiteY2" fmla="*/ 411423 h 411423"/>
+                    <a:gd name="connsiteX3" fmla="*/ 140613 w 506673"/>
+                    <a:gd name="connsiteY3" fmla="*/ 411423 h 411423"/>
+                    <a:gd name="connsiteX4" fmla="*/ 95250 w 506673"/>
+                    <a:gd name="connsiteY4" fmla="*/ 366060 h 411423"/>
+                    <a:gd name="connsiteX5" fmla="*/ 95250 w 506673"/>
+                    <a:gd name="connsiteY5" fmla="*/ 310247 h 411423"/>
+                    <a:gd name="connsiteX6" fmla="*/ 83571 w 506673"/>
+                    <a:gd name="connsiteY6" fmla="*/ 318121 h 411423"/>
+                    <a:gd name="connsiteX7" fmla="*/ 60156 w 506673"/>
+                    <a:gd name="connsiteY7" fmla="*/ 322848 h 411423"/>
+                    <a:gd name="connsiteX8" fmla="*/ 0 w 506673"/>
+                    <a:gd name="connsiteY8" fmla="*/ 262692 h 411423"/>
+                    <a:gd name="connsiteX9" fmla="*/ 60156 w 506673"/>
+                    <a:gd name="connsiteY9" fmla="*/ 202536 h 411423"/>
+                    <a:gd name="connsiteX10" fmla="*/ 83571 w 506673"/>
+                    <a:gd name="connsiteY10" fmla="*/ 207264 h 411423"/>
+                    <a:gd name="connsiteX11" fmla="*/ 95250 w 506673"/>
+                    <a:gd name="connsiteY11" fmla="*/ 215138 h 411423"/>
+                    <a:gd name="connsiteX12" fmla="*/ 95250 w 506673"/>
+                    <a:gd name="connsiteY12" fmla="*/ 45363 h 411423"/>
+                    <a:gd name="connsiteX13" fmla="*/ 140613 w 506673"/>
+                    <a:gd name="connsiteY13" fmla="*/ 0 h 411423"/>
+                    <a:gd name="connsiteX14" fmla="*/ 277493 w 506673"/>
+                    <a:gd name="connsiteY14" fmla="*/ 0 h 411423"/>
+                    <a:gd name="connsiteX15" fmla="*/ 274379 w 506673"/>
+                    <a:gd name="connsiteY15" fmla="*/ 15425 h 411423"/>
+                    <a:gd name="connsiteX16" fmla="*/ 359440 w 506673"/>
+                    <a:gd name="connsiteY16" fmla="*/ 100486 h 411423"/>
+                    <a:gd name="connsiteX17" fmla="*/ 444501 w 506673"/>
+                    <a:gd name="connsiteY17" fmla="*/ 15425 h 411423"/>
+                    <a:gd name="connsiteX18" fmla="*/ 441387 w 506673"/>
+                    <a:gd name="connsiteY18" fmla="*/ 0 h 411423"/>
+                    <a:gd name="connsiteX19" fmla="*/ 461310 w 506673"/>
+                    <a:gd name="connsiteY19" fmla="*/ 0 h 411423"/>
+                    <a:gd name="connsiteX20" fmla="*/ 506673 w 506673"/>
+                    <a:gd name="connsiteY20" fmla="*/ 45363 h 411423"/>
+                  </a:gdLst>
+                  <a:ahLst/>
+                  <a:cxnLst>
+                    <a:cxn ang="0">
+                      <a:pos x="connsiteX0" y="connsiteY0"/>
+                    </a:cxn>
+                    <a:cxn ang="0">
+                      <a:pos x="connsiteX1" y="connsiteY1"/>
+                    </a:cxn>
+                    <a:cxn ang="0">
+                      <a:pos x="connsiteX2" y="connsiteY2"/>
+                    </a:cxn>
+                    <a:cxn ang="0">
+                      <a:pos x="connsiteX3" y="connsiteY3"/>
+                    </a:cxn>
+                    <a:cxn ang="0">
+                      <a:pos x="connsiteX4" y="connsiteY4"/>
+                    </a:cxn>
+                    <a:cxn ang="0">
+                      <a:pos x="connsiteX5" y="connsiteY5"/>
+                    </a:cxn>
+                    <a:cxn ang="0">
+                      <a:pos x="connsiteX6" y="connsiteY6"/>
+                    </a:cxn>
+                    <a:cxn ang="0">
+                      <a:pos x="connsiteX7" y="connsiteY7"/>
+                    </a:cxn>
+                    <a:cxn ang="0">
+                      <a:pos x="connsiteX8" y="connsiteY8"/>
+                    </a:cxn>
+                    <a:cxn ang="0">
+                      <a:pos x="connsiteX9" y="connsiteY9"/>
+                    </a:cxn>
+                    <a:cxn ang="0">
+                      <a:pos x="connsiteX10" y="connsiteY10"/>
+                    </a:cxn>
+                    <a:cxn ang="0">
+                      <a:pos x="connsiteX11" y="connsiteY11"/>
+                    </a:cxn>
+                    <a:cxn ang="0">
+                      <a:pos x="connsiteX12" y="connsiteY12"/>
+                    </a:cxn>
+                    <a:cxn ang="0">
+                      <a:pos x="connsiteX13" y="connsiteY13"/>
+                    </a:cxn>
+                    <a:cxn ang="0">
+                      <a:pos x="connsiteX14" y="connsiteY14"/>
+                    </a:cxn>
+                    <a:cxn ang="0">
+                      <a:pos x="connsiteX15" y="connsiteY15"/>
+                    </a:cxn>
+                    <a:cxn ang="0">
+                      <a:pos x="connsiteX16" y="connsiteY16"/>
+                    </a:cxn>
+                    <a:cxn ang="0">
+                      <a:pos x="connsiteX17" y="connsiteY17"/>
+                    </a:cxn>
+                    <a:cxn ang="0">
+                      <a:pos x="connsiteX18" y="connsiteY18"/>
+                    </a:cxn>
+                    <a:cxn ang="0">
+                      <a:pos x="connsiteX19" y="connsiteY19"/>
+                    </a:cxn>
+                    <a:cxn ang="0">
+                      <a:pos x="connsiteX20" y="connsiteY20"/>
+                    </a:cxn>
+                  </a:cxnLst>
+                  <a:rect l="l" t="t" r="r" b="b"/>
+                  <a:pathLst>
+                    <a:path w="506673" h="411423">
+                      <a:moveTo>
+                        <a:pt x="506673" y="45363"/>
+                      </a:moveTo>
+                      <a:lnTo>
+                        <a:pt x="506673" y="366060"/>
+                      </a:lnTo>
+                      <a:cubicBezTo>
+                        <a:pt x="506673" y="391113"/>
+                        <a:pt x="486363" y="411423"/>
+                        <a:pt x="461310" y="411423"/>
+                      </a:cubicBezTo>
+                      <a:lnTo>
+                        <a:pt x="140613" y="411423"/>
+                      </a:lnTo>
+                      <a:cubicBezTo>
+                        <a:pt x="115560" y="411423"/>
+                        <a:pt x="95250" y="391113"/>
+                        <a:pt x="95250" y="366060"/>
+                      </a:cubicBezTo>
+                      <a:lnTo>
+                        <a:pt x="95250" y="310247"/>
+                      </a:lnTo>
+                      <a:lnTo>
+                        <a:pt x="83571" y="318121"/>
+                      </a:lnTo>
+                      <a:cubicBezTo>
+                        <a:pt x="76374" y="321165"/>
+                        <a:pt x="68462" y="322848"/>
+                        <a:pt x="60156" y="322848"/>
+                      </a:cubicBezTo>
+                      <a:cubicBezTo>
+                        <a:pt x="26933" y="322848"/>
+                        <a:pt x="0" y="295915"/>
+                        <a:pt x="0" y="262692"/>
+                      </a:cubicBezTo>
+                      <a:cubicBezTo>
+                        <a:pt x="0" y="229469"/>
+                        <a:pt x="26933" y="202536"/>
+                        <a:pt x="60156" y="202536"/>
+                      </a:cubicBezTo>
+                      <a:cubicBezTo>
+                        <a:pt x="68462" y="202536"/>
+                        <a:pt x="76374" y="204220"/>
+                        <a:pt x="83571" y="207264"/>
+                      </a:cubicBezTo>
+                      <a:lnTo>
+                        <a:pt x="95250" y="215138"/>
+                      </a:lnTo>
+                      <a:lnTo>
+                        <a:pt x="95250" y="45363"/>
+                      </a:lnTo>
+                      <a:cubicBezTo>
+                        <a:pt x="95250" y="20310"/>
+                        <a:pt x="115560" y="0"/>
+                        <a:pt x="140613" y="0"/>
+                      </a:cubicBezTo>
+                      <a:lnTo>
+                        <a:pt x="277493" y="0"/>
+                      </a:lnTo>
+                      <a:lnTo>
+                        <a:pt x="274379" y="15425"/>
+                      </a:lnTo>
+                      <a:cubicBezTo>
+                        <a:pt x="274379" y="62403"/>
+                        <a:pt x="312462" y="100486"/>
+                        <a:pt x="359440" y="100486"/>
+                      </a:cubicBezTo>
+                      <a:cubicBezTo>
+                        <a:pt x="406418" y="100486"/>
+                        <a:pt x="444501" y="62403"/>
+                        <a:pt x="444501" y="15425"/>
+                      </a:cubicBezTo>
+                      <a:lnTo>
+                        <a:pt x="441387" y="0"/>
+                      </a:lnTo>
+                      <a:lnTo>
+                        <a:pt x="461310" y="0"/>
+                      </a:lnTo>
+                      <a:cubicBezTo>
+                        <a:pt x="486363" y="0"/>
+                        <a:pt x="506673" y="20310"/>
+                        <a:pt x="506673" y="45363"/>
+                      </a:cubicBezTo>
+                      <a:close/>
+                    </a:path>
+                  </a:pathLst>
+                </a:custGeom>
+                <a:solidFill>
+                  <a:srgbClr val="92D050"/>
+                </a:solidFill>
+                <a:ln>
+                  <a:noFill/>
+                </a:ln>
+              </p:spPr>
+              <p:style>
+                <a:lnRef idx="2">
+                  <a:schemeClr val="accent1">
+                    <a:shade val="50000"/>
+                  </a:schemeClr>
+                </a:lnRef>
+                <a:fillRef idx="1">
+                  <a:schemeClr val="accent1"/>
+                </a:fillRef>
+                <a:effectRef idx="0">
+                  <a:schemeClr val="accent1"/>
+                </a:effectRef>
+                <a:fontRef idx="minor">
+                  <a:schemeClr val="lt1"/>
+                </a:fontRef>
+              </p:style>
+              <p:txBody>
+                <a:bodyPr wrap="square" rtlCol="0" anchor="ctr">
+                  <a:noAutofit/>
+                </a:bodyPr>
+                <a:lstStyle/>
+                <a:p>
+                  <a:pPr algn="ctr"/>
+                  <a:endParaRPr lang="en-US"/>
+                </a:p>
+              </p:txBody>
+            </p:sp>
+            <p:pic>
+              <p:nvPicPr>
+                <p:cNvPr id="110" name="Picture 109" descr="Shape&#10;&#10;Description automatically generated with medium confidence">
+                  <a:extLst>
+                    <a:ext uri="{FF2B5EF4-FFF2-40B4-BE49-F238E27FC236}">
+                      <a16:creationId xmlns:a16="http://schemas.microsoft.com/office/drawing/2014/main" id="{EF53972B-FFAE-4AA4-8A47-095683E8CA5F}"/>
+                    </a:ext>
+                  </a:extLst>
+                </p:cNvPr>
+                <p:cNvPicPr>
+                  <a:picLocks noChangeAspect="1"/>
+                </p:cNvPicPr>
+                <p:nvPr/>
+              </p:nvPicPr>
+              <p:blipFill>
+                <a:blip r:embed="rId5">
+                  <a:extLst>
+                    <a:ext uri="{28A0092B-C50C-407E-A947-70E740481C1C}">
+                      <a14:useLocalDpi xmlns:a14="http://schemas.microsoft.com/office/drawing/2010/main" val="0"/>
+                    </a:ext>
+                  </a:extLst>
+                </a:blip>
+                <a:stretch>
+                  <a:fillRect/>
+                </a:stretch>
+              </p:blipFill>
+              <p:spPr>
+                <a:xfrm rot="21582343">
+                  <a:off x="5111803" y="3625465"/>
+                  <a:ext cx="290443" cy="253233"/>
+                </a:xfrm>
+                <a:prstGeom prst="rect">
+                  <a:avLst/>
+                </a:prstGeom>
+              </p:spPr>
+            </p:pic>
+          </p:grpSp>
+          <p:grpSp>
+            <p:nvGrpSpPr>
+              <p:cNvPr id="100" name="Group 99">
+                <a:extLst>
+                  <a:ext uri="{FF2B5EF4-FFF2-40B4-BE49-F238E27FC236}">
+                    <a16:creationId xmlns:a16="http://schemas.microsoft.com/office/drawing/2014/main" id="{43180E15-AF0D-45A5-BEF6-EA8CCA7E60CA}"/>
+                  </a:ext>
+                </a:extLst>
+              </p:cNvPr>
+              <p:cNvGrpSpPr/>
+              <p:nvPr/>
+            </p:nvGrpSpPr>
+            <p:grpSpPr>
+              <a:xfrm>
+                <a:off x="4803373" y="4098239"/>
+                <a:ext cx="506673" cy="411423"/>
+                <a:chOff x="4803373" y="4098239"/>
+                <a:chExt cx="506673" cy="411423"/>
+              </a:xfrm>
+            </p:grpSpPr>
+            <p:sp>
+              <p:nvSpPr>
+                <p:cNvPr id="107" name="Freeform: Shape 106">
+                  <a:extLst>
+                    <a:ext uri="{FF2B5EF4-FFF2-40B4-BE49-F238E27FC236}">
+                      <a16:creationId xmlns:a16="http://schemas.microsoft.com/office/drawing/2014/main" id="{5A616491-CF45-40B3-9D2B-0DAA040A8909}"/>
+                    </a:ext>
+                  </a:extLst>
+                </p:cNvPr>
+                <p:cNvSpPr>
+                  <a:spLocks noChangeAspect="1"/>
+                </p:cNvSpPr>
+                <p:nvPr/>
+              </p:nvSpPr>
+              <p:spPr>
+                <a:xfrm>
+                  <a:off x="4803373" y="4098239"/>
+                  <a:ext cx="506673" cy="411423"/>
+                </a:xfrm>
+                <a:custGeom>
+                  <a:avLst/>
+                  <a:gdLst>
+                    <a:gd name="connsiteX0" fmla="*/ 506673 w 506673"/>
+                    <a:gd name="connsiteY0" fmla="*/ 45363 h 411423"/>
+                    <a:gd name="connsiteX1" fmla="*/ 506673 w 506673"/>
+                    <a:gd name="connsiteY1" fmla="*/ 366060 h 411423"/>
+                    <a:gd name="connsiteX2" fmla="*/ 461310 w 506673"/>
+                    <a:gd name="connsiteY2" fmla="*/ 411423 h 411423"/>
+                    <a:gd name="connsiteX3" fmla="*/ 140613 w 506673"/>
+                    <a:gd name="connsiteY3" fmla="*/ 411423 h 411423"/>
+                    <a:gd name="connsiteX4" fmla="*/ 95250 w 506673"/>
+                    <a:gd name="connsiteY4" fmla="*/ 366060 h 411423"/>
+                    <a:gd name="connsiteX5" fmla="*/ 95250 w 506673"/>
+                    <a:gd name="connsiteY5" fmla="*/ 310247 h 411423"/>
+                    <a:gd name="connsiteX6" fmla="*/ 83571 w 506673"/>
+                    <a:gd name="connsiteY6" fmla="*/ 318121 h 411423"/>
+                    <a:gd name="connsiteX7" fmla="*/ 60156 w 506673"/>
+                    <a:gd name="connsiteY7" fmla="*/ 322848 h 411423"/>
+                    <a:gd name="connsiteX8" fmla="*/ 0 w 506673"/>
+                    <a:gd name="connsiteY8" fmla="*/ 262692 h 411423"/>
+                    <a:gd name="connsiteX9" fmla="*/ 60156 w 506673"/>
+                    <a:gd name="connsiteY9" fmla="*/ 202536 h 411423"/>
+                    <a:gd name="connsiteX10" fmla="*/ 83571 w 506673"/>
+                    <a:gd name="connsiteY10" fmla="*/ 207264 h 411423"/>
+                    <a:gd name="connsiteX11" fmla="*/ 95250 w 506673"/>
+                    <a:gd name="connsiteY11" fmla="*/ 215138 h 411423"/>
+                    <a:gd name="connsiteX12" fmla="*/ 95250 w 506673"/>
+                    <a:gd name="connsiteY12" fmla="*/ 45363 h 411423"/>
+                    <a:gd name="connsiteX13" fmla="*/ 140613 w 506673"/>
+                    <a:gd name="connsiteY13" fmla="*/ 0 h 411423"/>
+                    <a:gd name="connsiteX14" fmla="*/ 277493 w 506673"/>
+                    <a:gd name="connsiteY14" fmla="*/ 0 h 411423"/>
+                    <a:gd name="connsiteX15" fmla="*/ 274379 w 506673"/>
+                    <a:gd name="connsiteY15" fmla="*/ 15425 h 411423"/>
+                    <a:gd name="connsiteX16" fmla="*/ 359440 w 506673"/>
+                    <a:gd name="connsiteY16" fmla="*/ 100486 h 411423"/>
+                    <a:gd name="connsiteX17" fmla="*/ 444501 w 506673"/>
+                    <a:gd name="connsiteY17" fmla="*/ 15425 h 411423"/>
+                    <a:gd name="connsiteX18" fmla="*/ 441387 w 506673"/>
+                    <a:gd name="connsiteY18" fmla="*/ 0 h 411423"/>
+                    <a:gd name="connsiteX19" fmla="*/ 461310 w 506673"/>
+                    <a:gd name="connsiteY19" fmla="*/ 0 h 411423"/>
+                    <a:gd name="connsiteX20" fmla="*/ 506673 w 506673"/>
+                    <a:gd name="connsiteY20" fmla="*/ 45363 h 411423"/>
+                  </a:gdLst>
+                  <a:ahLst/>
+                  <a:cxnLst>
+                    <a:cxn ang="0">
+                      <a:pos x="connsiteX0" y="connsiteY0"/>
+                    </a:cxn>
+                    <a:cxn ang="0">
+                      <a:pos x="connsiteX1" y="connsiteY1"/>
+                    </a:cxn>
+                    <a:cxn ang="0">
+                      <a:pos x="connsiteX2" y="connsiteY2"/>
+                    </a:cxn>
+                    <a:cxn ang="0">
+                      <a:pos x="connsiteX3" y="connsiteY3"/>
+                    </a:cxn>
+                    <a:cxn ang="0">
+                      <a:pos x="connsiteX4" y="connsiteY4"/>
+                    </a:cxn>
+                    <a:cxn ang="0">
+                      <a:pos x="connsiteX5" y="connsiteY5"/>
+                    </a:cxn>
+                    <a:cxn ang="0">
+                      <a:pos x="connsiteX6" y="connsiteY6"/>
+                    </a:cxn>
+                    <a:cxn ang="0">
+                      <a:pos x="connsiteX7" y="connsiteY7"/>
+                    </a:cxn>
+                    <a:cxn ang="0">
+                      <a:pos x="connsiteX8" y="connsiteY8"/>
+                    </a:cxn>
+                    <a:cxn ang="0">
+                      <a:pos x="connsiteX9" y="connsiteY9"/>
+                    </a:cxn>
+                    <a:cxn ang="0">
+                      <a:pos x="connsiteX10" y="connsiteY10"/>
+                    </a:cxn>
+                    <a:cxn ang="0">
+                      <a:pos x="connsiteX11" y="connsiteY11"/>
+                    </a:cxn>
+                    <a:cxn ang="0">
+                      <a:pos x="connsiteX12" y="connsiteY12"/>
+                    </a:cxn>
+                    <a:cxn ang="0">
+                      <a:pos x="connsiteX13" y="connsiteY13"/>
+                    </a:cxn>
+                    <a:cxn ang="0">
+                      <a:pos x="connsiteX14" y="connsiteY14"/>
+                    </a:cxn>
+                    <a:cxn ang="0">
+                      <a:pos x="connsiteX15" y="connsiteY15"/>
+                    </a:cxn>
+                    <a:cxn ang="0">
+                      <a:pos x="connsiteX16" y="connsiteY16"/>
+                    </a:cxn>
+                    <a:cxn ang="0">
+                      <a:pos x="connsiteX17" y="connsiteY17"/>
+                    </a:cxn>
+                    <a:cxn ang="0">
+                      <a:pos x="connsiteX18" y="connsiteY18"/>
+                    </a:cxn>
+                    <a:cxn ang="0">
+                      <a:pos x="connsiteX19" y="connsiteY19"/>
+                    </a:cxn>
+                    <a:cxn ang="0">
+                      <a:pos x="connsiteX20" y="connsiteY20"/>
+                    </a:cxn>
+                  </a:cxnLst>
+                  <a:rect l="l" t="t" r="r" b="b"/>
+                  <a:pathLst>
+                    <a:path w="506673" h="411423">
+                      <a:moveTo>
+                        <a:pt x="506673" y="45363"/>
+                      </a:moveTo>
+                      <a:lnTo>
+                        <a:pt x="506673" y="366060"/>
+                      </a:lnTo>
+                      <a:cubicBezTo>
+                        <a:pt x="506673" y="391113"/>
+                        <a:pt x="486363" y="411423"/>
+                        <a:pt x="461310" y="411423"/>
+                      </a:cubicBezTo>
+                      <a:lnTo>
+                        <a:pt x="140613" y="411423"/>
+                      </a:lnTo>
+                      <a:cubicBezTo>
+                        <a:pt x="115560" y="411423"/>
+                        <a:pt x="95250" y="391113"/>
+                        <a:pt x="95250" y="366060"/>
+                      </a:cubicBezTo>
+                      <a:lnTo>
+                        <a:pt x="95250" y="310247"/>
+                      </a:lnTo>
+                      <a:lnTo>
+                        <a:pt x="83571" y="318121"/>
+                      </a:lnTo>
+                      <a:cubicBezTo>
+                        <a:pt x="76374" y="321165"/>
+                        <a:pt x="68462" y="322848"/>
+                        <a:pt x="60156" y="322848"/>
+                      </a:cubicBezTo>
+                      <a:cubicBezTo>
+                        <a:pt x="26933" y="322848"/>
+                        <a:pt x="0" y="295915"/>
+                        <a:pt x="0" y="262692"/>
+                      </a:cubicBezTo>
+                      <a:cubicBezTo>
+                        <a:pt x="0" y="229469"/>
+                        <a:pt x="26933" y="202536"/>
+                        <a:pt x="60156" y="202536"/>
+                      </a:cubicBezTo>
+                      <a:cubicBezTo>
+                        <a:pt x="68462" y="202536"/>
+                        <a:pt x="76374" y="204220"/>
+                        <a:pt x="83571" y="207264"/>
+                      </a:cubicBezTo>
+                      <a:lnTo>
+                        <a:pt x="95250" y="215138"/>
+                      </a:lnTo>
+                      <a:lnTo>
+                        <a:pt x="95250" y="45363"/>
+                      </a:lnTo>
+                      <a:cubicBezTo>
+                        <a:pt x="95250" y="20310"/>
+                        <a:pt x="115560" y="0"/>
+                        <a:pt x="140613" y="0"/>
+                      </a:cubicBezTo>
+                      <a:lnTo>
+                        <a:pt x="277493" y="0"/>
+                      </a:lnTo>
+                      <a:lnTo>
+                        <a:pt x="274379" y="15425"/>
+                      </a:lnTo>
+                      <a:cubicBezTo>
+                        <a:pt x="274379" y="62403"/>
+                        <a:pt x="312462" y="100486"/>
+                        <a:pt x="359440" y="100486"/>
+                      </a:cubicBezTo>
+                      <a:cubicBezTo>
+                        <a:pt x="406418" y="100486"/>
+                        <a:pt x="444501" y="62403"/>
+                        <a:pt x="444501" y="15425"/>
+                      </a:cubicBezTo>
+                      <a:lnTo>
+                        <a:pt x="441387" y="0"/>
+                      </a:lnTo>
+                      <a:lnTo>
+                        <a:pt x="461310" y="0"/>
+                      </a:lnTo>
+                      <a:cubicBezTo>
+                        <a:pt x="486363" y="0"/>
+                        <a:pt x="506673" y="20310"/>
+                        <a:pt x="506673" y="45363"/>
+                      </a:cubicBezTo>
+                      <a:close/>
+                    </a:path>
+                  </a:pathLst>
+                </a:custGeom>
+                <a:solidFill>
+                  <a:schemeClr val="accent4"/>
+                </a:solidFill>
+                <a:ln>
+                  <a:noFill/>
+                </a:ln>
+              </p:spPr>
+              <p:style>
+                <a:lnRef idx="2">
+                  <a:schemeClr val="accent1">
+                    <a:shade val="50000"/>
+                  </a:schemeClr>
+                </a:lnRef>
+                <a:fillRef idx="1">
+                  <a:schemeClr val="accent1"/>
+                </a:fillRef>
+                <a:effectRef idx="0">
+                  <a:schemeClr val="accent1"/>
+                </a:effectRef>
+                <a:fontRef idx="minor">
+                  <a:schemeClr val="lt1"/>
+                </a:fontRef>
+              </p:style>
+              <p:txBody>
+                <a:bodyPr wrap="square" rtlCol="0" anchor="ctr">
+                  <a:noAutofit/>
+                </a:bodyPr>
+                <a:lstStyle/>
+                <a:p>
+                  <a:pPr algn="ctr"/>
+                  <a:endParaRPr lang="en-US"/>
+                </a:p>
+              </p:txBody>
+            </p:sp>
+            <p:pic>
+              <p:nvPicPr>
+                <p:cNvPr id="108" name="Picture 107" descr="A picture containing looking, dark&#10;&#10;Description automatically generated">
+                  <a:extLst>
+                    <a:ext uri="{FF2B5EF4-FFF2-40B4-BE49-F238E27FC236}">
+                      <a16:creationId xmlns:a16="http://schemas.microsoft.com/office/drawing/2014/main" id="{FF65B8AD-B5AD-4093-BDA2-B24A0F0F3495}"/>
+                    </a:ext>
+                  </a:extLst>
+                </p:cNvPr>
+                <p:cNvPicPr>
+                  <a:picLocks noChangeAspect="1"/>
+                </p:cNvPicPr>
+                <p:nvPr/>
+              </p:nvPicPr>
+              <p:blipFill>
+                <a:blip r:embed="rId4">
+                  <a:extLst>
+                    <a:ext uri="{28A0092B-C50C-407E-A947-70E740481C1C}">
+                      <a14:useLocalDpi xmlns:a14="http://schemas.microsoft.com/office/drawing/2010/main" val="0"/>
+                    </a:ext>
+                  </a:extLst>
+                </a:blip>
+                <a:stretch>
+                  <a:fillRect/>
+                </a:stretch>
+              </p:blipFill>
+              <p:spPr>
+                <a:xfrm rot="19063852">
+                  <a:off x="4930991" y="4244038"/>
+                  <a:ext cx="323982" cy="167197"/>
+                </a:xfrm>
+                <a:prstGeom prst="rect">
+                  <a:avLst/>
+                </a:prstGeom>
+              </p:spPr>
+            </p:pic>
+          </p:grpSp>
+          <p:grpSp>
+            <p:nvGrpSpPr>
+              <p:cNvPr id="101" name="Group 100">
+                <a:extLst>
+                  <a:ext uri="{FF2B5EF4-FFF2-40B4-BE49-F238E27FC236}">
+                    <a16:creationId xmlns:a16="http://schemas.microsoft.com/office/drawing/2014/main" id="{43DE2CDF-4588-4CE5-A360-5986D7CF278C}"/>
+                  </a:ext>
+                </a:extLst>
+              </p:cNvPr>
+              <p:cNvGrpSpPr/>
+              <p:nvPr/>
+            </p:nvGrpSpPr>
+            <p:grpSpPr>
+              <a:xfrm>
+                <a:off x="4463648" y="4002989"/>
+                <a:ext cx="411423" cy="506673"/>
+                <a:chOff x="4463648" y="4002989"/>
+                <a:chExt cx="411423" cy="506673"/>
+              </a:xfrm>
+            </p:grpSpPr>
+            <p:sp>
+              <p:nvSpPr>
+                <p:cNvPr id="105" name="Freeform: Shape 104">
+                  <a:extLst>
+                    <a:ext uri="{FF2B5EF4-FFF2-40B4-BE49-F238E27FC236}">
+                      <a16:creationId xmlns:a16="http://schemas.microsoft.com/office/drawing/2014/main" id="{4DAA47DA-28CD-4D06-96E9-15CD2E0E8E49}"/>
+                    </a:ext>
+                  </a:extLst>
+                </p:cNvPr>
+                <p:cNvSpPr>
+                  <a:spLocks noChangeAspect="1"/>
+                </p:cNvSpPr>
+                <p:nvPr/>
+              </p:nvSpPr>
+              <p:spPr>
+                <a:xfrm rot="5400000">
+                  <a:off x="4416023" y="4050614"/>
+                  <a:ext cx="506673" cy="411423"/>
+                </a:xfrm>
+                <a:custGeom>
+                  <a:avLst/>
+                  <a:gdLst>
+                    <a:gd name="connsiteX0" fmla="*/ 506673 w 506673"/>
+                    <a:gd name="connsiteY0" fmla="*/ 45363 h 411423"/>
+                    <a:gd name="connsiteX1" fmla="*/ 506673 w 506673"/>
+                    <a:gd name="connsiteY1" fmla="*/ 366060 h 411423"/>
+                    <a:gd name="connsiteX2" fmla="*/ 461310 w 506673"/>
+                    <a:gd name="connsiteY2" fmla="*/ 411423 h 411423"/>
+                    <a:gd name="connsiteX3" fmla="*/ 140613 w 506673"/>
+                    <a:gd name="connsiteY3" fmla="*/ 411423 h 411423"/>
+                    <a:gd name="connsiteX4" fmla="*/ 95250 w 506673"/>
+                    <a:gd name="connsiteY4" fmla="*/ 366060 h 411423"/>
+                    <a:gd name="connsiteX5" fmla="*/ 95250 w 506673"/>
+                    <a:gd name="connsiteY5" fmla="*/ 310247 h 411423"/>
+                    <a:gd name="connsiteX6" fmla="*/ 83571 w 506673"/>
+                    <a:gd name="connsiteY6" fmla="*/ 318121 h 411423"/>
+                    <a:gd name="connsiteX7" fmla="*/ 60156 w 506673"/>
+                    <a:gd name="connsiteY7" fmla="*/ 322848 h 411423"/>
+                    <a:gd name="connsiteX8" fmla="*/ 0 w 506673"/>
+                    <a:gd name="connsiteY8" fmla="*/ 262692 h 411423"/>
+                    <a:gd name="connsiteX9" fmla="*/ 60156 w 506673"/>
+                    <a:gd name="connsiteY9" fmla="*/ 202536 h 411423"/>
+                    <a:gd name="connsiteX10" fmla="*/ 83571 w 506673"/>
+                    <a:gd name="connsiteY10" fmla="*/ 207264 h 411423"/>
+                    <a:gd name="connsiteX11" fmla="*/ 95250 w 506673"/>
+                    <a:gd name="connsiteY11" fmla="*/ 215138 h 411423"/>
+                    <a:gd name="connsiteX12" fmla="*/ 95250 w 506673"/>
+                    <a:gd name="connsiteY12" fmla="*/ 45363 h 411423"/>
+                    <a:gd name="connsiteX13" fmla="*/ 140613 w 506673"/>
+                    <a:gd name="connsiteY13" fmla="*/ 0 h 411423"/>
+                    <a:gd name="connsiteX14" fmla="*/ 277493 w 506673"/>
+                    <a:gd name="connsiteY14" fmla="*/ 0 h 411423"/>
+                    <a:gd name="connsiteX15" fmla="*/ 274379 w 506673"/>
+                    <a:gd name="connsiteY15" fmla="*/ 15425 h 411423"/>
+                    <a:gd name="connsiteX16" fmla="*/ 359440 w 506673"/>
+                    <a:gd name="connsiteY16" fmla="*/ 100486 h 411423"/>
+                    <a:gd name="connsiteX17" fmla="*/ 444501 w 506673"/>
+                    <a:gd name="connsiteY17" fmla="*/ 15425 h 411423"/>
+                    <a:gd name="connsiteX18" fmla="*/ 441387 w 506673"/>
+                    <a:gd name="connsiteY18" fmla="*/ 0 h 411423"/>
+                    <a:gd name="connsiteX19" fmla="*/ 461310 w 506673"/>
+                    <a:gd name="connsiteY19" fmla="*/ 0 h 411423"/>
+                    <a:gd name="connsiteX20" fmla="*/ 506673 w 506673"/>
+                    <a:gd name="connsiteY20" fmla="*/ 45363 h 411423"/>
+                  </a:gdLst>
+                  <a:ahLst/>
+                  <a:cxnLst>
+                    <a:cxn ang="0">
+                      <a:pos x="connsiteX0" y="connsiteY0"/>
+                    </a:cxn>
+                    <a:cxn ang="0">
+                      <a:pos x="connsiteX1" y="connsiteY1"/>
+                    </a:cxn>
+                    <a:cxn ang="0">
+                      <a:pos x="connsiteX2" y="connsiteY2"/>
+                    </a:cxn>
+                    <a:cxn ang="0">
+                      <a:pos x="connsiteX3" y="connsiteY3"/>
+                    </a:cxn>
+                    <a:cxn ang="0">
+                      <a:pos x="connsiteX4" y="connsiteY4"/>
+                    </a:cxn>
+                    <a:cxn ang="0">
+                      <a:pos x="connsiteX5" y="connsiteY5"/>
+                    </a:cxn>
+                    <a:cxn ang="0">
+                      <a:pos x="connsiteX6" y="connsiteY6"/>
+                    </a:cxn>
+                    <a:cxn ang="0">
+                      <a:pos x="connsiteX7" y="connsiteY7"/>
+                    </a:cxn>
+                    <a:cxn ang="0">
+                      <a:pos x="connsiteX8" y="connsiteY8"/>
+                    </a:cxn>
+                    <a:cxn ang="0">
+                      <a:pos x="connsiteX9" y="connsiteY9"/>
+                    </a:cxn>
+                    <a:cxn ang="0">
+                      <a:pos x="connsiteX10" y="connsiteY10"/>
+                    </a:cxn>
+                    <a:cxn ang="0">
+                      <a:pos x="connsiteX11" y="connsiteY11"/>
+                    </a:cxn>
+                    <a:cxn ang="0">
+                      <a:pos x="connsiteX12" y="connsiteY12"/>
+                    </a:cxn>
+                    <a:cxn ang="0">
+                      <a:pos x="connsiteX13" y="connsiteY13"/>
+                    </a:cxn>
+                    <a:cxn ang="0">
+                      <a:pos x="connsiteX14" y="connsiteY14"/>
+                    </a:cxn>
+                    <a:cxn ang="0">
+                      <a:pos x="connsiteX15" y="connsiteY15"/>
+                    </a:cxn>
+                    <a:cxn ang="0">
+                      <a:pos x="connsiteX16" y="connsiteY16"/>
+                    </a:cxn>
+                    <a:cxn ang="0">
+                      <a:pos x="connsiteX17" y="connsiteY17"/>
+                    </a:cxn>
+                    <a:cxn ang="0">
+                      <a:pos x="connsiteX18" y="connsiteY18"/>
+                    </a:cxn>
+                    <a:cxn ang="0">
+                      <a:pos x="connsiteX19" y="connsiteY19"/>
+                    </a:cxn>
+                    <a:cxn ang="0">
+                      <a:pos x="connsiteX20" y="connsiteY20"/>
+                    </a:cxn>
+                  </a:cxnLst>
+                  <a:rect l="l" t="t" r="r" b="b"/>
+                  <a:pathLst>
+                    <a:path w="506673" h="411423">
+                      <a:moveTo>
+                        <a:pt x="506673" y="45363"/>
+                      </a:moveTo>
+                      <a:lnTo>
+                        <a:pt x="506673" y="366060"/>
+                      </a:lnTo>
+                      <a:cubicBezTo>
+                        <a:pt x="506673" y="391113"/>
+                        <a:pt x="486363" y="411423"/>
+                        <a:pt x="461310" y="411423"/>
+                      </a:cubicBezTo>
+                      <a:lnTo>
+                        <a:pt x="140613" y="411423"/>
+                      </a:lnTo>
+                      <a:cubicBezTo>
+                        <a:pt x="115560" y="411423"/>
+                        <a:pt x="95250" y="391113"/>
+                        <a:pt x="95250" y="366060"/>
+                      </a:cubicBezTo>
+                      <a:lnTo>
+                        <a:pt x="95250" y="310247"/>
+                      </a:lnTo>
+                      <a:lnTo>
+                        <a:pt x="83571" y="318121"/>
+                      </a:lnTo>
+                      <a:cubicBezTo>
+                        <a:pt x="76374" y="321165"/>
+                        <a:pt x="68462" y="322848"/>
+                        <a:pt x="60156" y="322848"/>
+                      </a:cubicBezTo>
+                      <a:cubicBezTo>
+                        <a:pt x="26933" y="322848"/>
+                        <a:pt x="0" y="295915"/>
+                        <a:pt x="0" y="262692"/>
+                      </a:cubicBezTo>
+                      <a:cubicBezTo>
+                        <a:pt x="0" y="229469"/>
+                        <a:pt x="26933" y="202536"/>
+                        <a:pt x="60156" y="202536"/>
+                      </a:cubicBezTo>
+                      <a:cubicBezTo>
+                        <a:pt x="68462" y="202536"/>
+                        <a:pt x="76374" y="204220"/>
+                        <a:pt x="83571" y="207264"/>
+                      </a:cubicBezTo>
+                      <a:lnTo>
+                        <a:pt x="95250" y="215138"/>
+                      </a:lnTo>
+                      <a:lnTo>
+                        <a:pt x="95250" y="45363"/>
+                      </a:lnTo>
+                      <a:cubicBezTo>
+                        <a:pt x="95250" y="20310"/>
+                        <a:pt x="115560" y="0"/>
+                        <a:pt x="140613" y="0"/>
+                      </a:cubicBezTo>
+                      <a:lnTo>
+                        <a:pt x="277493" y="0"/>
+                      </a:lnTo>
+                      <a:lnTo>
+                        <a:pt x="274379" y="15425"/>
+                      </a:lnTo>
+                      <a:cubicBezTo>
+                        <a:pt x="274379" y="62403"/>
+                        <a:pt x="312462" y="100486"/>
+                        <a:pt x="359440" y="100486"/>
+                      </a:cubicBezTo>
+                      <a:cubicBezTo>
+                        <a:pt x="406418" y="100486"/>
+                        <a:pt x="444501" y="62403"/>
+                        <a:pt x="444501" y="15425"/>
+                      </a:cubicBezTo>
+                      <a:lnTo>
+                        <a:pt x="441387" y="0"/>
+                      </a:lnTo>
+                      <a:lnTo>
+                        <a:pt x="461310" y="0"/>
+                      </a:lnTo>
+                      <a:cubicBezTo>
+                        <a:pt x="486363" y="0"/>
+                        <a:pt x="506673" y="20310"/>
+                        <a:pt x="506673" y="45363"/>
+                      </a:cubicBezTo>
+                      <a:close/>
+                    </a:path>
+                  </a:pathLst>
+                </a:custGeom>
+                <a:solidFill>
+                  <a:srgbClr val="3399FF"/>
+                </a:solidFill>
+                <a:ln>
+                  <a:noFill/>
+                </a:ln>
+              </p:spPr>
+              <p:style>
+                <a:lnRef idx="2">
+                  <a:schemeClr val="accent1">
+                    <a:shade val="50000"/>
+                  </a:schemeClr>
+                </a:lnRef>
+                <a:fillRef idx="1">
+                  <a:schemeClr val="accent1"/>
+                </a:fillRef>
+                <a:effectRef idx="0">
+                  <a:schemeClr val="accent1"/>
+                </a:effectRef>
+                <a:fontRef idx="minor">
+                  <a:schemeClr val="lt1"/>
+                </a:fontRef>
+              </p:style>
+              <p:txBody>
+                <a:bodyPr wrap="square" rtlCol="0" anchor="ctr">
+                  <a:noAutofit/>
+                </a:bodyPr>
+                <a:lstStyle/>
+                <a:p>
+                  <a:pPr algn="ctr"/>
+                  <a:endParaRPr lang="en-US"/>
+                </a:p>
+              </p:txBody>
+            </p:sp>
+            <p:pic>
+              <p:nvPicPr>
+                <p:cNvPr id="106" name="Picture 105" descr="A black rectangle with a black background&#10;&#10;Description automatically generated with low confidence">
+                  <a:extLst>
+                    <a:ext uri="{FF2B5EF4-FFF2-40B4-BE49-F238E27FC236}">
+                      <a16:creationId xmlns:a16="http://schemas.microsoft.com/office/drawing/2014/main" id="{48AE7624-6B10-4F7C-ADE1-A919BC7CC552}"/>
+                    </a:ext>
+                  </a:extLst>
+                </p:cNvPr>
+                <p:cNvPicPr>
+                  <a:picLocks noChangeAspect="1"/>
+                </p:cNvPicPr>
+                <p:nvPr/>
+              </p:nvPicPr>
+              <p:blipFill>
+                <a:blip r:embed="rId3">
+                  <a:extLst>
+                    <a:ext uri="{28A0092B-C50C-407E-A947-70E740481C1C}">
+                      <a14:useLocalDpi xmlns:a14="http://schemas.microsoft.com/office/drawing/2010/main" val="0"/>
+                    </a:ext>
+                  </a:extLst>
+                </a:blip>
+                <a:stretch>
+                  <a:fillRect/>
+                </a:stretch>
+              </p:blipFill>
+              <p:spPr>
+                <a:xfrm>
+                  <a:off x="4483625" y="4140358"/>
+                  <a:ext cx="303301" cy="303902"/>
+                </a:xfrm>
+                <a:prstGeom prst="rect">
+                  <a:avLst/>
+                </a:prstGeom>
+              </p:spPr>
+            </p:pic>
+          </p:grpSp>
+          <p:grpSp>
+            <p:nvGrpSpPr>
+              <p:cNvPr id="102" name="Group 101">
+                <a:extLst>
+                  <a:ext uri="{FF2B5EF4-FFF2-40B4-BE49-F238E27FC236}">
+                    <a16:creationId xmlns:a16="http://schemas.microsoft.com/office/drawing/2014/main" id="{FB4E3961-9210-4944-91C4-4AFF022200DF}"/>
+                  </a:ext>
+                </a:extLst>
+              </p:cNvPr>
+              <p:cNvGrpSpPr/>
+              <p:nvPr/>
+            </p:nvGrpSpPr>
+            <p:grpSpPr>
+              <a:xfrm>
+                <a:off x="4463648" y="3663533"/>
+                <a:ext cx="506673" cy="411423"/>
+                <a:chOff x="4463648" y="3663533"/>
+                <a:chExt cx="506673" cy="411423"/>
+              </a:xfrm>
+            </p:grpSpPr>
+            <p:sp>
+              <p:nvSpPr>
+                <p:cNvPr id="103" name="Freeform: Shape 102">
+                  <a:extLst>
+                    <a:ext uri="{FF2B5EF4-FFF2-40B4-BE49-F238E27FC236}">
+                      <a16:creationId xmlns:a16="http://schemas.microsoft.com/office/drawing/2014/main" id="{3BEAE887-D749-4CB5-B630-35F4D20B82F8}"/>
+                    </a:ext>
+                  </a:extLst>
+                </p:cNvPr>
+                <p:cNvSpPr>
+                  <a:spLocks noChangeAspect="1"/>
+                </p:cNvSpPr>
+                <p:nvPr/>
+              </p:nvSpPr>
+              <p:spPr>
+                <a:xfrm rot="10800000">
+                  <a:off x="4463648" y="3663533"/>
+                  <a:ext cx="506673" cy="411423"/>
+                </a:xfrm>
+                <a:custGeom>
+                  <a:avLst/>
+                  <a:gdLst>
+                    <a:gd name="connsiteX0" fmla="*/ 506673 w 506673"/>
+                    <a:gd name="connsiteY0" fmla="*/ 45363 h 411423"/>
+                    <a:gd name="connsiteX1" fmla="*/ 506673 w 506673"/>
+                    <a:gd name="connsiteY1" fmla="*/ 366060 h 411423"/>
+                    <a:gd name="connsiteX2" fmla="*/ 461310 w 506673"/>
+                    <a:gd name="connsiteY2" fmla="*/ 411423 h 411423"/>
+                    <a:gd name="connsiteX3" fmla="*/ 140613 w 506673"/>
+                    <a:gd name="connsiteY3" fmla="*/ 411423 h 411423"/>
+                    <a:gd name="connsiteX4" fmla="*/ 95250 w 506673"/>
+                    <a:gd name="connsiteY4" fmla="*/ 366060 h 411423"/>
+                    <a:gd name="connsiteX5" fmla="*/ 95250 w 506673"/>
+                    <a:gd name="connsiteY5" fmla="*/ 310247 h 411423"/>
+                    <a:gd name="connsiteX6" fmla="*/ 83571 w 506673"/>
+                    <a:gd name="connsiteY6" fmla="*/ 318121 h 411423"/>
+                    <a:gd name="connsiteX7" fmla="*/ 60156 w 506673"/>
+                    <a:gd name="connsiteY7" fmla="*/ 322848 h 411423"/>
+                    <a:gd name="connsiteX8" fmla="*/ 0 w 506673"/>
+                    <a:gd name="connsiteY8" fmla="*/ 262692 h 411423"/>
+                    <a:gd name="connsiteX9" fmla="*/ 60156 w 506673"/>
+                    <a:gd name="connsiteY9" fmla="*/ 202536 h 411423"/>
+                    <a:gd name="connsiteX10" fmla="*/ 83571 w 506673"/>
+                    <a:gd name="connsiteY10" fmla="*/ 207264 h 411423"/>
+                    <a:gd name="connsiteX11" fmla="*/ 95250 w 506673"/>
+                    <a:gd name="connsiteY11" fmla="*/ 215138 h 411423"/>
+                    <a:gd name="connsiteX12" fmla="*/ 95250 w 506673"/>
+                    <a:gd name="connsiteY12" fmla="*/ 45363 h 411423"/>
+                    <a:gd name="connsiteX13" fmla="*/ 140613 w 506673"/>
+                    <a:gd name="connsiteY13" fmla="*/ 0 h 411423"/>
+                    <a:gd name="connsiteX14" fmla="*/ 277493 w 506673"/>
+                    <a:gd name="connsiteY14" fmla="*/ 0 h 411423"/>
+                    <a:gd name="connsiteX15" fmla="*/ 274379 w 506673"/>
+                    <a:gd name="connsiteY15" fmla="*/ 15425 h 411423"/>
+                    <a:gd name="connsiteX16" fmla="*/ 359440 w 506673"/>
+                    <a:gd name="connsiteY16" fmla="*/ 100486 h 411423"/>
+                    <a:gd name="connsiteX17" fmla="*/ 444501 w 506673"/>
+                    <a:gd name="connsiteY17" fmla="*/ 15425 h 411423"/>
+                    <a:gd name="connsiteX18" fmla="*/ 441387 w 506673"/>
+                    <a:gd name="connsiteY18" fmla="*/ 0 h 411423"/>
+                    <a:gd name="connsiteX19" fmla="*/ 461310 w 506673"/>
+                    <a:gd name="connsiteY19" fmla="*/ 0 h 411423"/>
+                    <a:gd name="connsiteX20" fmla="*/ 506673 w 506673"/>
+                    <a:gd name="connsiteY20" fmla="*/ 45363 h 411423"/>
+                  </a:gdLst>
+                  <a:ahLst/>
+                  <a:cxnLst>
+                    <a:cxn ang="0">
+                      <a:pos x="connsiteX0" y="connsiteY0"/>
+                    </a:cxn>
+                    <a:cxn ang="0">
+                      <a:pos x="connsiteX1" y="connsiteY1"/>
+                    </a:cxn>
+                    <a:cxn ang="0">
+                      <a:pos x="connsiteX2" y="connsiteY2"/>
+                    </a:cxn>
+                    <a:cxn ang="0">
+                      <a:pos x="connsiteX3" y="connsiteY3"/>
+                    </a:cxn>
+                    <a:cxn ang="0">
+                      <a:pos x="connsiteX4" y="connsiteY4"/>
+                    </a:cxn>
+                    <a:cxn ang="0">
+                      <a:pos x="connsiteX5" y="connsiteY5"/>
+                    </a:cxn>
+                    <a:cxn ang="0">
+                      <a:pos x="connsiteX6" y="connsiteY6"/>
+                    </a:cxn>
+                    <a:cxn ang="0">
+                      <a:pos x="connsiteX7" y="connsiteY7"/>
+                    </a:cxn>
+                    <a:cxn ang="0">
+                      <a:pos x="connsiteX8" y="connsiteY8"/>
+                    </a:cxn>
+                    <a:cxn ang="0">
+                      <a:pos x="connsiteX9" y="connsiteY9"/>
+                    </a:cxn>
+                    <a:cxn ang="0">
+                      <a:pos x="connsiteX10" y="connsiteY10"/>
+                    </a:cxn>
+                    <a:cxn ang="0">
+                      <a:pos x="connsiteX11" y="connsiteY11"/>
+                    </a:cxn>
+                    <a:cxn ang="0">
+                      <a:pos x="connsiteX12" y="connsiteY12"/>
+                    </a:cxn>
+                    <a:cxn ang="0">
+                      <a:pos x="connsiteX13" y="connsiteY13"/>
+                    </a:cxn>
+                    <a:cxn ang="0">
+                      <a:pos x="connsiteX14" y="connsiteY14"/>
+                    </a:cxn>
+                    <a:cxn ang="0">
+                      <a:pos x="connsiteX15" y="connsiteY15"/>
+                    </a:cxn>
+                    <a:cxn ang="0">
+                      <a:pos x="connsiteX16" y="connsiteY16"/>
+                    </a:cxn>
+                    <a:cxn ang="0">
+                      <a:pos x="connsiteX17" y="connsiteY17"/>
+                    </a:cxn>
+                    <a:cxn ang="0">
+                      <a:pos x="connsiteX18" y="connsiteY18"/>
+                    </a:cxn>
+                    <a:cxn ang="0">
+                      <a:pos x="connsiteX19" y="connsiteY19"/>
+                    </a:cxn>
+                    <a:cxn ang="0">
+                      <a:pos x="connsiteX20" y="connsiteY20"/>
+                    </a:cxn>
+                  </a:cxnLst>
+                  <a:rect l="l" t="t" r="r" b="b"/>
+                  <a:pathLst>
+                    <a:path w="506673" h="411423">
+                      <a:moveTo>
+                        <a:pt x="506673" y="45363"/>
+                      </a:moveTo>
+                      <a:lnTo>
+                        <a:pt x="506673" y="366060"/>
+                      </a:lnTo>
+                      <a:cubicBezTo>
+                        <a:pt x="506673" y="391113"/>
+                        <a:pt x="486363" y="411423"/>
+                        <a:pt x="461310" y="411423"/>
+                      </a:cubicBezTo>
+                      <a:lnTo>
+                        <a:pt x="140613" y="411423"/>
+                      </a:lnTo>
+                      <a:cubicBezTo>
+                        <a:pt x="115560" y="411423"/>
+                        <a:pt x="95250" y="391113"/>
+                        <a:pt x="95250" y="366060"/>
+                      </a:cubicBezTo>
+                      <a:lnTo>
+                        <a:pt x="95250" y="310247"/>
+                      </a:lnTo>
+                      <a:lnTo>
+                        <a:pt x="83571" y="318121"/>
+                      </a:lnTo>
+                      <a:cubicBezTo>
+                        <a:pt x="76374" y="321165"/>
+                        <a:pt x="68462" y="322848"/>
+                        <a:pt x="60156" y="322848"/>
+                      </a:cubicBezTo>
+                      <a:cubicBezTo>
+                        <a:pt x="26933" y="322848"/>
+                        <a:pt x="0" y="295915"/>
+                        <a:pt x="0" y="262692"/>
+                      </a:cubicBezTo>
+                      <a:cubicBezTo>
+                        <a:pt x="0" y="229469"/>
+                        <a:pt x="26933" y="202536"/>
+                        <a:pt x="60156" y="202536"/>
+                      </a:cubicBezTo>
+                      <a:cubicBezTo>
+                        <a:pt x="68462" y="202536"/>
+                        <a:pt x="76374" y="204220"/>
+                        <a:pt x="83571" y="207264"/>
+                      </a:cubicBezTo>
+                      <a:lnTo>
+                        <a:pt x="95250" y="215138"/>
+                      </a:lnTo>
+                      <a:lnTo>
+                        <a:pt x="95250" y="45363"/>
+                      </a:lnTo>
+                      <a:cubicBezTo>
+                        <a:pt x="95250" y="20310"/>
+                        <a:pt x="115560" y="0"/>
+                        <a:pt x="140613" y="0"/>
+                      </a:cubicBezTo>
+                      <a:lnTo>
+                        <a:pt x="277493" y="0"/>
+                      </a:lnTo>
+                      <a:lnTo>
+                        <a:pt x="274379" y="15425"/>
+                      </a:lnTo>
+                      <a:cubicBezTo>
+                        <a:pt x="274379" y="62403"/>
+                        <a:pt x="312462" y="100486"/>
+                        <a:pt x="359440" y="100486"/>
+                      </a:cubicBezTo>
+                      <a:cubicBezTo>
+                        <a:pt x="406418" y="100486"/>
+                        <a:pt x="444501" y="62403"/>
+                        <a:pt x="444501" y="15425"/>
+                      </a:cubicBezTo>
+                      <a:lnTo>
+                        <a:pt x="441387" y="0"/>
+                      </a:lnTo>
+                      <a:lnTo>
+                        <a:pt x="461310" y="0"/>
+                      </a:lnTo>
+                      <a:cubicBezTo>
+                        <a:pt x="486363" y="0"/>
+                        <a:pt x="506673" y="20310"/>
+                        <a:pt x="506673" y="45363"/>
+                      </a:cubicBezTo>
+                      <a:close/>
+                    </a:path>
+                  </a:pathLst>
+                </a:custGeom>
+                <a:solidFill>
+                  <a:srgbClr val="FF3399"/>
+                </a:solidFill>
+                <a:ln>
+                  <a:noFill/>
+                </a:ln>
+              </p:spPr>
+              <p:style>
+                <a:lnRef idx="2">
+                  <a:schemeClr val="accent1">
+                    <a:shade val="50000"/>
+                  </a:schemeClr>
+                </a:lnRef>
+                <a:fillRef idx="1">
+                  <a:schemeClr val="accent1"/>
+                </a:fillRef>
+                <a:effectRef idx="0">
+                  <a:schemeClr val="accent1"/>
+                </a:effectRef>
+                <a:fontRef idx="minor">
+                  <a:schemeClr val="lt1"/>
+                </a:fontRef>
+              </p:style>
+              <p:txBody>
+                <a:bodyPr wrap="square" rtlCol="0" anchor="ctr">
+                  <a:noAutofit/>
+                </a:bodyPr>
+                <a:lstStyle/>
+                <a:p>
+                  <a:pPr algn="ctr"/>
+                  <a:endParaRPr lang="en-US"/>
+                </a:p>
+              </p:txBody>
+            </p:sp>
+            <p:pic>
+              <p:nvPicPr>
+                <p:cNvPr id="104" name="Picture 103" descr="A picture containing night sky&#10;&#10;Description automatically generated">
+                  <a:extLst>
+                    <a:ext uri="{FF2B5EF4-FFF2-40B4-BE49-F238E27FC236}">
+                      <a16:creationId xmlns:a16="http://schemas.microsoft.com/office/drawing/2014/main" id="{685C376C-E0BA-4639-A3EC-8897766F3EF4}"/>
+                    </a:ext>
+                  </a:extLst>
+                </p:cNvPr>
+                <p:cNvPicPr>
+                  <a:picLocks noChangeAspect="1"/>
+                </p:cNvPicPr>
+                <p:nvPr/>
+              </p:nvPicPr>
+              <p:blipFill>
+                <a:blip r:embed="rId2">
+                  <a:extLst>
+                    <a:ext uri="{28A0092B-C50C-407E-A947-70E740481C1C}">
+                      <a14:useLocalDpi xmlns:a14="http://schemas.microsoft.com/office/drawing/2010/main" val="0"/>
+                    </a:ext>
+                  </a:extLst>
+                </a:blip>
+                <a:stretch>
+                  <a:fillRect/>
+                </a:stretch>
+              </p:blipFill>
+              <p:spPr>
+                <a:xfrm flipH="1">
+                  <a:off x="4531795" y="3692954"/>
+                  <a:ext cx="262895" cy="273138"/>
+                </a:xfrm>
+                <a:prstGeom prst="rect">
+                  <a:avLst/>
+                </a:prstGeom>
+                <a:noFill/>
+                <a:ln>
+                  <a:noFill/>
+                </a:ln>
+              </p:spPr>
+            </p:pic>
+          </p:grpSp>
+        </p:grpSp>
+        <p:sp>
+          <p:nvSpPr>
+            <p:cNvPr id="111" name="Rectangle 110">
+              <a:extLst>
+                <a:ext uri="{FF2B5EF4-FFF2-40B4-BE49-F238E27FC236}">
+                  <a16:creationId xmlns:a16="http://schemas.microsoft.com/office/drawing/2014/main" id="{0670D4CB-D270-4055-A1F9-7EC0EF3945E4}"/>
+                </a:ext>
+              </a:extLst>
+            </p:cNvPr>
+            <p:cNvSpPr/>
+            <p:nvPr/>
+          </p:nvSpPr>
+          <p:spPr>
+            <a:xfrm>
+              <a:off x="6307764" y="5709516"/>
+              <a:ext cx="1898179" cy="338554"/>
+            </a:xfrm>
+            <a:prstGeom prst="rect">
+              <a:avLst/>
+            </a:prstGeom>
+          </p:spPr>
+          <p:txBody>
+            <a:bodyPr wrap="square">
+              <a:spAutoFit/>
+            </a:bodyPr>
+            <a:lstStyle/>
+            <a:p>
+              <a:pPr algn="ctr"/>
+              <a:r>
+                <a:rPr lang="en-US" sz="1600" b="1" dirty="0">
+                  <a:solidFill>
+                    <a:srgbClr val="FF3399"/>
+                  </a:solidFill>
+                  <a:latin typeface="Verdana" panose="020B0604030504040204" pitchFamily="34" charset="0"/>
+                </a:rPr>
+                <a:t>BR</a:t>
+              </a:r>
+              <a:r>
+                <a:rPr lang="en-US" sz="1600" b="1" i="1" dirty="0">
+                  <a:solidFill>
+                    <a:schemeClr val="bg1"/>
+                  </a:solidFill>
+                  <a:highlight>
+                    <a:srgbClr val="FF3399"/>
+                  </a:highlight>
+                  <a:latin typeface="Verdana" panose="020B0604030504040204" pitchFamily="34" charset="0"/>
+                </a:rPr>
+                <a:t>A</a:t>
+              </a:r>
+              <a:r>
+                <a:rPr lang="en-US" sz="1600" b="1" dirty="0">
+                  <a:solidFill>
+                    <a:schemeClr val="bg1"/>
+                  </a:solidFill>
+                  <a:highlight>
+                    <a:srgbClr val="FF3399"/>
+                  </a:highlight>
+                  <a:latin typeface="Verdana" panose="020B0604030504040204" pitchFamily="34" charset="0"/>
+                </a:rPr>
+                <a:t>I</a:t>
+              </a:r>
+              <a:r>
+                <a:rPr lang="en-US" sz="1600" b="1" dirty="0">
+                  <a:solidFill>
+                    <a:srgbClr val="FF3399"/>
+                  </a:solidFill>
+                  <a:latin typeface="Verdana" panose="020B0604030504040204" pitchFamily="34" charset="0"/>
+                </a:rPr>
+                <a:t>N</a:t>
+              </a:r>
+              <a:r>
+                <a:rPr lang="en-US" sz="1600" b="1" dirty="0">
+                  <a:solidFill>
+                    <a:srgbClr val="000000"/>
+                  </a:solidFill>
+                  <a:latin typeface="Verdana" panose="020B0604030504040204" pitchFamily="34" charset="0"/>
+                </a:rPr>
+                <a:t> </a:t>
+              </a:r>
+              <a:r>
+                <a:rPr lang="en-US" sz="1600" b="1" i="1" dirty="0" err="1">
+                  <a:solidFill>
+                    <a:srgbClr val="3399FF"/>
+                  </a:solidFill>
+                  <a:latin typeface="Verdana" panose="020B0604030504040204" pitchFamily="34" charset="0"/>
+                </a:rPr>
+                <a:t>Re</a:t>
+              </a:r>
+              <a:r>
+                <a:rPr lang="en-US" sz="1600" b="1" dirty="0" err="1">
+                  <a:solidFill>
+                    <a:srgbClr val="3399FF"/>
+                  </a:solidFill>
+                  <a:latin typeface="Verdana" panose="020B0604030504040204" pitchFamily="34" charset="0"/>
+                </a:rPr>
+                <a:t>P</a:t>
+              </a:r>
+              <a:r>
+                <a:rPr lang="en-US" sz="1600" b="1" i="1" dirty="0" err="1">
+                  <a:solidFill>
+                    <a:schemeClr val="bg1"/>
+                  </a:solidFill>
+                  <a:highlight>
+                    <a:srgbClr val="3399FF"/>
+                  </a:highlight>
+                  <a:latin typeface="Verdana" panose="020B0604030504040204" pitchFamily="34" charset="0"/>
+                </a:rPr>
+                <a:t>A</a:t>
+              </a:r>
+              <a:r>
+                <a:rPr lang="en-US" sz="1600" b="1" dirty="0" err="1">
+                  <a:solidFill>
+                    <a:schemeClr val="bg1"/>
+                  </a:solidFill>
+                  <a:highlight>
+                    <a:srgbClr val="3399FF"/>
+                  </a:highlight>
+                  <a:latin typeface="Verdana" panose="020B0604030504040204" pitchFamily="34" charset="0"/>
+                </a:rPr>
+                <a:t>I</a:t>
+              </a:r>
+              <a:r>
+                <a:rPr lang="en-US" sz="1600" b="1" dirty="0" err="1">
+                  <a:solidFill>
+                    <a:srgbClr val="3399FF"/>
+                  </a:solidFill>
+                  <a:latin typeface="Verdana" panose="020B0604030504040204" pitchFamily="34" charset="0"/>
+                </a:rPr>
+                <a:t>R</a:t>
+              </a:r>
+              <a:endParaRPr lang="en-US" sz="1600" dirty="0">
+                <a:solidFill>
+                  <a:srgbClr val="3399FF"/>
+                </a:solidFill>
+              </a:endParaRPr>
+            </a:p>
+          </p:txBody>
+        </p:sp>
       </p:grpSp>
     </p:spTree>
     <p:extLst>

</xml_diff>

<commit_message>
Deploying to gh-pages from @ Minee-Liane-Choi/MineeChoiLab@a7413f33f0609e9214728fc37de17782c475053c 🚀
</commit_message>
<xml_diff>
--- a/images/BRePAIR.pptx
+++ b/images/BRePAIR.pptx
@@ -3329,12 +3329,200 @@
           <a:chExt cx="0" cy="0"/>
         </a:xfrm>
       </p:grpSpPr>
+      <p:sp>
+        <p:nvSpPr>
+          <p:cNvPr id="13" name="Rectangle: Rounded Corners 12">
+            <a:extLst>
+              <a:ext uri="{FF2B5EF4-FFF2-40B4-BE49-F238E27FC236}">
+                <a16:creationId xmlns:a16="http://schemas.microsoft.com/office/drawing/2014/main" id="{FE014D9C-C0EE-4500-A18D-2907C88A6D4B}"/>
+              </a:ext>
+            </a:extLst>
+          </p:cNvPr>
+          <p:cNvSpPr>
+            <a:spLocks noChangeAspect="1"/>
+          </p:cNvSpPr>
+          <p:nvPr/>
+        </p:nvSpPr>
+        <p:spPr>
+          <a:xfrm>
+            <a:off x="4448910" y="2389444"/>
+            <a:ext cx="411423" cy="411423"/>
+          </a:xfrm>
+          <a:prstGeom prst="roundRect">
+            <a:avLst>
+              <a:gd name="adj" fmla="val 11026"/>
+            </a:avLst>
+          </a:prstGeom>
+          <a:solidFill>
+            <a:srgbClr val="FF3399"/>
+          </a:solidFill>
+          <a:ln>
+            <a:noFill/>
+          </a:ln>
+        </p:spPr>
+        <p:style>
+          <a:lnRef idx="2">
+            <a:schemeClr val="accent1">
+              <a:shade val="50000"/>
+            </a:schemeClr>
+          </a:lnRef>
+          <a:fillRef idx="1">
+            <a:schemeClr val="accent1"/>
+          </a:fillRef>
+          <a:effectRef idx="0">
+            <a:schemeClr val="accent1"/>
+          </a:effectRef>
+          <a:fontRef idx="minor">
+            <a:schemeClr val="lt1"/>
+          </a:fontRef>
+        </p:style>
+        <p:txBody>
+          <a:bodyPr rtlCol="0" anchor="ctr"/>
+          <a:lstStyle/>
+          <a:p>
+            <a:pPr algn="ctr"/>
+            <a:endParaRPr lang="en-US"/>
+          </a:p>
+        </p:txBody>
+      </p:sp>
+      <p:pic>
+        <p:nvPicPr>
+          <p:cNvPr id="14" name="Picture 13" descr="A picture containing night sky&#10;&#10;Description automatically generated">
+            <a:extLst>
+              <a:ext uri="{FF2B5EF4-FFF2-40B4-BE49-F238E27FC236}">
+                <a16:creationId xmlns:a16="http://schemas.microsoft.com/office/drawing/2014/main" id="{2A3B0C72-863A-4ED1-B70A-EDD430A27264}"/>
+              </a:ext>
+            </a:extLst>
+          </p:cNvPr>
+          <p:cNvPicPr>
+            <a:picLocks noChangeAspect="1"/>
+          </p:cNvPicPr>
+          <p:nvPr/>
+        </p:nvPicPr>
+        <p:blipFill>
+          <a:blip r:embed="rId2">
+            <a:extLst>
+              <a:ext uri="{28A0092B-C50C-407E-A947-70E740481C1C}">
+                <a14:useLocalDpi xmlns:a14="http://schemas.microsoft.com/office/drawing/2010/main" val="0"/>
+              </a:ext>
+            </a:extLst>
+          </a:blip>
+          <a:stretch>
+            <a:fillRect/>
+          </a:stretch>
+        </p:blipFill>
+        <p:spPr>
+          <a:xfrm>
+            <a:off x="4471131" y="2417212"/>
+            <a:ext cx="355374" cy="369220"/>
+          </a:xfrm>
+          <a:prstGeom prst="rect">
+            <a:avLst/>
+          </a:prstGeom>
+          <a:noFill/>
+          <a:ln>
+            <a:noFill/>
+          </a:ln>
+        </p:spPr>
+      </p:pic>
+      <p:sp>
+        <p:nvSpPr>
+          <p:cNvPr id="16" name="Rectangle: Rounded Corners 15">
+            <a:extLst>
+              <a:ext uri="{FF2B5EF4-FFF2-40B4-BE49-F238E27FC236}">
+                <a16:creationId xmlns:a16="http://schemas.microsoft.com/office/drawing/2014/main" id="{6B091E36-A1AA-4910-AF0C-6AC0089D6564}"/>
+              </a:ext>
+            </a:extLst>
+          </p:cNvPr>
+          <p:cNvSpPr>
+            <a:spLocks noChangeAspect="1"/>
+          </p:cNvSpPr>
+          <p:nvPr/>
+        </p:nvSpPr>
+        <p:spPr>
+          <a:xfrm>
+            <a:off x="4448910" y="2835996"/>
+            <a:ext cx="411423" cy="411423"/>
+          </a:xfrm>
+          <a:prstGeom prst="roundRect">
+            <a:avLst>
+              <a:gd name="adj" fmla="val 11026"/>
+            </a:avLst>
+          </a:prstGeom>
+          <a:solidFill>
+            <a:srgbClr val="3399FF"/>
+          </a:solidFill>
+          <a:ln>
+            <a:noFill/>
+          </a:ln>
+        </p:spPr>
+        <p:style>
+          <a:lnRef idx="2">
+            <a:schemeClr val="accent1">
+              <a:shade val="50000"/>
+            </a:schemeClr>
+          </a:lnRef>
+          <a:fillRef idx="1">
+            <a:schemeClr val="accent1"/>
+          </a:fillRef>
+          <a:effectRef idx="0">
+            <a:schemeClr val="accent1"/>
+          </a:effectRef>
+          <a:fontRef idx="minor">
+            <a:schemeClr val="lt1"/>
+          </a:fontRef>
+        </p:style>
+        <p:txBody>
+          <a:bodyPr rtlCol="0" anchor="ctr"/>
+          <a:lstStyle/>
+          <a:p>
+            <a:pPr algn="ctr"/>
+            <a:endParaRPr lang="en-US"/>
+          </a:p>
+        </p:txBody>
+      </p:sp>
+      <p:pic>
+        <p:nvPicPr>
+          <p:cNvPr id="18" name="Picture 17" descr="A black rectangle with a black background&#10;&#10;Description automatically generated with low confidence">
+            <a:extLst>
+              <a:ext uri="{FF2B5EF4-FFF2-40B4-BE49-F238E27FC236}">
+                <a16:creationId xmlns:a16="http://schemas.microsoft.com/office/drawing/2014/main" id="{C9F906B9-EB39-4D5D-8459-341927611163}"/>
+              </a:ext>
+            </a:extLst>
+          </p:cNvPr>
+          <p:cNvPicPr>
+            <a:picLocks noChangeAspect="1"/>
+          </p:cNvPicPr>
+          <p:nvPr/>
+        </p:nvPicPr>
+        <p:blipFill>
+          <a:blip r:embed="rId3">
+            <a:extLst>
+              <a:ext uri="{28A0092B-C50C-407E-A947-70E740481C1C}">
+                <a14:useLocalDpi xmlns:a14="http://schemas.microsoft.com/office/drawing/2010/main" val="0"/>
+              </a:ext>
+            </a:extLst>
+          </a:blip>
+          <a:stretch>
+            <a:fillRect/>
+          </a:stretch>
+        </p:blipFill>
+        <p:spPr>
+          <a:xfrm>
+            <a:off x="4467857" y="2849033"/>
+            <a:ext cx="377595" cy="378343"/>
+          </a:xfrm>
+          <a:prstGeom prst="rect">
+            <a:avLst/>
+          </a:prstGeom>
+        </p:spPr>
+      </p:pic>
       <p:grpSp>
         <p:nvGrpSpPr>
-          <p:cNvPr id="6" name="Group 5">
+          <p:cNvPr id="5" name="Group 4">
             <a:extLst>
               <a:ext uri="{FF2B5EF4-FFF2-40B4-BE49-F238E27FC236}">
-                <a16:creationId xmlns:a16="http://schemas.microsoft.com/office/drawing/2014/main" id="{FAD73A32-A02B-4138-AA17-47A3C74E72C4}"/>
+                <a16:creationId xmlns:a16="http://schemas.microsoft.com/office/drawing/2014/main" id="{69A3A054-55C3-4843-B706-A941FC881986}"/>
               </a:ext>
             </a:extLst>
           </p:cNvPr>
@@ -3343,18 +3531,18 @@
         </p:nvGrpSpPr>
         <p:grpSpPr>
           <a:xfrm>
-            <a:off x="4448910" y="2336663"/>
-            <a:ext cx="952560" cy="910756"/>
-            <a:chOff x="800835" y="598351"/>
-            <a:chExt cx="952560" cy="910756"/>
+            <a:off x="4892449" y="2835996"/>
+            <a:ext cx="423768" cy="411423"/>
+            <a:chOff x="3372084" y="3453994"/>
+            <a:chExt cx="423768" cy="411423"/>
           </a:xfrm>
         </p:grpSpPr>
         <p:sp>
           <p:nvSpPr>
-            <p:cNvPr id="13" name="Rectangle: Rounded Corners 12">
+            <p:cNvPr id="17" name="Rectangle: Rounded Corners 16">
               <a:extLst>
                 <a:ext uri="{FF2B5EF4-FFF2-40B4-BE49-F238E27FC236}">
-                  <a16:creationId xmlns:a16="http://schemas.microsoft.com/office/drawing/2014/main" id="{FE014D9C-C0EE-4500-A18D-2907C88A6D4B}"/>
+                  <a16:creationId xmlns:a16="http://schemas.microsoft.com/office/drawing/2014/main" id="{E909B689-6ED3-447C-91F1-7381D3AB943A}"/>
                 </a:ext>
               </a:extLst>
             </p:cNvPr>
@@ -3365,7 +3553,7 @@
           </p:nvSpPr>
           <p:spPr>
             <a:xfrm>
-              <a:off x="800835" y="651132"/>
+              <a:off x="3378258" y="3453994"/>
               <a:ext cx="411423" cy="411423"/>
             </a:xfrm>
             <a:prstGeom prst="roundRect">
@@ -3374,7 +3562,7 @@
               </a:avLst>
             </a:prstGeom>
             <a:solidFill>
-              <a:srgbClr val="FF3399"/>
+              <a:schemeClr val="accent4"/>
             </a:solidFill>
             <a:ln>
               <a:noFill/>
@@ -3407,10 +3595,10 @@
         </p:sp>
         <p:pic>
           <p:nvPicPr>
-            <p:cNvPr id="14" name="Picture 13" descr="A picture containing night sky&#10;&#10;Description automatically generated">
+            <p:cNvPr id="19" name="Picture 18" descr="A picture containing looking, dark&#10;&#10;Description automatically generated">
               <a:extLst>
                 <a:ext uri="{FF2B5EF4-FFF2-40B4-BE49-F238E27FC236}">
-                  <a16:creationId xmlns:a16="http://schemas.microsoft.com/office/drawing/2014/main" id="{2A3B0C72-863A-4ED1-B70A-EDD430A27264}"/>
+                  <a16:creationId xmlns:a16="http://schemas.microsoft.com/office/drawing/2014/main" id="{474EC151-7DB0-4F3D-A04D-983C6E0BAD41}"/>
                 </a:ext>
               </a:extLst>
             </p:cNvPr>
@@ -3420,7 +3608,7 @@
             <p:nvPr/>
           </p:nvPicPr>
           <p:blipFill>
-            <a:blip r:embed="rId2">
+            <a:blip r:embed="rId4">
               <a:extLst>
                 <a:ext uri="{28A0092B-C50C-407E-A947-70E740481C1C}">
                   <a14:useLocalDpi xmlns:a14="http://schemas.microsoft.com/office/drawing/2010/main" val="0"/>
@@ -3432,25 +3620,42 @@
             </a:stretch>
           </p:blipFill>
           <p:spPr>
-            <a:xfrm>
-              <a:off x="823056" y="678900"/>
-              <a:ext cx="355374" cy="369220"/>
+            <a:xfrm rot="19063852">
+              <a:off x="3372084" y="3540337"/>
+              <a:ext cx="423768" cy="218694"/>
             </a:xfrm>
             <a:prstGeom prst="rect">
               <a:avLst/>
             </a:prstGeom>
-            <a:noFill/>
-            <a:ln>
-              <a:noFill/>
-            </a:ln>
           </p:spPr>
         </p:pic>
+      </p:grpSp>
+      <p:grpSp>
+        <p:nvGrpSpPr>
+          <p:cNvPr id="2" name="Group 1">
+            <a:extLst>
+              <a:ext uri="{FF2B5EF4-FFF2-40B4-BE49-F238E27FC236}">
+                <a16:creationId xmlns:a16="http://schemas.microsoft.com/office/drawing/2014/main" id="{90F1609D-91F1-4A63-BAB0-1686CA84C5DC}"/>
+              </a:ext>
+            </a:extLst>
+          </p:cNvPr>
+          <p:cNvGrpSpPr/>
+          <p:nvPr/>
+        </p:nvGrpSpPr>
+        <p:grpSpPr>
+          <a:xfrm rot="1720764">
+            <a:off x="4990047" y="2336663"/>
+            <a:ext cx="411423" cy="411423"/>
+            <a:chOff x="3378258" y="3001902"/>
+            <a:chExt cx="411423" cy="411423"/>
+          </a:xfrm>
+        </p:grpSpPr>
         <p:sp>
           <p:nvSpPr>
-            <p:cNvPr id="16" name="Rectangle: Rounded Corners 15">
+            <p:cNvPr id="15" name="Rectangle: Rounded Corners 14">
               <a:extLst>
                 <a:ext uri="{FF2B5EF4-FFF2-40B4-BE49-F238E27FC236}">
-                  <a16:creationId xmlns:a16="http://schemas.microsoft.com/office/drawing/2014/main" id="{6B091E36-A1AA-4910-AF0C-6AC0089D6564}"/>
+                  <a16:creationId xmlns:a16="http://schemas.microsoft.com/office/drawing/2014/main" id="{A722CCC7-06D4-4D15-BD84-489F52D09D4B}"/>
                 </a:ext>
               </a:extLst>
             </p:cNvPr>
@@ -3461,7 +3666,7 @@
           </p:nvSpPr>
           <p:spPr>
             <a:xfrm>
-              <a:off x="800835" y="1097684"/>
+              <a:off x="3378258" y="3001902"/>
               <a:ext cx="411423" cy="411423"/>
             </a:xfrm>
             <a:prstGeom prst="roundRect">
@@ -3470,7 +3675,7 @@
               </a:avLst>
             </a:prstGeom>
             <a:solidFill>
-              <a:srgbClr val="3399FF"/>
+              <a:srgbClr val="92D050"/>
             </a:solidFill>
             <a:ln>
               <a:noFill/>
@@ -3503,10 +3708,10 @@
         </p:sp>
         <p:pic>
           <p:nvPicPr>
-            <p:cNvPr id="18" name="Picture 17" descr="A black rectangle with a black background&#10;&#10;Description automatically generated with low confidence">
+            <p:cNvPr id="20" name="Picture 19" descr="Shape&#10;&#10;Description automatically generated with medium confidence">
               <a:extLst>
                 <a:ext uri="{FF2B5EF4-FFF2-40B4-BE49-F238E27FC236}">
-                  <a16:creationId xmlns:a16="http://schemas.microsoft.com/office/drawing/2014/main" id="{C9F906B9-EB39-4D5D-8459-341927611163}"/>
+                  <a16:creationId xmlns:a16="http://schemas.microsoft.com/office/drawing/2014/main" id="{41C60A9F-DF33-434E-81C1-9A0AB08779F6}"/>
                 </a:ext>
               </a:extLst>
             </p:cNvPr>
@@ -3516,7 +3721,7 @@
             <p:nvPr/>
           </p:nvPicPr>
           <p:blipFill>
-            <a:blip r:embed="rId3">
+            <a:blip r:embed="rId5">
               <a:extLst>
                 <a:ext uri="{28A0092B-C50C-407E-A947-70E740481C1C}">
                   <a14:useLocalDpi xmlns:a14="http://schemas.microsoft.com/office/drawing/2010/main" val="0"/>
@@ -3529,240 +3734,14 @@
           </p:blipFill>
           <p:spPr>
             <a:xfrm>
-              <a:off x="819782" y="1110721"/>
-              <a:ext cx="377595" cy="378343"/>
+              <a:off x="3395170" y="3055040"/>
+              <a:ext cx="377595" cy="302197"/>
             </a:xfrm>
             <a:prstGeom prst="rect">
               <a:avLst/>
             </a:prstGeom>
           </p:spPr>
         </p:pic>
-        <p:grpSp>
-          <p:nvGrpSpPr>
-            <p:cNvPr id="5" name="Group 4">
-              <a:extLst>
-                <a:ext uri="{FF2B5EF4-FFF2-40B4-BE49-F238E27FC236}">
-                  <a16:creationId xmlns:a16="http://schemas.microsoft.com/office/drawing/2014/main" id="{69A3A054-55C3-4843-B706-A941FC881986}"/>
-                </a:ext>
-              </a:extLst>
-            </p:cNvPr>
-            <p:cNvGrpSpPr/>
-            <p:nvPr/>
-          </p:nvGrpSpPr>
-          <p:grpSpPr>
-            <a:xfrm>
-              <a:off x="1244374" y="1097684"/>
-              <a:ext cx="423768" cy="411423"/>
-              <a:chOff x="3372084" y="3453994"/>
-              <a:chExt cx="423768" cy="411423"/>
-            </a:xfrm>
-          </p:grpSpPr>
-          <p:sp>
-            <p:nvSpPr>
-              <p:cNvPr id="17" name="Rectangle: Rounded Corners 16">
-                <a:extLst>
-                  <a:ext uri="{FF2B5EF4-FFF2-40B4-BE49-F238E27FC236}">
-                    <a16:creationId xmlns:a16="http://schemas.microsoft.com/office/drawing/2014/main" id="{E909B689-6ED3-447C-91F1-7381D3AB943A}"/>
-                  </a:ext>
-                </a:extLst>
-              </p:cNvPr>
-              <p:cNvSpPr>
-                <a:spLocks noChangeAspect="1"/>
-              </p:cNvSpPr>
-              <p:nvPr/>
-            </p:nvSpPr>
-            <p:spPr>
-              <a:xfrm>
-                <a:off x="3378258" y="3453994"/>
-                <a:ext cx="411423" cy="411423"/>
-              </a:xfrm>
-              <a:prstGeom prst="roundRect">
-                <a:avLst>
-                  <a:gd name="adj" fmla="val 11026"/>
-                </a:avLst>
-              </a:prstGeom>
-              <a:solidFill>
-                <a:schemeClr val="accent4"/>
-              </a:solidFill>
-              <a:ln>
-                <a:noFill/>
-              </a:ln>
-            </p:spPr>
-            <p:style>
-              <a:lnRef idx="2">
-                <a:schemeClr val="accent1">
-                  <a:shade val="50000"/>
-                </a:schemeClr>
-              </a:lnRef>
-              <a:fillRef idx="1">
-                <a:schemeClr val="accent1"/>
-              </a:fillRef>
-              <a:effectRef idx="0">
-                <a:schemeClr val="accent1"/>
-              </a:effectRef>
-              <a:fontRef idx="minor">
-                <a:schemeClr val="lt1"/>
-              </a:fontRef>
-            </p:style>
-            <p:txBody>
-              <a:bodyPr rtlCol="0" anchor="ctr"/>
-              <a:lstStyle/>
-              <a:p>
-                <a:pPr algn="ctr"/>
-                <a:endParaRPr lang="en-US"/>
-              </a:p>
-            </p:txBody>
-          </p:sp>
-          <p:pic>
-            <p:nvPicPr>
-              <p:cNvPr id="19" name="Picture 18" descr="A picture containing looking, dark&#10;&#10;Description automatically generated">
-                <a:extLst>
-                  <a:ext uri="{FF2B5EF4-FFF2-40B4-BE49-F238E27FC236}">
-                    <a16:creationId xmlns:a16="http://schemas.microsoft.com/office/drawing/2014/main" id="{474EC151-7DB0-4F3D-A04D-983C6E0BAD41}"/>
-                  </a:ext>
-                </a:extLst>
-              </p:cNvPr>
-              <p:cNvPicPr>
-                <a:picLocks noChangeAspect="1"/>
-              </p:cNvPicPr>
-              <p:nvPr/>
-            </p:nvPicPr>
-            <p:blipFill>
-              <a:blip r:embed="rId4">
-                <a:extLst>
-                  <a:ext uri="{28A0092B-C50C-407E-A947-70E740481C1C}">
-                    <a14:useLocalDpi xmlns:a14="http://schemas.microsoft.com/office/drawing/2010/main" val="0"/>
-                  </a:ext>
-                </a:extLst>
-              </a:blip>
-              <a:stretch>
-                <a:fillRect/>
-              </a:stretch>
-            </p:blipFill>
-            <p:spPr>
-              <a:xfrm rot="19063852">
-                <a:off x="3372084" y="3540337"/>
-                <a:ext cx="423768" cy="218694"/>
-              </a:xfrm>
-              <a:prstGeom prst="rect">
-                <a:avLst/>
-              </a:prstGeom>
-            </p:spPr>
-          </p:pic>
-        </p:grpSp>
-        <p:grpSp>
-          <p:nvGrpSpPr>
-            <p:cNvPr id="2" name="Group 1">
-              <a:extLst>
-                <a:ext uri="{FF2B5EF4-FFF2-40B4-BE49-F238E27FC236}">
-                  <a16:creationId xmlns:a16="http://schemas.microsoft.com/office/drawing/2014/main" id="{90F1609D-91F1-4A63-BAB0-1686CA84C5DC}"/>
-                </a:ext>
-              </a:extLst>
-            </p:cNvPr>
-            <p:cNvGrpSpPr/>
-            <p:nvPr/>
-          </p:nvGrpSpPr>
-          <p:grpSpPr>
-            <a:xfrm rot="1720764">
-              <a:off x="1341972" y="598351"/>
-              <a:ext cx="411423" cy="411423"/>
-              <a:chOff x="3378258" y="3001902"/>
-              <a:chExt cx="411423" cy="411423"/>
-            </a:xfrm>
-          </p:grpSpPr>
-          <p:sp>
-            <p:nvSpPr>
-              <p:cNvPr id="15" name="Rectangle: Rounded Corners 14">
-                <a:extLst>
-                  <a:ext uri="{FF2B5EF4-FFF2-40B4-BE49-F238E27FC236}">
-                    <a16:creationId xmlns:a16="http://schemas.microsoft.com/office/drawing/2014/main" id="{A722CCC7-06D4-4D15-BD84-489F52D09D4B}"/>
-                  </a:ext>
-                </a:extLst>
-              </p:cNvPr>
-              <p:cNvSpPr>
-                <a:spLocks noChangeAspect="1"/>
-              </p:cNvSpPr>
-              <p:nvPr/>
-            </p:nvSpPr>
-            <p:spPr>
-              <a:xfrm>
-                <a:off x="3378258" y="3001902"/>
-                <a:ext cx="411423" cy="411423"/>
-              </a:xfrm>
-              <a:prstGeom prst="roundRect">
-                <a:avLst>
-                  <a:gd name="adj" fmla="val 11026"/>
-                </a:avLst>
-              </a:prstGeom>
-              <a:solidFill>
-                <a:srgbClr val="92D050"/>
-              </a:solidFill>
-              <a:ln>
-                <a:noFill/>
-              </a:ln>
-            </p:spPr>
-            <p:style>
-              <a:lnRef idx="2">
-                <a:schemeClr val="accent1">
-                  <a:shade val="50000"/>
-                </a:schemeClr>
-              </a:lnRef>
-              <a:fillRef idx="1">
-                <a:schemeClr val="accent1"/>
-              </a:fillRef>
-              <a:effectRef idx="0">
-                <a:schemeClr val="accent1"/>
-              </a:effectRef>
-              <a:fontRef idx="minor">
-                <a:schemeClr val="lt1"/>
-              </a:fontRef>
-            </p:style>
-            <p:txBody>
-              <a:bodyPr rtlCol="0" anchor="ctr"/>
-              <a:lstStyle/>
-              <a:p>
-                <a:pPr algn="ctr"/>
-                <a:endParaRPr lang="en-US"/>
-              </a:p>
-            </p:txBody>
-          </p:sp>
-          <p:pic>
-            <p:nvPicPr>
-              <p:cNvPr id="20" name="Picture 19" descr="Shape&#10;&#10;Description automatically generated with medium confidence">
-                <a:extLst>
-                  <a:ext uri="{FF2B5EF4-FFF2-40B4-BE49-F238E27FC236}">
-                    <a16:creationId xmlns:a16="http://schemas.microsoft.com/office/drawing/2014/main" id="{41C60A9F-DF33-434E-81C1-9A0AB08779F6}"/>
-                  </a:ext>
-                </a:extLst>
-              </p:cNvPr>
-              <p:cNvPicPr>
-                <a:picLocks noChangeAspect="1"/>
-              </p:cNvPicPr>
-              <p:nvPr/>
-            </p:nvPicPr>
-            <p:blipFill>
-              <a:blip r:embed="rId5">
-                <a:extLst>
-                  <a:ext uri="{28A0092B-C50C-407E-A947-70E740481C1C}">
-                    <a14:useLocalDpi xmlns:a14="http://schemas.microsoft.com/office/drawing/2010/main" val="0"/>
-                  </a:ext>
-                </a:extLst>
-              </a:blip>
-              <a:stretch>
-                <a:fillRect/>
-              </a:stretch>
-            </p:blipFill>
-            <p:spPr>
-              <a:xfrm>
-                <a:off x="3395170" y="3055040"/>
-                <a:ext cx="377595" cy="302197"/>
-              </a:xfrm>
-              <a:prstGeom prst="rect">
-                <a:avLst/>
-              </a:prstGeom>
-            </p:spPr>
-          </p:pic>
-        </p:grpSp>
       </p:grpSp>
       <p:grpSp>
         <p:nvGrpSpPr>
@@ -4527,30 +4506,32 @@
       </p:grpSp>
       <p:grpSp>
         <p:nvGrpSpPr>
-          <p:cNvPr id="97" name="Group 96">
+          <p:cNvPr id="37" name="Group 36">
             <a:extLst>
               <a:ext uri="{FF2B5EF4-FFF2-40B4-BE49-F238E27FC236}">
-                <a16:creationId xmlns:a16="http://schemas.microsoft.com/office/drawing/2014/main" id="{483246DE-3134-4B12-AA2F-2863C741A1AC}"/>
+                <a16:creationId xmlns:a16="http://schemas.microsoft.com/office/drawing/2014/main" id="{C9A57416-FCFF-405E-A3AD-107336934B42}"/>
               </a:ext>
             </a:extLst>
           </p:cNvPr>
-          <p:cNvGrpSpPr/>
+          <p:cNvGrpSpPr>
+            <a:grpSpLocks noChangeAspect="1"/>
+          </p:cNvGrpSpPr>
           <p:nvPr/>
         </p:nvGrpSpPr>
         <p:grpSpPr>
           <a:xfrm>
-            <a:off x="4463648" y="3592719"/>
-            <a:ext cx="959545" cy="916943"/>
-            <a:chOff x="4463648" y="3592719"/>
-            <a:chExt cx="959545" cy="916943"/>
+            <a:off x="4478115" y="4437588"/>
+            <a:ext cx="960399" cy="905681"/>
+            <a:chOff x="4439019" y="4922007"/>
+            <a:chExt cx="960399" cy="905681"/>
           </a:xfrm>
         </p:grpSpPr>
         <p:grpSp>
           <p:nvGrpSpPr>
-            <p:cNvPr id="93" name="Group 92">
+            <p:cNvPr id="36" name="Group 35">
               <a:extLst>
                 <a:ext uri="{FF2B5EF4-FFF2-40B4-BE49-F238E27FC236}">
-                  <a16:creationId xmlns:a16="http://schemas.microsoft.com/office/drawing/2014/main" id="{B5132635-FBDE-4EAA-BD10-B14F64D2C540}"/>
+                  <a16:creationId xmlns:a16="http://schemas.microsoft.com/office/drawing/2014/main" id="{97585845-BC94-42DD-97C4-8FABA4230FAE}"/>
                 </a:ext>
               </a:extLst>
             </p:cNvPr>
@@ -4558,19 +4539,19 @@
             <p:nvPr/>
           </p:nvGrpSpPr>
           <p:grpSpPr>
-            <a:xfrm rot="1863789">
-              <a:off x="5011770" y="3592719"/>
-              <a:ext cx="411423" cy="506673"/>
-              <a:chOff x="5004965" y="3565991"/>
-              <a:chExt cx="411423" cy="506673"/>
+            <a:xfrm rot="1593285">
+              <a:off x="4987995" y="4922007"/>
+              <a:ext cx="411423" cy="496911"/>
+              <a:chOff x="4923821" y="4941359"/>
+              <a:chExt cx="411423" cy="496911"/>
             </a:xfrm>
           </p:grpSpPr>
           <p:sp>
             <p:nvSpPr>
-              <p:cNvPr id="87" name="Freeform: Shape 86">
+              <p:cNvPr id="76" name="Freeform: Shape 75">
                 <a:extLst>
                   <a:ext uri="{FF2B5EF4-FFF2-40B4-BE49-F238E27FC236}">
-                    <a16:creationId xmlns:a16="http://schemas.microsoft.com/office/drawing/2014/main" id="{967B953C-1242-46AD-8EF9-96E2ABF72490}"/>
+                    <a16:creationId xmlns:a16="http://schemas.microsoft.com/office/drawing/2014/main" id="{A86F41C4-EA9C-4371-A15C-385CA9C9AADB}"/>
                   </a:ext>
                 </a:extLst>
               </p:cNvPr>
@@ -4581,54 +4562,54 @@
             </p:nvSpPr>
             <p:spPr>
               <a:xfrm rot="16200000">
-                <a:off x="4957340" y="3613616"/>
-                <a:ext cx="506673" cy="411423"/>
+                <a:off x="4881077" y="4984103"/>
+                <a:ext cx="496911" cy="411423"/>
               </a:xfrm>
               <a:custGeom>
                 <a:avLst/>
                 <a:gdLst>
-                  <a:gd name="connsiteX0" fmla="*/ 506673 w 506673"/>
-                  <a:gd name="connsiteY0" fmla="*/ 45363 h 411423"/>
-                  <a:gd name="connsiteX1" fmla="*/ 506673 w 506673"/>
-                  <a:gd name="connsiteY1" fmla="*/ 366060 h 411423"/>
-                  <a:gd name="connsiteX2" fmla="*/ 461310 w 506673"/>
-                  <a:gd name="connsiteY2" fmla="*/ 411423 h 411423"/>
-                  <a:gd name="connsiteX3" fmla="*/ 140613 w 506673"/>
-                  <a:gd name="connsiteY3" fmla="*/ 411423 h 411423"/>
-                  <a:gd name="connsiteX4" fmla="*/ 95250 w 506673"/>
-                  <a:gd name="connsiteY4" fmla="*/ 366060 h 411423"/>
-                  <a:gd name="connsiteX5" fmla="*/ 95250 w 506673"/>
-                  <a:gd name="connsiteY5" fmla="*/ 310247 h 411423"/>
-                  <a:gd name="connsiteX6" fmla="*/ 83571 w 506673"/>
-                  <a:gd name="connsiteY6" fmla="*/ 318121 h 411423"/>
-                  <a:gd name="connsiteX7" fmla="*/ 60156 w 506673"/>
-                  <a:gd name="connsiteY7" fmla="*/ 322848 h 411423"/>
-                  <a:gd name="connsiteX8" fmla="*/ 0 w 506673"/>
-                  <a:gd name="connsiteY8" fmla="*/ 262692 h 411423"/>
-                  <a:gd name="connsiteX9" fmla="*/ 60156 w 506673"/>
-                  <a:gd name="connsiteY9" fmla="*/ 202536 h 411423"/>
-                  <a:gd name="connsiteX10" fmla="*/ 83571 w 506673"/>
-                  <a:gd name="connsiteY10" fmla="*/ 207264 h 411423"/>
-                  <a:gd name="connsiteX11" fmla="*/ 95250 w 506673"/>
-                  <a:gd name="connsiteY11" fmla="*/ 215138 h 411423"/>
-                  <a:gd name="connsiteX12" fmla="*/ 95250 w 506673"/>
+                  <a:gd name="connsiteX0" fmla="*/ 0 w 496911"/>
+                  <a:gd name="connsiteY0" fmla="*/ 205713 h 411423"/>
+                  <a:gd name="connsiteX1" fmla="*/ 55842 w 496911"/>
+                  <a:gd name="connsiteY1" fmla="*/ 149871 h 411423"/>
+                  <a:gd name="connsiteX2" fmla="*/ 77579 w 496911"/>
+                  <a:gd name="connsiteY2" fmla="*/ 154260 h 411423"/>
+                  <a:gd name="connsiteX3" fmla="*/ 85488 w 496911"/>
+                  <a:gd name="connsiteY3" fmla="*/ 159592 h 411423"/>
+                  <a:gd name="connsiteX4" fmla="*/ 85488 w 496911"/>
+                  <a:gd name="connsiteY4" fmla="*/ 45363 h 411423"/>
+                  <a:gd name="connsiteX5" fmla="*/ 130851 w 496911"/>
+                  <a:gd name="connsiteY5" fmla="*/ 0 h 411423"/>
+                  <a:gd name="connsiteX6" fmla="*/ 210713 w 496911"/>
+                  <a:gd name="connsiteY6" fmla="*/ 0 h 411423"/>
+                  <a:gd name="connsiteX7" fmla="*/ 214845 w 496911"/>
+                  <a:gd name="connsiteY7" fmla="*/ 20470 h 411423"/>
+                  <a:gd name="connsiteX8" fmla="*/ 291199 w 496911"/>
+                  <a:gd name="connsiteY8" fmla="*/ 71080 h 411423"/>
+                  <a:gd name="connsiteX9" fmla="*/ 367553 w 496911"/>
+                  <a:gd name="connsiteY9" fmla="*/ 20470 h 411423"/>
+                  <a:gd name="connsiteX10" fmla="*/ 371686 w 496911"/>
+                  <a:gd name="connsiteY10" fmla="*/ 0 h 411423"/>
+                  <a:gd name="connsiteX11" fmla="*/ 451548 w 496911"/>
+                  <a:gd name="connsiteY11" fmla="*/ 0 h 411423"/>
+                  <a:gd name="connsiteX12" fmla="*/ 496911 w 496911"/>
                   <a:gd name="connsiteY12" fmla="*/ 45363 h 411423"/>
-                  <a:gd name="connsiteX13" fmla="*/ 140613 w 506673"/>
-                  <a:gd name="connsiteY13" fmla="*/ 0 h 411423"/>
-                  <a:gd name="connsiteX14" fmla="*/ 277493 w 506673"/>
-                  <a:gd name="connsiteY14" fmla="*/ 0 h 411423"/>
-                  <a:gd name="connsiteX15" fmla="*/ 274379 w 506673"/>
-                  <a:gd name="connsiteY15" fmla="*/ 15425 h 411423"/>
-                  <a:gd name="connsiteX16" fmla="*/ 359440 w 506673"/>
-                  <a:gd name="connsiteY16" fmla="*/ 100486 h 411423"/>
-                  <a:gd name="connsiteX17" fmla="*/ 444501 w 506673"/>
-                  <a:gd name="connsiteY17" fmla="*/ 15425 h 411423"/>
-                  <a:gd name="connsiteX18" fmla="*/ 441387 w 506673"/>
-                  <a:gd name="connsiteY18" fmla="*/ 0 h 411423"/>
-                  <a:gd name="connsiteX19" fmla="*/ 461310 w 506673"/>
-                  <a:gd name="connsiteY19" fmla="*/ 0 h 411423"/>
-                  <a:gd name="connsiteX20" fmla="*/ 506673 w 506673"/>
-                  <a:gd name="connsiteY20" fmla="*/ 45363 h 411423"/>
+                  <a:gd name="connsiteX13" fmla="*/ 496911 w 496911"/>
+                  <a:gd name="connsiteY13" fmla="*/ 366060 h 411423"/>
+                  <a:gd name="connsiteX14" fmla="*/ 451548 w 496911"/>
+                  <a:gd name="connsiteY14" fmla="*/ 411423 h 411423"/>
+                  <a:gd name="connsiteX15" fmla="*/ 130851 w 496911"/>
+                  <a:gd name="connsiteY15" fmla="*/ 411423 h 411423"/>
+                  <a:gd name="connsiteX16" fmla="*/ 85488 w 496911"/>
+                  <a:gd name="connsiteY16" fmla="*/ 366060 h 411423"/>
+                  <a:gd name="connsiteX17" fmla="*/ 85488 w 496911"/>
+                  <a:gd name="connsiteY17" fmla="*/ 251834 h 411423"/>
+                  <a:gd name="connsiteX18" fmla="*/ 77579 w 496911"/>
+                  <a:gd name="connsiteY18" fmla="*/ 257167 h 411423"/>
+                  <a:gd name="connsiteX19" fmla="*/ 55842 w 496911"/>
+                  <a:gd name="connsiteY19" fmla="*/ 261555 h 411423"/>
+                  <a:gd name="connsiteX20" fmla="*/ 0 w 496911"/>
+                  <a:gd name="connsiteY20" fmla="*/ 205713 h 411423"/>
                 </a:gdLst>
                 <a:ahLst/>
                 <a:cxnLst>
@@ -4698,89 +4679,89 @@
                 </a:cxnLst>
                 <a:rect l="l" t="t" r="r" b="b"/>
                 <a:pathLst>
-                  <a:path w="506673" h="411423">
+                  <a:path w="496911" h="411423">
                     <a:moveTo>
-                      <a:pt x="506673" y="45363"/>
+                      <a:pt x="0" y="205713"/>
                     </a:moveTo>
+                    <a:cubicBezTo>
+                      <a:pt x="0" y="174872"/>
+                      <a:pt x="25001" y="149871"/>
+                      <a:pt x="55842" y="149871"/>
+                    </a:cubicBezTo>
+                    <a:cubicBezTo>
+                      <a:pt x="63553" y="149871"/>
+                      <a:pt x="70898" y="151434"/>
+                      <a:pt x="77579" y="154260"/>
+                    </a:cubicBezTo>
                     <a:lnTo>
-                      <a:pt x="506673" y="366060"/>
+                      <a:pt x="85488" y="159592"/>
+                    </a:lnTo>
+                    <a:lnTo>
+                      <a:pt x="85488" y="45363"/>
                     </a:lnTo>
                     <a:cubicBezTo>
-                      <a:pt x="506673" y="391113"/>
-                      <a:pt x="486363" y="411423"/>
-                      <a:pt x="461310" y="411423"/>
+                      <a:pt x="85488" y="20310"/>
+                      <a:pt x="105798" y="0"/>
+                      <a:pt x="130851" y="0"/>
                     </a:cubicBezTo>
                     <a:lnTo>
-                      <a:pt x="140613" y="411423"/>
+                      <a:pt x="210713" y="0"/>
+                    </a:lnTo>
+                    <a:lnTo>
+                      <a:pt x="214845" y="20470"/>
                     </a:lnTo>
                     <a:cubicBezTo>
-                      <a:pt x="115560" y="411423"/>
-                      <a:pt x="95250" y="391113"/>
-                      <a:pt x="95250" y="366060"/>
+                      <a:pt x="227425" y="50212"/>
+                      <a:pt x="256875" y="71080"/>
+                      <a:pt x="291199" y="71080"/>
+                    </a:cubicBezTo>
+                    <a:cubicBezTo>
+                      <a:pt x="325524" y="71080"/>
+                      <a:pt x="354974" y="50212"/>
+                      <a:pt x="367553" y="20470"/>
                     </a:cubicBezTo>
                     <a:lnTo>
-                      <a:pt x="95250" y="310247"/>
+                      <a:pt x="371686" y="0"/>
                     </a:lnTo>
                     <a:lnTo>
-                      <a:pt x="83571" y="318121"/>
+                      <a:pt x="451548" y="0"/>
                     </a:lnTo>
                     <a:cubicBezTo>
-                      <a:pt x="76374" y="321165"/>
-                      <a:pt x="68462" y="322848"/>
-                      <a:pt x="60156" y="322848"/>
+                      <a:pt x="476601" y="0"/>
+                      <a:pt x="496911" y="20310"/>
+                      <a:pt x="496911" y="45363"/>
+                    </a:cubicBezTo>
+                    <a:lnTo>
+                      <a:pt x="496911" y="366060"/>
+                    </a:lnTo>
+                    <a:cubicBezTo>
+                      <a:pt x="496911" y="391113"/>
+                      <a:pt x="476601" y="411423"/>
+                      <a:pt x="451548" y="411423"/>
+                    </a:cubicBezTo>
+                    <a:lnTo>
+                      <a:pt x="130851" y="411423"/>
+                    </a:lnTo>
+                    <a:cubicBezTo>
+                      <a:pt x="105798" y="411423"/>
+                      <a:pt x="85488" y="391113"/>
+                      <a:pt x="85488" y="366060"/>
+                    </a:cubicBezTo>
+                    <a:lnTo>
+                      <a:pt x="85488" y="251834"/>
+                    </a:lnTo>
+                    <a:lnTo>
+                      <a:pt x="77579" y="257167"/>
+                    </a:lnTo>
+                    <a:cubicBezTo>
+                      <a:pt x="70898" y="259993"/>
+                      <a:pt x="63553" y="261555"/>
+                      <a:pt x="55842" y="261555"/>
                     </a:cubicBezTo>
                     <a:cubicBezTo>
-                      <a:pt x="26933" y="322848"/>
-                      <a:pt x="0" y="295915"/>
-                      <a:pt x="0" y="262692"/>
-                    </a:cubicBezTo>
-                    <a:cubicBezTo>
-                      <a:pt x="0" y="229469"/>
-                      <a:pt x="26933" y="202536"/>
-                      <a:pt x="60156" y="202536"/>
-                    </a:cubicBezTo>
-                    <a:cubicBezTo>
-                      <a:pt x="68462" y="202536"/>
-                      <a:pt x="76374" y="204220"/>
-                      <a:pt x="83571" y="207264"/>
-                    </a:cubicBezTo>
-                    <a:lnTo>
-                      <a:pt x="95250" y="215138"/>
-                    </a:lnTo>
-                    <a:lnTo>
-                      <a:pt x="95250" y="45363"/>
-                    </a:lnTo>
-                    <a:cubicBezTo>
-                      <a:pt x="95250" y="20310"/>
-                      <a:pt x="115560" y="0"/>
-                      <a:pt x="140613" y="0"/>
-                    </a:cubicBezTo>
-                    <a:lnTo>
-                      <a:pt x="277493" y="0"/>
-                    </a:lnTo>
-                    <a:lnTo>
-                      <a:pt x="274379" y="15425"/>
-                    </a:lnTo>
-                    <a:cubicBezTo>
-                      <a:pt x="274379" y="62403"/>
-                      <a:pt x="312462" y="100486"/>
-                      <a:pt x="359440" y="100486"/>
-                    </a:cubicBezTo>
-                    <a:cubicBezTo>
-                      <a:pt x="406418" y="100486"/>
-                      <a:pt x="444501" y="62403"/>
-                      <a:pt x="444501" y="15425"/>
-                    </a:cubicBezTo>
-                    <a:lnTo>
-                      <a:pt x="441387" y="0"/>
-                    </a:lnTo>
-                    <a:lnTo>
-                      <a:pt x="461310" y="0"/>
-                    </a:lnTo>
-                    <a:cubicBezTo>
-                      <a:pt x="486363" y="0"/>
-                      <a:pt x="506673" y="20310"/>
-                      <a:pt x="506673" y="45363"/>
+                      <a:pt x="25001" y="261555"/>
+                      <a:pt x="0" y="236554"/>
+                      <a:pt x="0" y="205713"/>
                     </a:cubicBezTo>
                     <a:close/>
                   </a:path>
@@ -4810,9 +4791,7 @@
               </a:fontRef>
             </p:style>
             <p:txBody>
-              <a:bodyPr wrap="square" rtlCol="0" anchor="ctr">
-                <a:noAutofit/>
-              </a:bodyPr>
+              <a:bodyPr rtlCol="0" anchor="ctr"/>
               <a:lstStyle/>
               <a:p>
                 <a:pPr algn="ctr"/>
@@ -4822,10 +4801,10 @@
           </p:sp>
           <p:pic>
             <p:nvPicPr>
-              <p:cNvPr id="88" name="Picture 87" descr="Shape&#10;&#10;Description automatically generated with medium confidence">
+              <p:cNvPr id="78" name="Picture 77" descr="Shape&#10;&#10;Description automatically generated with medium confidence">
                 <a:extLst>
                   <a:ext uri="{FF2B5EF4-FFF2-40B4-BE49-F238E27FC236}">
-                    <a16:creationId xmlns:a16="http://schemas.microsoft.com/office/drawing/2014/main" id="{5DEF2295-03D8-41D0-A1E8-F23A4F8ABD35}"/>
+                    <a16:creationId xmlns:a16="http://schemas.microsoft.com/office/drawing/2014/main" id="{FBAEB10B-52B7-4D2B-9718-59B36D9D6BD6}"/>
                   </a:ext>
                 </a:extLst>
               </p:cNvPr>
@@ -4847,8 +4826,8 @@
               </a:stretch>
             </p:blipFill>
             <p:spPr>
-              <a:xfrm rot="21582343">
-                <a:off x="5111803" y="3625465"/>
+              <a:xfrm>
+                <a:off x="4997691" y="5020454"/>
                 <a:ext cx="290443" cy="253233"/>
               </a:xfrm>
               <a:prstGeom prst="rect">
@@ -4859,10 +4838,10 @@
         </p:grpSp>
         <p:grpSp>
           <p:nvGrpSpPr>
-            <p:cNvPr id="96" name="Group 95">
+            <p:cNvPr id="8" name="Group 7">
               <a:extLst>
                 <a:ext uri="{FF2B5EF4-FFF2-40B4-BE49-F238E27FC236}">
-                  <a16:creationId xmlns:a16="http://schemas.microsoft.com/office/drawing/2014/main" id="{555D9AB7-0E18-4322-BE3E-39E9B1DDBFB1}"/>
+                  <a16:creationId xmlns:a16="http://schemas.microsoft.com/office/drawing/2014/main" id="{7A149A46-B387-4EB5-A6D1-15C3FDF44DC5}"/>
                 </a:ext>
               </a:extLst>
             </p:cNvPr>
@@ -4871,330 +4850,18 @@
           </p:nvGrpSpPr>
           <p:grpSpPr>
             <a:xfrm>
-              <a:off x="4803373" y="4098239"/>
-              <a:ext cx="506673" cy="411423"/>
-              <a:chOff x="4803373" y="4098239"/>
-              <a:chExt cx="506673" cy="411423"/>
+              <a:off x="4439462" y="5330608"/>
+              <a:ext cx="411423" cy="496911"/>
+              <a:chOff x="4439462" y="5330608"/>
+              <a:chExt cx="411423" cy="496911"/>
             </a:xfrm>
           </p:grpSpPr>
           <p:sp>
             <p:nvSpPr>
-              <p:cNvPr id="84" name="Freeform: Shape 83">
+              <p:cNvPr id="74" name="Freeform: Shape 73">
                 <a:extLst>
                   <a:ext uri="{FF2B5EF4-FFF2-40B4-BE49-F238E27FC236}">
-                    <a16:creationId xmlns:a16="http://schemas.microsoft.com/office/drawing/2014/main" id="{1110C7CA-FC90-4DA4-A98C-BB0CBA94415A}"/>
-                  </a:ext>
-                </a:extLst>
-              </p:cNvPr>
-              <p:cNvSpPr>
-                <a:spLocks noChangeAspect="1"/>
-              </p:cNvSpPr>
-              <p:nvPr/>
-            </p:nvSpPr>
-            <p:spPr>
-              <a:xfrm>
-                <a:off x="4803373" y="4098239"/>
-                <a:ext cx="506673" cy="411423"/>
-              </a:xfrm>
-              <a:custGeom>
-                <a:avLst/>
-                <a:gdLst>
-                  <a:gd name="connsiteX0" fmla="*/ 506673 w 506673"/>
-                  <a:gd name="connsiteY0" fmla="*/ 45363 h 411423"/>
-                  <a:gd name="connsiteX1" fmla="*/ 506673 w 506673"/>
-                  <a:gd name="connsiteY1" fmla="*/ 366060 h 411423"/>
-                  <a:gd name="connsiteX2" fmla="*/ 461310 w 506673"/>
-                  <a:gd name="connsiteY2" fmla="*/ 411423 h 411423"/>
-                  <a:gd name="connsiteX3" fmla="*/ 140613 w 506673"/>
-                  <a:gd name="connsiteY3" fmla="*/ 411423 h 411423"/>
-                  <a:gd name="connsiteX4" fmla="*/ 95250 w 506673"/>
-                  <a:gd name="connsiteY4" fmla="*/ 366060 h 411423"/>
-                  <a:gd name="connsiteX5" fmla="*/ 95250 w 506673"/>
-                  <a:gd name="connsiteY5" fmla="*/ 310247 h 411423"/>
-                  <a:gd name="connsiteX6" fmla="*/ 83571 w 506673"/>
-                  <a:gd name="connsiteY6" fmla="*/ 318121 h 411423"/>
-                  <a:gd name="connsiteX7" fmla="*/ 60156 w 506673"/>
-                  <a:gd name="connsiteY7" fmla="*/ 322848 h 411423"/>
-                  <a:gd name="connsiteX8" fmla="*/ 0 w 506673"/>
-                  <a:gd name="connsiteY8" fmla="*/ 262692 h 411423"/>
-                  <a:gd name="connsiteX9" fmla="*/ 60156 w 506673"/>
-                  <a:gd name="connsiteY9" fmla="*/ 202536 h 411423"/>
-                  <a:gd name="connsiteX10" fmla="*/ 83571 w 506673"/>
-                  <a:gd name="connsiteY10" fmla="*/ 207264 h 411423"/>
-                  <a:gd name="connsiteX11" fmla="*/ 95250 w 506673"/>
-                  <a:gd name="connsiteY11" fmla="*/ 215138 h 411423"/>
-                  <a:gd name="connsiteX12" fmla="*/ 95250 w 506673"/>
-                  <a:gd name="connsiteY12" fmla="*/ 45363 h 411423"/>
-                  <a:gd name="connsiteX13" fmla="*/ 140613 w 506673"/>
-                  <a:gd name="connsiteY13" fmla="*/ 0 h 411423"/>
-                  <a:gd name="connsiteX14" fmla="*/ 277493 w 506673"/>
-                  <a:gd name="connsiteY14" fmla="*/ 0 h 411423"/>
-                  <a:gd name="connsiteX15" fmla="*/ 274379 w 506673"/>
-                  <a:gd name="connsiteY15" fmla="*/ 15425 h 411423"/>
-                  <a:gd name="connsiteX16" fmla="*/ 359440 w 506673"/>
-                  <a:gd name="connsiteY16" fmla="*/ 100486 h 411423"/>
-                  <a:gd name="connsiteX17" fmla="*/ 444501 w 506673"/>
-                  <a:gd name="connsiteY17" fmla="*/ 15425 h 411423"/>
-                  <a:gd name="connsiteX18" fmla="*/ 441387 w 506673"/>
-                  <a:gd name="connsiteY18" fmla="*/ 0 h 411423"/>
-                  <a:gd name="connsiteX19" fmla="*/ 461310 w 506673"/>
-                  <a:gd name="connsiteY19" fmla="*/ 0 h 411423"/>
-                  <a:gd name="connsiteX20" fmla="*/ 506673 w 506673"/>
-                  <a:gd name="connsiteY20" fmla="*/ 45363 h 411423"/>
-                </a:gdLst>
-                <a:ahLst/>
-                <a:cxnLst>
-                  <a:cxn ang="0">
-                    <a:pos x="connsiteX0" y="connsiteY0"/>
-                  </a:cxn>
-                  <a:cxn ang="0">
-                    <a:pos x="connsiteX1" y="connsiteY1"/>
-                  </a:cxn>
-                  <a:cxn ang="0">
-                    <a:pos x="connsiteX2" y="connsiteY2"/>
-                  </a:cxn>
-                  <a:cxn ang="0">
-                    <a:pos x="connsiteX3" y="connsiteY3"/>
-                  </a:cxn>
-                  <a:cxn ang="0">
-                    <a:pos x="connsiteX4" y="connsiteY4"/>
-                  </a:cxn>
-                  <a:cxn ang="0">
-                    <a:pos x="connsiteX5" y="connsiteY5"/>
-                  </a:cxn>
-                  <a:cxn ang="0">
-                    <a:pos x="connsiteX6" y="connsiteY6"/>
-                  </a:cxn>
-                  <a:cxn ang="0">
-                    <a:pos x="connsiteX7" y="connsiteY7"/>
-                  </a:cxn>
-                  <a:cxn ang="0">
-                    <a:pos x="connsiteX8" y="connsiteY8"/>
-                  </a:cxn>
-                  <a:cxn ang="0">
-                    <a:pos x="connsiteX9" y="connsiteY9"/>
-                  </a:cxn>
-                  <a:cxn ang="0">
-                    <a:pos x="connsiteX10" y="connsiteY10"/>
-                  </a:cxn>
-                  <a:cxn ang="0">
-                    <a:pos x="connsiteX11" y="connsiteY11"/>
-                  </a:cxn>
-                  <a:cxn ang="0">
-                    <a:pos x="connsiteX12" y="connsiteY12"/>
-                  </a:cxn>
-                  <a:cxn ang="0">
-                    <a:pos x="connsiteX13" y="connsiteY13"/>
-                  </a:cxn>
-                  <a:cxn ang="0">
-                    <a:pos x="connsiteX14" y="connsiteY14"/>
-                  </a:cxn>
-                  <a:cxn ang="0">
-                    <a:pos x="connsiteX15" y="connsiteY15"/>
-                  </a:cxn>
-                  <a:cxn ang="0">
-                    <a:pos x="connsiteX16" y="connsiteY16"/>
-                  </a:cxn>
-                  <a:cxn ang="0">
-                    <a:pos x="connsiteX17" y="connsiteY17"/>
-                  </a:cxn>
-                  <a:cxn ang="0">
-                    <a:pos x="connsiteX18" y="connsiteY18"/>
-                  </a:cxn>
-                  <a:cxn ang="0">
-                    <a:pos x="connsiteX19" y="connsiteY19"/>
-                  </a:cxn>
-                  <a:cxn ang="0">
-                    <a:pos x="connsiteX20" y="connsiteY20"/>
-                  </a:cxn>
-                </a:cxnLst>
-                <a:rect l="l" t="t" r="r" b="b"/>
-                <a:pathLst>
-                  <a:path w="506673" h="411423">
-                    <a:moveTo>
-                      <a:pt x="506673" y="45363"/>
-                    </a:moveTo>
-                    <a:lnTo>
-                      <a:pt x="506673" y="366060"/>
-                    </a:lnTo>
-                    <a:cubicBezTo>
-                      <a:pt x="506673" y="391113"/>
-                      <a:pt x="486363" y="411423"/>
-                      <a:pt x="461310" y="411423"/>
-                    </a:cubicBezTo>
-                    <a:lnTo>
-                      <a:pt x="140613" y="411423"/>
-                    </a:lnTo>
-                    <a:cubicBezTo>
-                      <a:pt x="115560" y="411423"/>
-                      <a:pt x="95250" y="391113"/>
-                      <a:pt x="95250" y="366060"/>
-                    </a:cubicBezTo>
-                    <a:lnTo>
-                      <a:pt x="95250" y="310247"/>
-                    </a:lnTo>
-                    <a:lnTo>
-                      <a:pt x="83571" y="318121"/>
-                    </a:lnTo>
-                    <a:cubicBezTo>
-                      <a:pt x="76374" y="321165"/>
-                      <a:pt x="68462" y="322848"/>
-                      <a:pt x="60156" y="322848"/>
-                    </a:cubicBezTo>
-                    <a:cubicBezTo>
-                      <a:pt x="26933" y="322848"/>
-                      <a:pt x="0" y="295915"/>
-                      <a:pt x="0" y="262692"/>
-                    </a:cubicBezTo>
-                    <a:cubicBezTo>
-                      <a:pt x="0" y="229469"/>
-                      <a:pt x="26933" y="202536"/>
-                      <a:pt x="60156" y="202536"/>
-                    </a:cubicBezTo>
-                    <a:cubicBezTo>
-                      <a:pt x="68462" y="202536"/>
-                      <a:pt x="76374" y="204220"/>
-                      <a:pt x="83571" y="207264"/>
-                    </a:cubicBezTo>
-                    <a:lnTo>
-                      <a:pt x="95250" y="215138"/>
-                    </a:lnTo>
-                    <a:lnTo>
-                      <a:pt x="95250" y="45363"/>
-                    </a:lnTo>
-                    <a:cubicBezTo>
-                      <a:pt x="95250" y="20310"/>
-                      <a:pt x="115560" y="0"/>
-                      <a:pt x="140613" y="0"/>
-                    </a:cubicBezTo>
-                    <a:lnTo>
-                      <a:pt x="277493" y="0"/>
-                    </a:lnTo>
-                    <a:lnTo>
-                      <a:pt x="274379" y="15425"/>
-                    </a:lnTo>
-                    <a:cubicBezTo>
-                      <a:pt x="274379" y="62403"/>
-                      <a:pt x="312462" y="100486"/>
-                      <a:pt x="359440" y="100486"/>
-                    </a:cubicBezTo>
-                    <a:cubicBezTo>
-                      <a:pt x="406418" y="100486"/>
-                      <a:pt x="444501" y="62403"/>
-                      <a:pt x="444501" y="15425"/>
-                    </a:cubicBezTo>
-                    <a:lnTo>
-                      <a:pt x="441387" y="0"/>
-                    </a:lnTo>
-                    <a:lnTo>
-                      <a:pt x="461310" y="0"/>
-                    </a:lnTo>
-                    <a:cubicBezTo>
-                      <a:pt x="486363" y="0"/>
-                      <a:pt x="506673" y="20310"/>
-                      <a:pt x="506673" y="45363"/>
-                    </a:cubicBezTo>
-                    <a:close/>
-                  </a:path>
-                </a:pathLst>
-              </a:custGeom>
-              <a:solidFill>
-                <a:schemeClr val="accent4"/>
-              </a:solidFill>
-              <a:ln>
-                <a:noFill/>
-              </a:ln>
-            </p:spPr>
-            <p:style>
-              <a:lnRef idx="2">
-                <a:schemeClr val="accent1">
-                  <a:shade val="50000"/>
-                </a:schemeClr>
-              </a:lnRef>
-              <a:fillRef idx="1">
-                <a:schemeClr val="accent1"/>
-              </a:fillRef>
-              <a:effectRef idx="0">
-                <a:schemeClr val="accent1"/>
-              </a:effectRef>
-              <a:fontRef idx="minor">
-                <a:schemeClr val="lt1"/>
-              </a:fontRef>
-            </p:style>
-            <p:txBody>
-              <a:bodyPr wrap="square" rtlCol="0" anchor="ctr">
-                <a:noAutofit/>
-              </a:bodyPr>
-              <a:lstStyle/>
-              <a:p>
-                <a:pPr algn="ctr"/>
-                <a:endParaRPr lang="en-US"/>
-              </a:p>
-            </p:txBody>
-          </p:sp>
-          <p:pic>
-            <p:nvPicPr>
-              <p:cNvPr id="90" name="Picture 89" descr="A picture containing looking, dark&#10;&#10;Description automatically generated">
-                <a:extLst>
-                  <a:ext uri="{FF2B5EF4-FFF2-40B4-BE49-F238E27FC236}">
-                    <a16:creationId xmlns:a16="http://schemas.microsoft.com/office/drawing/2014/main" id="{CA329C34-B38D-4A52-A4B8-A8E27B311949}"/>
-                  </a:ext>
-                </a:extLst>
-              </p:cNvPr>
-              <p:cNvPicPr>
-                <a:picLocks noChangeAspect="1"/>
-              </p:cNvPicPr>
-              <p:nvPr/>
-            </p:nvPicPr>
-            <p:blipFill>
-              <a:blip r:embed="rId4">
-                <a:extLst>
-                  <a:ext uri="{28A0092B-C50C-407E-A947-70E740481C1C}">
-                    <a14:useLocalDpi xmlns:a14="http://schemas.microsoft.com/office/drawing/2010/main" val="0"/>
-                  </a:ext>
-                </a:extLst>
-              </a:blip>
-              <a:stretch>
-                <a:fillRect/>
-              </a:stretch>
-            </p:blipFill>
-            <p:spPr>
-              <a:xfrm rot="19063852">
-                <a:off x="4930991" y="4244038"/>
-                <a:ext cx="323982" cy="167197"/>
-              </a:xfrm>
-              <a:prstGeom prst="rect">
-                <a:avLst/>
-              </a:prstGeom>
-            </p:spPr>
-          </p:pic>
-        </p:grpSp>
-        <p:grpSp>
-          <p:nvGrpSpPr>
-            <p:cNvPr id="95" name="Group 94">
-              <a:extLst>
-                <a:ext uri="{FF2B5EF4-FFF2-40B4-BE49-F238E27FC236}">
-                  <a16:creationId xmlns:a16="http://schemas.microsoft.com/office/drawing/2014/main" id="{B370A35A-7313-4829-BE29-7CEED837BED0}"/>
-                </a:ext>
-              </a:extLst>
-            </p:cNvPr>
-            <p:cNvGrpSpPr/>
-            <p:nvPr/>
-          </p:nvGrpSpPr>
-          <p:grpSpPr>
-            <a:xfrm>
-              <a:off x="4463648" y="4002989"/>
-              <a:ext cx="411423" cy="506673"/>
-              <a:chOff x="4463648" y="4002989"/>
-              <a:chExt cx="411423" cy="506673"/>
-            </a:xfrm>
-          </p:grpSpPr>
-          <p:sp>
-            <p:nvSpPr>
-              <p:cNvPr id="85" name="Freeform: Shape 84">
-                <a:extLst>
-                  <a:ext uri="{FF2B5EF4-FFF2-40B4-BE49-F238E27FC236}">
-                    <a16:creationId xmlns:a16="http://schemas.microsoft.com/office/drawing/2014/main" id="{66EF2578-65A6-4556-B3AD-74DD2D959BE2}"/>
+                    <a16:creationId xmlns:a16="http://schemas.microsoft.com/office/drawing/2014/main" id="{4838923B-F60D-4375-8E4A-C96FF7533FD6}"/>
                   </a:ext>
                 </a:extLst>
               </p:cNvPr>
@@ -5205,54 +4872,54 @@
             </p:nvSpPr>
             <p:spPr>
               <a:xfrm rot="5400000">
-                <a:off x="4416023" y="4050614"/>
-                <a:ext cx="506673" cy="411423"/>
+                <a:off x="4396718" y="5373352"/>
+                <a:ext cx="496911" cy="411423"/>
               </a:xfrm>
               <a:custGeom>
                 <a:avLst/>
                 <a:gdLst>
-                  <a:gd name="connsiteX0" fmla="*/ 506673 w 506673"/>
-                  <a:gd name="connsiteY0" fmla="*/ 45363 h 411423"/>
-                  <a:gd name="connsiteX1" fmla="*/ 506673 w 506673"/>
-                  <a:gd name="connsiteY1" fmla="*/ 366060 h 411423"/>
-                  <a:gd name="connsiteX2" fmla="*/ 461310 w 506673"/>
-                  <a:gd name="connsiteY2" fmla="*/ 411423 h 411423"/>
-                  <a:gd name="connsiteX3" fmla="*/ 140613 w 506673"/>
-                  <a:gd name="connsiteY3" fmla="*/ 411423 h 411423"/>
-                  <a:gd name="connsiteX4" fmla="*/ 95250 w 506673"/>
-                  <a:gd name="connsiteY4" fmla="*/ 366060 h 411423"/>
-                  <a:gd name="connsiteX5" fmla="*/ 95250 w 506673"/>
-                  <a:gd name="connsiteY5" fmla="*/ 310247 h 411423"/>
-                  <a:gd name="connsiteX6" fmla="*/ 83571 w 506673"/>
-                  <a:gd name="connsiteY6" fmla="*/ 318121 h 411423"/>
-                  <a:gd name="connsiteX7" fmla="*/ 60156 w 506673"/>
-                  <a:gd name="connsiteY7" fmla="*/ 322848 h 411423"/>
-                  <a:gd name="connsiteX8" fmla="*/ 0 w 506673"/>
-                  <a:gd name="connsiteY8" fmla="*/ 262692 h 411423"/>
-                  <a:gd name="connsiteX9" fmla="*/ 60156 w 506673"/>
-                  <a:gd name="connsiteY9" fmla="*/ 202536 h 411423"/>
-                  <a:gd name="connsiteX10" fmla="*/ 83571 w 506673"/>
-                  <a:gd name="connsiteY10" fmla="*/ 207264 h 411423"/>
-                  <a:gd name="connsiteX11" fmla="*/ 95250 w 506673"/>
-                  <a:gd name="connsiteY11" fmla="*/ 215138 h 411423"/>
-                  <a:gd name="connsiteX12" fmla="*/ 95250 w 506673"/>
+                  <a:gd name="connsiteX0" fmla="*/ 0 w 496911"/>
+                  <a:gd name="connsiteY0" fmla="*/ 205713 h 411423"/>
+                  <a:gd name="connsiteX1" fmla="*/ 55842 w 496911"/>
+                  <a:gd name="connsiteY1" fmla="*/ 149871 h 411423"/>
+                  <a:gd name="connsiteX2" fmla="*/ 77579 w 496911"/>
+                  <a:gd name="connsiteY2" fmla="*/ 154260 h 411423"/>
+                  <a:gd name="connsiteX3" fmla="*/ 85488 w 496911"/>
+                  <a:gd name="connsiteY3" fmla="*/ 159592 h 411423"/>
+                  <a:gd name="connsiteX4" fmla="*/ 85488 w 496911"/>
+                  <a:gd name="connsiteY4" fmla="*/ 45363 h 411423"/>
+                  <a:gd name="connsiteX5" fmla="*/ 130851 w 496911"/>
+                  <a:gd name="connsiteY5" fmla="*/ 0 h 411423"/>
+                  <a:gd name="connsiteX6" fmla="*/ 210713 w 496911"/>
+                  <a:gd name="connsiteY6" fmla="*/ 0 h 411423"/>
+                  <a:gd name="connsiteX7" fmla="*/ 214845 w 496911"/>
+                  <a:gd name="connsiteY7" fmla="*/ 20470 h 411423"/>
+                  <a:gd name="connsiteX8" fmla="*/ 291199 w 496911"/>
+                  <a:gd name="connsiteY8" fmla="*/ 71080 h 411423"/>
+                  <a:gd name="connsiteX9" fmla="*/ 367553 w 496911"/>
+                  <a:gd name="connsiteY9" fmla="*/ 20470 h 411423"/>
+                  <a:gd name="connsiteX10" fmla="*/ 371686 w 496911"/>
+                  <a:gd name="connsiteY10" fmla="*/ 0 h 411423"/>
+                  <a:gd name="connsiteX11" fmla="*/ 451548 w 496911"/>
+                  <a:gd name="connsiteY11" fmla="*/ 0 h 411423"/>
+                  <a:gd name="connsiteX12" fmla="*/ 496911 w 496911"/>
                   <a:gd name="connsiteY12" fmla="*/ 45363 h 411423"/>
-                  <a:gd name="connsiteX13" fmla="*/ 140613 w 506673"/>
-                  <a:gd name="connsiteY13" fmla="*/ 0 h 411423"/>
-                  <a:gd name="connsiteX14" fmla="*/ 277493 w 506673"/>
-                  <a:gd name="connsiteY14" fmla="*/ 0 h 411423"/>
-                  <a:gd name="connsiteX15" fmla="*/ 274379 w 506673"/>
-                  <a:gd name="connsiteY15" fmla="*/ 15425 h 411423"/>
-                  <a:gd name="connsiteX16" fmla="*/ 359440 w 506673"/>
-                  <a:gd name="connsiteY16" fmla="*/ 100486 h 411423"/>
-                  <a:gd name="connsiteX17" fmla="*/ 444501 w 506673"/>
-                  <a:gd name="connsiteY17" fmla="*/ 15425 h 411423"/>
-                  <a:gd name="connsiteX18" fmla="*/ 441387 w 506673"/>
-                  <a:gd name="connsiteY18" fmla="*/ 0 h 411423"/>
-                  <a:gd name="connsiteX19" fmla="*/ 461310 w 506673"/>
-                  <a:gd name="connsiteY19" fmla="*/ 0 h 411423"/>
-                  <a:gd name="connsiteX20" fmla="*/ 506673 w 506673"/>
-                  <a:gd name="connsiteY20" fmla="*/ 45363 h 411423"/>
+                  <a:gd name="connsiteX13" fmla="*/ 496911 w 496911"/>
+                  <a:gd name="connsiteY13" fmla="*/ 366060 h 411423"/>
+                  <a:gd name="connsiteX14" fmla="*/ 451548 w 496911"/>
+                  <a:gd name="connsiteY14" fmla="*/ 411423 h 411423"/>
+                  <a:gd name="connsiteX15" fmla="*/ 130851 w 496911"/>
+                  <a:gd name="connsiteY15" fmla="*/ 411423 h 411423"/>
+                  <a:gd name="connsiteX16" fmla="*/ 85488 w 496911"/>
+                  <a:gd name="connsiteY16" fmla="*/ 366060 h 411423"/>
+                  <a:gd name="connsiteX17" fmla="*/ 85488 w 496911"/>
+                  <a:gd name="connsiteY17" fmla="*/ 251834 h 411423"/>
+                  <a:gd name="connsiteX18" fmla="*/ 77579 w 496911"/>
+                  <a:gd name="connsiteY18" fmla="*/ 257167 h 411423"/>
+                  <a:gd name="connsiteX19" fmla="*/ 55842 w 496911"/>
+                  <a:gd name="connsiteY19" fmla="*/ 261555 h 411423"/>
+                  <a:gd name="connsiteX20" fmla="*/ 0 w 496911"/>
+                  <a:gd name="connsiteY20" fmla="*/ 205713 h 411423"/>
                 </a:gdLst>
                 <a:ahLst/>
                 <a:cxnLst>
@@ -5322,89 +4989,89 @@
                 </a:cxnLst>
                 <a:rect l="l" t="t" r="r" b="b"/>
                 <a:pathLst>
-                  <a:path w="506673" h="411423">
+                  <a:path w="496911" h="411423">
                     <a:moveTo>
-                      <a:pt x="506673" y="45363"/>
+                      <a:pt x="0" y="205713"/>
                     </a:moveTo>
+                    <a:cubicBezTo>
+                      <a:pt x="0" y="174872"/>
+                      <a:pt x="25001" y="149871"/>
+                      <a:pt x="55842" y="149871"/>
+                    </a:cubicBezTo>
+                    <a:cubicBezTo>
+                      <a:pt x="63553" y="149871"/>
+                      <a:pt x="70898" y="151434"/>
+                      <a:pt x="77579" y="154260"/>
+                    </a:cubicBezTo>
                     <a:lnTo>
-                      <a:pt x="506673" y="366060"/>
+                      <a:pt x="85488" y="159592"/>
+                    </a:lnTo>
+                    <a:lnTo>
+                      <a:pt x="85488" y="45363"/>
                     </a:lnTo>
                     <a:cubicBezTo>
-                      <a:pt x="506673" y="391113"/>
-                      <a:pt x="486363" y="411423"/>
-                      <a:pt x="461310" y="411423"/>
+                      <a:pt x="85488" y="20310"/>
+                      <a:pt x="105798" y="0"/>
+                      <a:pt x="130851" y="0"/>
                     </a:cubicBezTo>
                     <a:lnTo>
-                      <a:pt x="140613" y="411423"/>
+                      <a:pt x="210713" y="0"/>
+                    </a:lnTo>
+                    <a:lnTo>
+                      <a:pt x="214845" y="20470"/>
                     </a:lnTo>
                     <a:cubicBezTo>
-                      <a:pt x="115560" y="411423"/>
-                      <a:pt x="95250" y="391113"/>
-                      <a:pt x="95250" y="366060"/>
+                      <a:pt x="227425" y="50212"/>
+                      <a:pt x="256875" y="71080"/>
+                      <a:pt x="291199" y="71080"/>
+                    </a:cubicBezTo>
+                    <a:cubicBezTo>
+                      <a:pt x="325524" y="71080"/>
+                      <a:pt x="354974" y="50212"/>
+                      <a:pt x="367553" y="20470"/>
                     </a:cubicBezTo>
                     <a:lnTo>
-                      <a:pt x="95250" y="310247"/>
+                      <a:pt x="371686" y="0"/>
                     </a:lnTo>
                     <a:lnTo>
-                      <a:pt x="83571" y="318121"/>
+                      <a:pt x="451548" y="0"/>
                     </a:lnTo>
                     <a:cubicBezTo>
-                      <a:pt x="76374" y="321165"/>
-                      <a:pt x="68462" y="322848"/>
-                      <a:pt x="60156" y="322848"/>
+                      <a:pt x="476601" y="0"/>
+                      <a:pt x="496911" y="20310"/>
+                      <a:pt x="496911" y="45363"/>
+                    </a:cubicBezTo>
+                    <a:lnTo>
+                      <a:pt x="496911" y="366060"/>
+                    </a:lnTo>
+                    <a:cubicBezTo>
+                      <a:pt x="496911" y="391113"/>
+                      <a:pt x="476601" y="411423"/>
+                      <a:pt x="451548" y="411423"/>
+                    </a:cubicBezTo>
+                    <a:lnTo>
+                      <a:pt x="130851" y="411423"/>
+                    </a:lnTo>
+                    <a:cubicBezTo>
+                      <a:pt x="105798" y="411423"/>
+                      <a:pt x="85488" y="391113"/>
+                      <a:pt x="85488" y="366060"/>
+                    </a:cubicBezTo>
+                    <a:lnTo>
+                      <a:pt x="85488" y="251834"/>
+                    </a:lnTo>
+                    <a:lnTo>
+                      <a:pt x="77579" y="257167"/>
+                    </a:lnTo>
+                    <a:cubicBezTo>
+                      <a:pt x="70898" y="259993"/>
+                      <a:pt x="63553" y="261555"/>
+                      <a:pt x="55842" y="261555"/>
                     </a:cubicBezTo>
                     <a:cubicBezTo>
-                      <a:pt x="26933" y="322848"/>
-                      <a:pt x="0" y="295915"/>
-                      <a:pt x="0" y="262692"/>
-                    </a:cubicBezTo>
-                    <a:cubicBezTo>
-                      <a:pt x="0" y="229469"/>
-                      <a:pt x="26933" y="202536"/>
-                      <a:pt x="60156" y="202536"/>
-                    </a:cubicBezTo>
-                    <a:cubicBezTo>
-                      <a:pt x="68462" y="202536"/>
-                      <a:pt x="76374" y="204220"/>
-                      <a:pt x="83571" y="207264"/>
-                    </a:cubicBezTo>
-                    <a:lnTo>
-                      <a:pt x="95250" y="215138"/>
-                    </a:lnTo>
-                    <a:lnTo>
-                      <a:pt x="95250" y="45363"/>
-                    </a:lnTo>
-                    <a:cubicBezTo>
-                      <a:pt x="95250" y="20310"/>
-                      <a:pt x="115560" y="0"/>
-                      <a:pt x="140613" y="0"/>
-                    </a:cubicBezTo>
-                    <a:lnTo>
-                      <a:pt x="277493" y="0"/>
-                    </a:lnTo>
-                    <a:lnTo>
-                      <a:pt x="274379" y="15425"/>
-                    </a:lnTo>
-                    <a:cubicBezTo>
-                      <a:pt x="274379" y="62403"/>
-                      <a:pt x="312462" y="100486"/>
-                      <a:pt x="359440" y="100486"/>
-                    </a:cubicBezTo>
-                    <a:cubicBezTo>
-                      <a:pt x="406418" y="100486"/>
-                      <a:pt x="444501" y="62403"/>
-                      <a:pt x="444501" y="15425"/>
-                    </a:cubicBezTo>
-                    <a:lnTo>
-                      <a:pt x="441387" y="0"/>
-                    </a:lnTo>
-                    <a:lnTo>
-                      <a:pt x="461310" y="0"/>
-                    </a:lnTo>
-                    <a:cubicBezTo>
-                      <a:pt x="486363" y="0"/>
-                      <a:pt x="506673" y="20310"/>
-                      <a:pt x="506673" y="45363"/>
+                      <a:pt x="25001" y="261555"/>
+                      <a:pt x="0" y="236554"/>
+                      <a:pt x="0" y="205713"/>
                     </a:cubicBezTo>
                     <a:close/>
                   </a:path>
@@ -5434,9 +5101,7 @@
               </a:fontRef>
             </p:style>
             <p:txBody>
-              <a:bodyPr wrap="square" rtlCol="0" anchor="ctr">
-                <a:noAutofit/>
-              </a:bodyPr>
+              <a:bodyPr rtlCol="0" anchor="ctr"/>
               <a:lstStyle/>
               <a:p>
                 <a:pPr algn="ctr"/>
@@ -5446,10 +5111,10 @@
           </p:sp>
           <p:pic>
             <p:nvPicPr>
-              <p:cNvPr id="91" name="Picture 90" descr="A black rectangle with a black background&#10;&#10;Description automatically generated with low confidence">
+              <p:cNvPr id="79" name="Picture 78" descr="A black rectangle with a black background&#10;&#10;Description automatically generated with low confidence">
                 <a:extLst>
                   <a:ext uri="{FF2B5EF4-FFF2-40B4-BE49-F238E27FC236}">
-                    <a16:creationId xmlns:a16="http://schemas.microsoft.com/office/drawing/2014/main" id="{4A8CBAF9-3932-457A-9552-7874627C6D10}"/>
+                    <a16:creationId xmlns:a16="http://schemas.microsoft.com/office/drawing/2014/main" id="{01AE67B9-8C4D-46E0-ABE2-E02D6ABE05B4}"/>
                   </a:ext>
                 </a:extLst>
               </p:cNvPr>
@@ -5472,7 +5137,7 @@
             </p:blipFill>
             <p:spPr>
               <a:xfrm>
-                <a:off x="4483625" y="4140358"/>
+                <a:off x="4491389" y="5466170"/>
                 <a:ext cx="303301" cy="303902"/>
               </a:xfrm>
               <a:prstGeom prst="rect">
@@ -5483,10 +5148,10 @@
         </p:grpSp>
         <p:grpSp>
           <p:nvGrpSpPr>
-            <p:cNvPr id="94" name="Group 93">
+            <p:cNvPr id="7" name="Group 6">
               <a:extLst>
                 <a:ext uri="{FF2B5EF4-FFF2-40B4-BE49-F238E27FC236}">
-                  <a16:creationId xmlns:a16="http://schemas.microsoft.com/office/drawing/2014/main" id="{992841DC-16C2-466C-B714-324D2FF6A6C1}"/>
+                  <a16:creationId xmlns:a16="http://schemas.microsoft.com/office/drawing/2014/main" id="{4C8EDAFA-63FC-46AE-94FF-E9787CB5DE7F}"/>
                 </a:ext>
               </a:extLst>
             </p:cNvPr>
@@ -5495,18 +5160,18 @@
           </p:nvGrpSpPr>
           <p:grpSpPr>
             <a:xfrm>
-              <a:off x="4463648" y="3663533"/>
-              <a:ext cx="506673" cy="411423"/>
-              <a:chOff x="4463648" y="3663533"/>
-              <a:chExt cx="506673" cy="411423"/>
+              <a:off x="4439019" y="4941359"/>
+              <a:ext cx="496911" cy="411423"/>
+              <a:chOff x="4439019" y="4941359"/>
+              <a:chExt cx="496911" cy="411423"/>
             </a:xfrm>
           </p:grpSpPr>
           <p:sp>
             <p:nvSpPr>
-              <p:cNvPr id="86" name="Freeform: Shape 85">
+              <p:cNvPr id="75" name="Freeform: Shape 74">
                 <a:extLst>
                   <a:ext uri="{FF2B5EF4-FFF2-40B4-BE49-F238E27FC236}">
-                    <a16:creationId xmlns:a16="http://schemas.microsoft.com/office/drawing/2014/main" id="{092681AA-2BFF-4A82-8224-0FDDB9A55598}"/>
+                    <a16:creationId xmlns:a16="http://schemas.microsoft.com/office/drawing/2014/main" id="{8C9B7EB0-F9A9-4762-9920-56584D26DBC3}"/>
                   </a:ext>
                 </a:extLst>
               </p:cNvPr>
@@ -5517,54 +5182,54 @@
             </p:nvSpPr>
             <p:spPr>
               <a:xfrm rot="10800000">
-                <a:off x="4463648" y="3663533"/>
-                <a:ext cx="506673" cy="411423"/>
+                <a:off x="4439019" y="4941359"/>
+                <a:ext cx="496911" cy="411423"/>
               </a:xfrm>
               <a:custGeom>
                 <a:avLst/>
                 <a:gdLst>
-                  <a:gd name="connsiteX0" fmla="*/ 506673 w 506673"/>
-                  <a:gd name="connsiteY0" fmla="*/ 45363 h 411423"/>
-                  <a:gd name="connsiteX1" fmla="*/ 506673 w 506673"/>
-                  <a:gd name="connsiteY1" fmla="*/ 366060 h 411423"/>
-                  <a:gd name="connsiteX2" fmla="*/ 461310 w 506673"/>
-                  <a:gd name="connsiteY2" fmla="*/ 411423 h 411423"/>
-                  <a:gd name="connsiteX3" fmla="*/ 140613 w 506673"/>
-                  <a:gd name="connsiteY3" fmla="*/ 411423 h 411423"/>
-                  <a:gd name="connsiteX4" fmla="*/ 95250 w 506673"/>
-                  <a:gd name="connsiteY4" fmla="*/ 366060 h 411423"/>
-                  <a:gd name="connsiteX5" fmla="*/ 95250 w 506673"/>
-                  <a:gd name="connsiteY5" fmla="*/ 310247 h 411423"/>
-                  <a:gd name="connsiteX6" fmla="*/ 83571 w 506673"/>
-                  <a:gd name="connsiteY6" fmla="*/ 318121 h 411423"/>
-                  <a:gd name="connsiteX7" fmla="*/ 60156 w 506673"/>
-                  <a:gd name="connsiteY7" fmla="*/ 322848 h 411423"/>
-                  <a:gd name="connsiteX8" fmla="*/ 0 w 506673"/>
-                  <a:gd name="connsiteY8" fmla="*/ 262692 h 411423"/>
-                  <a:gd name="connsiteX9" fmla="*/ 60156 w 506673"/>
-                  <a:gd name="connsiteY9" fmla="*/ 202536 h 411423"/>
-                  <a:gd name="connsiteX10" fmla="*/ 83571 w 506673"/>
-                  <a:gd name="connsiteY10" fmla="*/ 207264 h 411423"/>
-                  <a:gd name="connsiteX11" fmla="*/ 95250 w 506673"/>
-                  <a:gd name="connsiteY11" fmla="*/ 215138 h 411423"/>
-                  <a:gd name="connsiteX12" fmla="*/ 95250 w 506673"/>
+                  <a:gd name="connsiteX0" fmla="*/ 0 w 496911"/>
+                  <a:gd name="connsiteY0" fmla="*/ 205713 h 411423"/>
+                  <a:gd name="connsiteX1" fmla="*/ 55842 w 496911"/>
+                  <a:gd name="connsiteY1" fmla="*/ 149871 h 411423"/>
+                  <a:gd name="connsiteX2" fmla="*/ 77579 w 496911"/>
+                  <a:gd name="connsiteY2" fmla="*/ 154260 h 411423"/>
+                  <a:gd name="connsiteX3" fmla="*/ 85488 w 496911"/>
+                  <a:gd name="connsiteY3" fmla="*/ 159592 h 411423"/>
+                  <a:gd name="connsiteX4" fmla="*/ 85488 w 496911"/>
+                  <a:gd name="connsiteY4" fmla="*/ 45363 h 411423"/>
+                  <a:gd name="connsiteX5" fmla="*/ 130851 w 496911"/>
+                  <a:gd name="connsiteY5" fmla="*/ 0 h 411423"/>
+                  <a:gd name="connsiteX6" fmla="*/ 210713 w 496911"/>
+                  <a:gd name="connsiteY6" fmla="*/ 0 h 411423"/>
+                  <a:gd name="connsiteX7" fmla="*/ 214845 w 496911"/>
+                  <a:gd name="connsiteY7" fmla="*/ 20470 h 411423"/>
+                  <a:gd name="connsiteX8" fmla="*/ 291199 w 496911"/>
+                  <a:gd name="connsiteY8" fmla="*/ 71080 h 411423"/>
+                  <a:gd name="connsiteX9" fmla="*/ 367553 w 496911"/>
+                  <a:gd name="connsiteY9" fmla="*/ 20470 h 411423"/>
+                  <a:gd name="connsiteX10" fmla="*/ 371686 w 496911"/>
+                  <a:gd name="connsiteY10" fmla="*/ 0 h 411423"/>
+                  <a:gd name="connsiteX11" fmla="*/ 451548 w 496911"/>
+                  <a:gd name="connsiteY11" fmla="*/ 0 h 411423"/>
+                  <a:gd name="connsiteX12" fmla="*/ 496911 w 496911"/>
                   <a:gd name="connsiteY12" fmla="*/ 45363 h 411423"/>
-                  <a:gd name="connsiteX13" fmla="*/ 140613 w 506673"/>
-                  <a:gd name="connsiteY13" fmla="*/ 0 h 411423"/>
-                  <a:gd name="connsiteX14" fmla="*/ 277493 w 506673"/>
-                  <a:gd name="connsiteY14" fmla="*/ 0 h 411423"/>
-                  <a:gd name="connsiteX15" fmla="*/ 274379 w 506673"/>
-                  <a:gd name="connsiteY15" fmla="*/ 15425 h 411423"/>
-                  <a:gd name="connsiteX16" fmla="*/ 359440 w 506673"/>
-                  <a:gd name="connsiteY16" fmla="*/ 100486 h 411423"/>
-                  <a:gd name="connsiteX17" fmla="*/ 444501 w 506673"/>
-                  <a:gd name="connsiteY17" fmla="*/ 15425 h 411423"/>
-                  <a:gd name="connsiteX18" fmla="*/ 441387 w 506673"/>
-                  <a:gd name="connsiteY18" fmla="*/ 0 h 411423"/>
-                  <a:gd name="connsiteX19" fmla="*/ 461310 w 506673"/>
-                  <a:gd name="connsiteY19" fmla="*/ 0 h 411423"/>
-                  <a:gd name="connsiteX20" fmla="*/ 506673 w 506673"/>
-                  <a:gd name="connsiteY20" fmla="*/ 45363 h 411423"/>
+                  <a:gd name="connsiteX13" fmla="*/ 496911 w 496911"/>
+                  <a:gd name="connsiteY13" fmla="*/ 366060 h 411423"/>
+                  <a:gd name="connsiteX14" fmla="*/ 451548 w 496911"/>
+                  <a:gd name="connsiteY14" fmla="*/ 411423 h 411423"/>
+                  <a:gd name="connsiteX15" fmla="*/ 130851 w 496911"/>
+                  <a:gd name="connsiteY15" fmla="*/ 411423 h 411423"/>
+                  <a:gd name="connsiteX16" fmla="*/ 85488 w 496911"/>
+                  <a:gd name="connsiteY16" fmla="*/ 366060 h 411423"/>
+                  <a:gd name="connsiteX17" fmla="*/ 85488 w 496911"/>
+                  <a:gd name="connsiteY17" fmla="*/ 251834 h 411423"/>
+                  <a:gd name="connsiteX18" fmla="*/ 77579 w 496911"/>
+                  <a:gd name="connsiteY18" fmla="*/ 257167 h 411423"/>
+                  <a:gd name="connsiteX19" fmla="*/ 55842 w 496911"/>
+                  <a:gd name="connsiteY19" fmla="*/ 261555 h 411423"/>
+                  <a:gd name="connsiteX20" fmla="*/ 0 w 496911"/>
+                  <a:gd name="connsiteY20" fmla="*/ 205713 h 411423"/>
                 </a:gdLst>
                 <a:ahLst/>
                 <a:cxnLst>
@@ -5634,89 +5299,89 @@
                 </a:cxnLst>
                 <a:rect l="l" t="t" r="r" b="b"/>
                 <a:pathLst>
-                  <a:path w="506673" h="411423">
+                  <a:path w="496911" h="411423">
                     <a:moveTo>
-                      <a:pt x="506673" y="45363"/>
+                      <a:pt x="0" y="205713"/>
                     </a:moveTo>
+                    <a:cubicBezTo>
+                      <a:pt x="0" y="174872"/>
+                      <a:pt x="25001" y="149871"/>
+                      <a:pt x="55842" y="149871"/>
+                    </a:cubicBezTo>
+                    <a:cubicBezTo>
+                      <a:pt x="63553" y="149871"/>
+                      <a:pt x="70898" y="151434"/>
+                      <a:pt x="77579" y="154260"/>
+                    </a:cubicBezTo>
                     <a:lnTo>
-                      <a:pt x="506673" y="366060"/>
+                      <a:pt x="85488" y="159592"/>
+                    </a:lnTo>
+                    <a:lnTo>
+                      <a:pt x="85488" y="45363"/>
                     </a:lnTo>
                     <a:cubicBezTo>
-                      <a:pt x="506673" y="391113"/>
-                      <a:pt x="486363" y="411423"/>
-                      <a:pt x="461310" y="411423"/>
+                      <a:pt x="85488" y="20310"/>
+                      <a:pt x="105798" y="0"/>
+                      <a:pt x="130851" y="0"/>
                     </a:cubicBezTo>
                     <a:lnTo>
-                      <a:pt x="140613" y="411423"/>
+                      <a:pt x="210713" y="0"/>
+                    </a:lnTo>
+                    <a:lnTo>
+                      <a:pt x="214845" y="20470"/>
                     </a:lnTo>
                     <a:cubicBezTo>
-                      <a:pt x="115560" y="411423"/>
-                      <a:pt x="95250" y="391113"/>
-                      <a:pt x="95250" y="366060"/>
+                      <a:pt x="227425" y="50212"/>
+                      <a:pt x="256875" y="71080"/>
+                      <a:pt x="291199" y="71080"/>
+                    </a:cubicBezTo>
+                    <a:cubicBezTo>
+                      <a:pt x="325524" y="71080"/>
+                      <a:pt x="354974" y="50212"/>
+                      <a:pt x="367553" y="20470"/>
                     </a:cubicBezTo>
                     <a:lnTo>
-                      <a:pt x="95250" y="310247"/>
+                      <a:pt x="371686" y="0"/>
                     </a:lnTo>
                     <a:lnTo>
-                      <a:pt x="83571" y="318121"/>
+                      <a:pt x="451548" y="0"/>
                     </a:lnTo>
                     <a:cubicBezTo>
-                      <a:pt x="76374" y="321165"/>
-                      <a:pt x="68462" y="322848"/>
-                      <a:pt x="60156" y="322848"/>
+                      <a:pt x="476601" y="0"/>
+                      <a:pt x="496911" y="20310"/>
+                      <a:pt x="496911" y="45363"/>
+                    </a:cubicBezTo>
+                    <a:lnTo>
+                      <a:pt x="496911" y="366060"/>
+                    </a:lnTo>
+                    <a:cubicBezTo>
+                      <a:pt x="496911" y="391113"/>
+                      <a:pt x="476601" y="411423"/>
+                      <a:pt x="451548" y="411423"/>
+                    </a:cubicBezTo>
+                    <a:lnTo>
+                      <a:pt x="130851" y="411423"/>
+                    </a:lnTo>
+                    <a:cubicBezTo>
+                      <a:pt x="105798" y="411423"/>
+                      <a:pt x="85488" y="391113"/>
+                      <a:pt x="85488" y="366060"/>
+                    </a:cubicBezTo>
+                    <a:lnTo>
+                      <a:pt x="85488" y="251834"/>
+                    </a:lnTo>
+                    <a:lnTo>
+                      <a:pt x="77579" y="257167"/>
+                    </a:lnTo>
+                    <a:cubicBezTo>
+                      <a:pt x="70898" y="259993"/>
+                      <a:pt x="63553" y="261555"/>
+                      <a:pt x="55842" y="261555"/>
                     </a:cubicBezTo>
                     <a:cubicBezTo>
-                      <a:pt x="26933" y="322848"/>
-                      <a:pt x="0" y="295915"/>
-                      <a:pt x="0" y="262692"/>
-                    </a:cubicBezTo>
-                    <a:cubicBezTo>
-                      <a:pt x="0" y="229469"/>
-                      <a:pt x="26933" y="202536"/>
-                      <a:pt x="60156" y="202536"/>
-                    </a:cubicBezTo>
-                    <a:cubicBezTo>
-                      <a:pt x="68462" y="202536"/>
-                      <a:pt x="76374" y="204220"/>
-                      <a:pt x="83571" y="207264"/>
-                    </a:cubicBezTo>
-                    <a:lnTo>
-                      <a:pt x="95250" y="215138"/>
-                    </a:lnTo>
-                    <a:lnTo>
-                      <a:pt x="95250" y="45363"/>
-                    </a:lnTo>
-                    <a:cubicBezTo>
-                      <a:pt x="95250" y="20310"/>
-                      <a:pt x="115560" y="0"/>
-                      <a:pt x="140613" y="0"/>
-                    </a:cubicBezTo>
-                    <a:lnTo>
-                      <a:pt x="277493" y="0"/>
-                    </a:lnTo>
-                    <a:lnTo>
-                      <a:pt x="274379" y="15425"/>
-                    </a:lnTo>
-                    <a:cubicBezTo>
-                      <a:pt x="274379" y="62403"/>
-                      <a:pt x="312462" y="100486"/>
-                      <a:pt x="359440" y="100486"/>
-                    </a:cubicBezTo>
-                    <a:cubicBezTo>
-                      <a:pt x="406418" y="100486"/>
-                      <a:pt x="444501" y="62403"/>
-                      <a:pt x="444501" y="15425"/>
-                    </a:cubicBezTo>
-                    <a:lnTo>
-                      <a:pt x="441387" y="0"/>
-                    </a:lnTo>
-                    <a:lnTo>
-                      <a:pt x="461310" y="0"/>
-                    </a:lnTo>
-                    <a:cubicBezTo>
-                      <a:pt x="486363" y="0"/>
-                      <a:pt x="506673" y="20310"/>
-                      <a:pt x="506673" y="45363"/>
+                      <a:pt x="25001" y="261555"/>
+                      <a:pt x="0" y="236554"/>
+                      <a:pt x="0" y="205713"/>
                     </a:cubicBezTo>
                     <a:close/>
                   </a:path>
@@ -5746,9 +5411,7 @@
               </a:fontRef>
             </p:style>
             <p:txBody>
-              <a:bodyPr wrap="square" rtlCol="0" anchor="ctr">
-                <a:noAutofit/>
-              </a:bodyPr>
+              <a:bodyPr rtlCol="0" anchor="ctr"/>
               <a:lstStyle/>
               <a:p>
                 <a:pPr algn="ctr"/>
@@ -5758,10 +5421,10 @@
           </p:sp>
           <p:pic>
             <p:nvPicPr>
-              <p:cNvPr id="92" name="Picture 91" descr="A picture containing night sky&#10;&#10;Description automatically generated">
+              <p:cNvPr id="81" name="Picture 80" descr="A picture containing night sky&#10;&#10;Description automatically generated">
                 <a:extLst>
                   <a:ext uri="{FF2B5EF4-FFF2-40B4-BE49-F238E27FC236}">
-                    <a16:creationId xmlns:a16="http://schemas.microsoft.com/office/drawing/2014/main" id="{8B534C98-A366-4536-B564-7B4DB6551CA0}"/>
+                    <a16:creationId xmlns:a16="http://schemas.microsoft.com/office/drawing/2014/main" id="{E9830282-AA9B-48BC-801A-FAF9630E8620}"/>
                   </a:ext>
                 </a:extLst>
               </p:cNvPr>
@@ -5783,9 +5446,9 @@
               </a:stretch>
             </p:blipFill>
             <p:spPr>
-              <a:xfrm flipH="1">
-                <a:off x="4531795" y="3692954"/>
-                <a:ext cx="262895" cy="273138"/>
+              <a:xfrm>
+                <a:off x="4496657" y="4987677"/>
+                <a:ext cx="275503" cy="286237"/>
               </a:xfrm>
               <a:prstGeom prst="rect">
                 <a:avLst/>
@@ -5797,13 +5460,302 @@
             </p:spPr>
           </p:pic>
         </p:grpSp>
+        <p:sp>
+          <p:nvSpPr>
+            <p:cNvPr id="113" name="Freeform: Shape 112">
+              <a:extLst>
+                <a:ext uri="{FF2B5EF4-FFF2-40B4-BE49-F238E27FC236}">
+                  <a16:creationId xmlns:a16="http://schemas.microsoft.com/office/drawing/2014/main" id="{6854340B-D2FA-47B9-9278-F244CA604BCA}"/>
+                </a:ext>
+              </a:extLst>
+            </p:cNvPr>
+            <p:cNvSpPr>
+              <a:spLocks noChangeAspect="1"/>
+            </p:cNvSpPr>
+            <p:nvPr/>
+          </p:nvSpPr>
+          <p:spPr>
+            <a:xfrm>
+              <a:off x="4822423" y="5416265"/>
+              <a:ext cx="496911" cy="411423"/>
+            </a:xfrm>
+            <a:custGeom>
+              <a:avLst/>
+              <a:gdLst>
+                <a:gd name="connsiteX0" fmla="*/ 0 w 496911"/>
+                <a:gd name="connsiteY0" fmla="*/ 205713 h 411423"/>
+                <a:gd name="connsiteX1" fmla="*/ 55842 w 496911"/>
+                <a:gd name="connsiteY1" fmla="*/ 149871 h 411423"/>
+                <a:gd name="connsiteX2" fmla="*/ 77579 w 496911"/>
+                <a:gd name="connsiteY2" fmla="*/ 154260 h 411423"/>
+                <a:gd name="connsiteX3" fmla="*/ 85488 w 496911"/>
+                <a:gd name="connsiteY3" fmla="*/ 159592 h 411423"/>
+                <a:gd name="connsiteX4" fmla="*/ 85488 w 496911"/>
+                <a:gd name="connsiteY4" fmla="*/ 45363 h 411423"/>
+                <a:gd name="connsiteX5" fmla="*/ 130851 w 496911"/>
+                <a:gd name="connsiteY5" fmla="*/ 0 h 411423"/>
+                <a:gd name="connsiteX6" fmla="*/ 210713 w 496911"/>
+                <a:gd name="connsiteY6" fmla="*/ 0 h 411423"/>
+                <a:gd name="connsiteX7" fmla="*/ 214845 w 496911"/>
+                <a:gd name="connsiteY7" fmla="*/ 20470 h 411423"/>
+                <a:gd name="connsiteX8" fmla="*/ 291199 w 496911"/>
+                <a:gd name="connsiteY8" fmla="*/ 71080 h 411423"/>
+                <a:gd name="connsiteX9" fmla="*/ 367553 w 496911"/>
+                <a:gd name="connsiteY9" fmla="*/ 20470 h 411423"/>
+                <a:gd name="connsiteX10" fmla="*/ 371686 w 496911"/>
+                <a:gd name="connsiteY10" fmla="*/ 0 h 411423"/>
+                <a:gd name="connsiteX11" fmla="*/ 451548 w 496911"/>
+                <a:gd name="connsiteY11" fmla="*/ 0 h 411423"/>
+                <a:gd name="connsiteX12" fmla="*/ 496911 w 496911"/>
+                <a:gd name="connsiteY12" fmla="*/ 45363 h 411423"/>
+                <a:gd name="connsiteX13" fmla="*/ 496911 w 496911"/>
+                <a:gd name="connsiteY13" fmla="*/ 366060 h 411423"/>
+                <a:gd name="connsiteX14" fmla="*/ 451548 w 496911"/>
+                <a:gd name="connsiteY14" fmla="*/ 411423 h 411423"/>
+                <a:gd name="connsiteX15" fmla="*/ 130851 w 496911"/>
+                <a:gd name="connsiteY15" fmla="*/ 411423 h 411423"/>
+                <a:gd name="connsiteX16" fmla="*/ 85488 w 496911"/>
+                <a:gd name="connsiteY16" fmla="*/ 366060 h 411423"/>
+                <a:gd name="connsiteX17" fmla="*/ 85488 w 496911"/>
+                <a:gd name="connsiteY17" fmla="*/ 251834 h 411423"/>
+                <a:gd name="connsiteX18" fmla="*/ 77579 w 496911"/>
+                <a:gd name="connsiteY18" fmla="*/ 257167 h 411423"/>
+                <a:gd name="connsiteX19" fmla="*/ 55842 w 496911"/>
+                <a:gd name="connsiteY19" fmla="*/ 261555 h 411423"/>
+                <a:gd name="connsiteX20" fmla="*/ 0 w 496911"/>
+                <a:gd name="connsiteY20" fmla="*/ 205713 h 411423"/>
+              </a:gdLst>
+              <a:ahLst/>
+              <a:cxnLst>
+                <a:cxn ang="0">
+                  <a:pos x="connsiteX0" y="connsiteY0"/>
+                </a:cxn>
+                <a:cxn ang="0">
+                  <a:pos x="connsiteX1" y="connsiteY1"/>
+                </a:cxn>
+                <a:cxn ang="0">
+                  <a:pos x="connsiteX2" y="connsiteY2"/>
+                </a:cxn>
+                <a:cxn ang="0">
+                  <a:pos x="connsiteX3" y="connsiteY3"/>
+                </a:cxn>
+                <a:cxn ang="0">
+                  <a:pos x="connsiteX4" y="connsiteY4"/>
+                </a:cxn>
+                <a:cxn ang="0">
+                  <a:pos x="connsiteX5" y="connsiteY5"/>
+                </a:cxn>
+                <a:cxn ang="0">
+                  <a:pos x="connsiteX6" y="connsiteY6"/>
+                </a:cxn>
+                <a:cxn ang="0">
+                  <a:pos x="connsiteX7" y="connsiteY7"/>
+                </a:cxn>
+                <a:cxn ang="0">
+                  <a:pos x="connsiteX8" y="connsiteY8"/>
+                </a:cxn>
+                <a:cxn ang="0">
+                  <a:pos x="connsiteX9" y="connsiteY9"/>
+                </a:cxn>
+                <a:cxn ang="0">
+                  <a:pos x="connsiteX10" y="connsiteY10"/>
+                </a:cxn>
+                <a:cxn ang="0">
+                  <a:pos x="connsiteX11" y="connsiteY11"/>
+                </a:cxn>
+                <a:cxn ang="0">
+                  <a:pos x="connsiteX12" y="connsiteY12"/>
+                </a:cxn>
+                <a:cxn ang="0">
+                  <a:pos x="connsiteX13" y="connsiteY13"/>
+                </a:cxn>
+                <a:cxn ang="0">
+                  <a:pos x="connsiteX14" y="connsiteY14"/>
+                </a:cxn>
+                <a:cxn ang="0">
+                  <a:pos x="connsiteX15" y="connsiteY15"/>
+                </a:cxn>
+                <a:cxn ang="0">
+                  <a:pos x="connsiteX16" y="connsiteY16"/>
+                </a:cxn>
+                <a:cxn ang="0">
+                  <a:pos x="connsiteX17" y="connsiteY17"/>
+                </a:cxn>
+                <a:cxn ang="0">
+                  <a:pos x="connsiteX18" y="connsiteY18"/>
+                </a:cxn>
+                <a:cxn ang="0">
+                  <a:pos x="connsiteX19" y="connsiteY19"/>
+                </a:cxn>
+                <a:cxn ang="0">
+                  <a:pos x="connsiteX20" y="connsiteY20"/>
+                </a:cxn>
+              </a:cxnLst>
+              <a:rect l="l" t="t" r="r" b="b"/>
+              <a:pathLst>
+                <a:path w="496911" h="411423">
+                  <a:moveTo>
+                    <a:pt x="0" y="205713"/>
+                  </a:moveTo>
+                  <a:cubicBezTo>
+                    <a:pt x="0" y="174872"/>
+                    <a:pt x="25001" y="149871"/>
+                    <a:pt x="55842" y="149871"/>
+                  </a:cubicBezTo>
+                  <a:cubicBezTo>
+                    <a:pt x="63553" y="149871"/>
+                    <a:pt x="70898" y="151434"/>
+                    <a:pt x="77579" y="154260"/>
+                  </a:cubicBezTo>
+                  <a:lnTo>
+                    <a:pt x="85488" y="159592"/>
+                  </a:lnTo>
+                  <a:lnTo>
+                    <a:pt x="85488" y="45363"/>
+                  </a:lnTo>
+                  <a:cubicBezTo>
+                    <a:pt x="85488" y="20310"/>
+                    <a:pt x="105798" y="0"/>
+                    <a:pt x="130851" y="0"/>
+                  </a:cubicBezTo>
+                  <a:lnTo>
+                    <a:pt x="210713" y="0"/>
+                  </a:lnTo>
+                  <a:lnTo>
+                    <a:pt x="214845" y="20470"/>
+                  </a:lnTo>
+                  <a:cubicBezTo>
+                    <a:pt x="227425" y="50212"/>
+                    <a:pt x="256875" y="71080"/>
+                    <a:pt x="291199" y="71080"/>
+                  </a:cubicBezTo>
+                  <a:cubicBezTo>
+                    <a:pt x="325524" y="71080"/>
+                    <a:pt x="354974" y="50212"/>
+                    <a:pt x="367553" y="20470"/>
+                  </a:cubicBezTo>
+                  <a:lnTo>
+                    <a:pt x="371686" y="0"/>
+                  </a:lnTo>
+                  <a:lnTo>
+                    <a:pt x="451548" y="0"/>
+                  </a:lnTo>
+                  <a:cubicBezTo>
+                    <a:pt x="476601" y="0"/>
+                    <a:pt x="496911" y="20310"/>
+                    <a:pt x="496911" y="45363"/>
+                  </a:cubicBezTo>
+                  <a:lnTo>
+                    <a:pt x="496911" y="366060"/>
+                  </a:lnTo>
+                  <a:cubicBezTo>
+                    <a:pt x="496911" y="391113"/>
+                    <a:pt x="476601" y="411423"/>
+                    <a:pt x="451548" y="411423"/>
+                  </a:cubicBezTo>
+                  <a:lnTo>
+                    <a:pt x="130851" y="411423"/>
+                  </a:lnTo>
+                  <a:cubicBezTo>
+                    <a:pt x="105798" y="411423"/>
+                    <a:pt x="85488" y="391113"/>
+                    <a:pt x="85488" y="366060"/>
+                  </a:cubicBezTo>
+                  <a:lnTo>
+                    <a:pt x="85488" y="251834"/>
+                  </a:lnTo>
+                  <a:lnTo>
+                    <a:pt x="77579" y="257167"/>
+                  </a:lnTo>
+                  <a:cubicBezTo>
+                    <a:pt x="70898" y="259993"/>
+                    <a:pt x="63553" y="261555"/>
+                    <a:pt x="55842" y="261555"/>
+                  </a:cubicBezTo>
+                  <a:cubicBezTo>
+                    <a:pt x="25001" y="261555"/>
+                    <a:pt x="0" y="236554"/>
+                    <a:pt x="0" y="205713"/>
+                  </a:cubicBezTo>
+                  <a:close/>
+                </a:path>
+              </a:pathLst>
+            </a:custGeom>
+            <a:solidFill>
+              <a:srgbClr val="FFC000"/>
+            </a:solidFill>
+            <a:ln>
+              <a:noFill/>
+            </a:ln>
+          </p:spPr>
+          <p:style>
+            <a:lnRef idx="2">
+              <a:schemeClr val="accent1">
+                <a:shade val="50000"/>
+              </a:schemeClr>
+            </a:lnRef>
+            <a:fillRef idx="1">
+              <a:schemeClr val="accent1"/>
+            </a:fillRef>
+            <a:effectRef idx="0">
+              <a:schemeClr val="accent1"/>
+            </a:effectRef>
+            <a:fontRef idx="minor">
+              <a:schemeClr val="lt1"/>
+            </a:fontRef>
+          </p:style>
+          <p:txBody>
+            <a:bodyPr rtlCol="0" anchor="ctr"/>
+            <a:lstStyle/>
+            <a:p>
+              <a:pPr algn="ctr"/>
+              <a:endParaRPr lang="en-US"/>
+            </a:p>
+          </p:txBody>
+        </p:sp>
+        <p:pic>
+          <p:nvPicPr>
+            <p:cNvPr id="115" name="Picture 114" descr="A picture containing looking, dark&#10;&#10;Description automatically generated">
+              <a:extLst>
+                <a:ext uri="{FF2B5EF4-FFF2-40B4-BE49-F238E27FC236}">
+                  <a16:creationId xmlns:a16="http://schemas.microsoft.com/office/drawing/2014/main" id="{03FFE2C6-FFED-4F81-8678-71A3E7B3EA5E}"/>
+                </a:ext>
+              </a:extLst>
+            </p:cNvPr>
+            <p:cNvPicPr>
+              <a:picLocks noChangeAspect="1"/>
+            </p:cNvPicPr>
+            <p:nvPr/>
+          </p:nvPicPr>
+          <p:blipFill>
+            <a:blip r:embed="rId4">
+              <a:extLst>
+                <a:ext uri="{28A0092B-C50C-407E-A947-70E740481C1C}">
+                  <a14:useLocalDpi xmlns:a14="http://schemas.microsoft.com/office/drawing/2010/main" val="0"/>
+                </a:ext>
+              </a:extLst>
+            </a:blip>
+            <a:stretch>
+              <a:fillRect/>
+            </a:stretch>
+          </p:blipFill>
+          <p:spPr>
+            <a:xfrm rot="19063852">
+              <a:off x="4950042" y="5532484"/>
+              <a:ext cx="323982" cy="167197"/>
+            </a:xfrm>
+            <a:prstGeom prst="rect">
+              <a:avLst/>
+            </a:prstGeom>
+          </p:spPr>
+        </p:pic>
       </p:grpSp>
       <p:grpSp>
         <p:nvGrpSpPr>
-          <p:cNvPr id="112" name="Group 111">
+          <p:cNvPr id="38" name="Group 37">
             <a:extLst>
               <a:ext uri="{FF2B5EF4-FFF2-40B4-BE49-F238E27FC236}">
-                <a16:creationId xmlns:a16="http://schemas.microsoft.com/office/drawing/2014/main" id="{025B908C-A340-4A01-A824-CB382884FC3D}"/>
+                <a16:creationId xmlns:a16="http://schemas.microsoft.com/office/drawing/2014/main" id="{2BE832A7-BC8E-45AC-BFBE-5DDA39E69D1E}"/>
               </a:ext>
             </a:extLst>
           </p:cNvPr>
@@ -5812,1287 +5764,12 @@
         </p:nvGrpSpPr>
         <p:grpSpPr>
           <a:xfrm>
-            <a:off x="6307764" y="4011202"/>
-            <a:ext cx="1911052" cy="2036868"/>
-            <a:chOff x="6307764" y="4011202"/>
-            <a:chExt cx="1911052" cy="2036868"/>
+            <a:off x="6366357" y="4140358"/>
+            <a:ext cx="1898179" cy="1944529"/>
+            <a:chOff x="6366357" y="4140358"/>
+            <a:chExt cx="1898179" cy="1944529"/>
           </a:xfrm>
         </p:grpSpPr>
-        <p:grpSp>
-          <p:nvGrpSpPr>
-            <p:cNvPr id="98" name="Group 97">
-              <a:extLst>
-                <a:ext uri="{FF2B5EF4-FFF2-40B4-BE49-F238E27FC236}">
-                  <a16:creationId xmlns:a16="http://schemas.microsoft.com/office/drawing/2014/main" id="{5CB70F1F-175D-4DAA-A35E-E98E244E247D}"/>
-                </a:ext>
-              </a:extLst>
-            </p:cNvPr>
-            <p:cNvGrpSpPr>
-              <a:grpSpLocks noChangeAspect="1"/>
-            </p:cNvGrpSpPr>
-            <p:nvPr/>
-          </p:nvGrpSpPr>
-          <p:grpSpPr>
-            <a:xfrm>
-              <a:off x="6485607" y="4011202"/>
-              <a:ext cx="1733209" cy="1656258"/>
-              <a:chOff x="4463648" y="3592719"/>
-              <a:chExt cx="959545" cy="916943"/>
-            </a:xfrm>
-          </p:grpSpPr>
-          <p:grpSp>
-            <p:nvGrpSpPr>
-              <p:cNvPr id="99" name="Group 98">
-                <a:extLst>
-                  <a:ext uri="{FF2B5EF4-FFF2-40B4-BE49-F238E27FC236}">
-                    <a16:creationId xmlns:a16="http://schemas.microsoft.com/office/drawing/2014/main" id="{C969539E-56B7-4C4F-8AB1-3EAA60B6D9AA}"/>
-                  </a:ext>
-                </a:extLst>
-              </p:cNvPr>
-              <p:cNvGrpSpPr/>
-              <p:nvPr/>
-            </p:nvGrpSpPr>
-            <p:grpSpPr>
-              <a:xfrm rot="1863789">
-                <a:off x="5011770" y="3592719"/>
-                <a:ext cx="411423" cy="506673"/>
-                <a:chOff x="5004965" y="3565991"/>
-                <a:chExt cx="411423" cy="506673"/>
-              </a:xfrm>
-            </p:grpSpPr>
-            <p:sp>
-              <p:nvSpPr>
-                <p:cNvPr id="109" name="Freeform: Shape 108">
-                  <a:extLst>
-                    <a:ext uri="{FF2B5EF4-FFF2-40B4-BE49-F238E27FC236}">
-                      <a16:creationId xmlns:a16="http://schemas.microsoft.com/office/drawing/2014/main" id="{F5F01804-32CE-4E60-9A4E-21C5A8A13AC1}"/>
-                    </a:ext>
-                  </a:extLst>
-                </p:cNvPr>
-                <p:cNvSpPr>
-                  <a:spLocks noChangeAspect="1"/>
-                </p:cNvSpPr>
-                <p:nvPr/>
-              </p:nvSpPr>
-              <p:spPr>
-                <a:xfrm rot="16200000">
-                  <a:off x="4957340" y="3613616"/>
-                  <a:ext cx="506673" cy="411423"/>
-                </a:xfrm>
-                <a:custGeom>
-                  <a:avLst/>
-                  <a:gdLst>
-                    <a:gd name="connsiteX0" fmla="*/ 506673 w 506673"/>
-                    <a:gd name="connsiteY0" fmla="*/ 45363 h 411423"/>
-                    <a:gd name="connsiteX1" fmla="*/ 506673 w 506673"/>
-                    <a:gd name="connsiteY1" fmla="*/ 366060 h 411423"/>
-                    <a:gd name="connsiteX2" fmla="*/ 461310 w 506673"/>
-                    <a:gd name="connsiteY2" fmla="*/ 411423 h 411423"/>
-                    <a:gd name="connsiteX3" fmla="*/ 140613 w 506673"/>
-                    <a:gd name="connsiteY3" fmla="*/ 411423 h 411423"/>
-                    <a:gd name="connsiteX4" fmla="*/ 95250 w 506673"/>
-                    <a:gd name="connsiteY4" fmla="*/ 366060 h 411423"/>
-                    <a:gd name="connsiteX5" fmla="*/ 95250 w 506673"/>
-                    <a:gd name="connsiteY5" fmla="*/ 310247 h 411423"/>
-                    <a:gd name="connsiteX6" fmla="*/ 83571 w 506673"/>
-                    <a:gd name="connsiteY6" fmla="*/ 318121 h 411423"/>
-                    <a:gd name="connsiteX7" fmla="*/ 60156 w 506673"/>
-                    <a:gd name="connsiteY7" fmla="*/ 322848 h 411423"/>
-                    <a:gd name="connsiteX8" fmla="*/ 0 w 506673"/>
-                    <a:gd name="connsiteY8" fmla="*/ 262692 h 411423"/>
-                    <a:gd name="connsiteX9" fmla="*/ 60156 w 506673"/>
-                    <a:gd name="connsiteY9" fmla="*/ 202536 h 411423"/>
-                    <a:gd name="connsiteX10" fmla="*/ 83571 w 506673"/>
-                    <a:gd name="connsiteY10" fmla="*/ 207264 h 411423"/>
-                    <a:gd name="connsiteX11" fmla="*/ 95250 w 506673"/>
-                    <a:gd name="connsiteY11" fmla="*/ 215138 h 411423"/>
-                    <a:gd name="connsiteX12" fmla="*/ 95250 w 506673"/>
-                    <a:gd name="connsiteY12" fmla="*/ 45363 h 411423"/>
-                    <a:gd name="connsiteX13" fmla="*/ 140613 w 506673"/>
-                    <a:gd name="connsiteY13" fmla="*/ 0 h 411423"/>
-                    <a:gd name="connsiteX14" fmla="*/ 277493 w 506673"/>
-                    <a:gd name="connsiteY14" fmla="*/ 0 h 411423"/>
-                    <a:gd name="connsiteX15" fmla="*/ 274379 w 506673"/>
-                    <a:gd name="connsiteY15" fmla="*/ 15425 h 411423"/>
-                    <a:gd name="connsiteX16" fmla="*/ 359440 w 506673"/>
-                    <a:gd name="connsiteY16" fmla="*/ 100486 h 411423"/>
-                    <a:gd name="connsiteX17" fmla="*/ 444501 w 506673"/>
-                    <a:gd name="connsiteY17" fmla="*/ 15425 h 411423"/>
-                    <a:gd name="connsiteX18" fmla="*/ 441387 w 506673"/>
-                    <a:gd name="connsiteY18" fmla="*/ 0 h 411423"/>
-                    <a:gd name="connsiteX19" fmla="*/ 461310 w 506673"/>
-                    <a:gd name="connsiteY19" fmla="*/ 0 h 411423"/>
-                    <a:gd name="connsiteX20" fmla="*/ 506673 w 506673"/>
-                    <a:gd name="connsiteY20" fmla="*/ 45363 h 411423"/>
-                  </a:gdLst>
-                  <a:ahLst/>
-                  <a:cxnLst>
-                    <a:cxn ang="0">
-                      <a:pos x="connsiteX0" y="connsiteY0"/>
-                    </a:cxn>
-                    <a:cxn ang="0">
-                      <a:pos x="connsiteX1" y="connsiteY1"/>
-                    </a:cxn>
-                    <a:cxn ang="0">
-                      <a:pos x="connsiteX2" y="connsiteY2"/>
-                    </a:cxn>
-                    <a:cxn ang="0">
-                      <a:pos x="connsiteX3" y="connsiteY3"/>
-                    </a:cxn>
-                    <a:cxn ang="0">
-                      <a:pos x="connsiteX4" y="connsiteY4"/>
-                    </a:cxn>
-                    <a:cxn ang="0">
-                      <a:pos x="connsiteX5" y="connsiteY5"/>
-                    </a:cxn>
-                    <a:cxn ang="0">
-                      <a:pos x="connsiteX6" y="connsiteY6"/>
-                    </a:cxn>
-                    <a:cxn ang="0">
-                      <a:pos x="connsiteX7" y="connsiteY7"/>
-                    </a:cxn>
-                    <a:cxn ang="0">
-                      <a:pos x="connsiteX8" y="connsiteY8"/>
-                    </a:cxn>
-                    <a:cxn ang="0">
-                      <a:pos x="connsiteX9" y="connsiteY9"/>
-                    </a:cxn>
-                    <a:cxn ang="0">
-                      <a:pos x="connsiteX10" y="connsiteY10"/>
-                    </a:cxn>
-                    <a:cxn ang="0">
-                      <a:pos x="connsiteX11" y="connsiteY11"/>
-                    </a:cxn>
-                    <a:cxn ang="0">
-                      <a:pos x="connsiteX12" y="connsiteY12"/>
-                    </a:cxn>
-                    <a:cxn ang="0">
-                      <a:pos x="connsiteX13" y="connsiteY13"/>
-                    </a:cxn>
-                    <a:cxn ang="0">
-                      <a:pos x="connsiteX14" y="connsiteY14"/>
-                    </a:cxn>
-                    <a:cxn ang="0">
-                      <a:pos x="connsiteX15" y="connsiteY15"/>
-                    </a:cxn>
-                    <a:cxn ang="0">
-                      <a:pos x="connsiteX16" y="connsiteY16"/>
-                    </a:cxn>
-                    <a:cxn ang="0">
-                      <a:pos x="connsiteX17" y="connsiteY17"/>
-                    </a:cxn>
-                    <a:cxn ang="0">
-                      <a:pos x="connsiteX18" y="connsiteY18"/>
-                    </a:cxn>
-                    <a:cxn ang="0">
-                      <a:pos x="connsiteX19" y="connsiteY19"/>
-                    </a:cxn>
-                    <a:cxn ang="0">
-                      <a:pos x="connsiteX20" y="connsiteY20"/>
-                    </a:cxn>
-                  </a:cxnLst>
-                  <a:rect l="l" t="t" r="r" b="b"/>
-                  <a:pathLst>
-                    <a:path w="506673" h="411423">
-                      <a:moveTo>
-                        <a:pt x="506673" y="45363"/>
-                      </a:moveTo>
-                      <a:lnTo>
-                        <a:pt x="506673" y="366060"/>
-                      </a:lnTo>
-                      <a:cubicBezTo>
-                        <a:pt x="506673" y="391113"/>
-                        <a:pt x="486363" y="411423"/>
-                        <a:pt x="461310" y="411423"/>
-                      </a:cubicBezTo>
-                      <a:lnTo>
-                        <a:pt x="140613" y="411423"/>
-                      </a:lnTo>
-                      <a:cubicBezTo>
-                        <a:pt x="115560" y="411423"/>
-                        <a:pt x="95250" y="391113"/>
-                        <a:pt x="95250" y="366060"/>
-                      </a:cubicBezTo>
-                      <a:lnTo>
-                        <a:pt x="95250" y="310247"/>
-                      </a:lnTo>
-                      <a:lnTo>
-                        <a:pt x="83571" y="318121"/>
-                      </a:lnTo>
-                      <a:cubicBezTo>
-                        <a:pt x="76374" y="321165"/>
-                        <a:pt x="68462" y="322848"/>
-                        <a:pt x="60156" y="322848"/>
-                      </a:cubicBezTo>
-                      <a:cubicBezTo>
-                        <a:pt x="26933" y="322848"/>
-                        <a:pt x="0" y="295915"/>
-                        <a:pt x="0" y="262692"/>
-                      </a:cubicBezTo>
-                      <a:cubicBezTo>
-                        <a:pt x="0" y="229469"/>
-                        <a:pt x="26933" y="202536"/>
-                        <a:pt x="60156" y="202536"/>
-                      </a:cubicBezTo>
-                      <a:cubicBezTo>
-                        <a:pt x="68462" y="202536"/>
-                        <a:pt x="76374" y="204220"/>
-                        <a:pt x="83571" y="207264"/>
-                      </a:cubicBezTo>
-                      <a:lnTo>
-                        <a:pt x="95250" y="215138"/>
-                      </a:lnTo>
-                      <a:lnTo>
-                        <a:pt x="95250" y="45363"/>
-                      </a:lnTo>
-                      <a:cubicBezTo>
-                        <a:pt x="95250" y="20310"/>
-                        <a:pt x="115560" y="0"/>
-                        <a:pt x="140613" y="0"/>
-                      </a:cubicBezTo>
-                      <a:lnTo>
-                        <a:pt x="277493" y="0"/>
-                      </a:lnTo>
-                      <a:lnTo>
-                        <a:pt x="274379" y="15425"/>
-                      </a:lnTo>
-                      <a:cubicBezTo>
-                        <a:pt x="274379" y="62403"/>
-                        <a:pt x="312462" y="100486"/>
-                        <a:pt x="359440" y="100486"/>
-                      </a:cubicBezTo>
-                      <a:cubicBezTo>
-                        <a:pt x="406418" y="100486"/>
-                        <a:pt x="444501" y="62403"/>
-                        <a:pt x="444501" y="15425"/>
-                      </a:cubicBezTo>
-                      <a:lnTo>
-                        <a:pt x="441387" y="0"/>
-                      </a:lnTo>
-                      <a:lnTo>
-                        <a:pt x="461310" y="0"/>
-                      </a:lnTo>
-                      <a:cubicBezTo>
-                        <a:pt x="486363" y="0"/>
-                        <a:pt x="506673" y="20310"/>
-                        <a:pt x="506673" y="45363"/>
-                      </a:cubicBezTo>
-                      <a:close/>
-                    </a:path>
-                  </a:pathLst>
-                </a:custGeom>
-                <a:solidFill>
-                  <a:srgbClr val="92D050"/>
-                </a:solidFill>
-                <a:ln>
-                  <a:noFill/>
-                </a:ln>
-              </p:spPr>
-              <p:style>
-                <a:lnRef idx="2">
-                  <a:schemeClr val="accent1">
-                    <a:shade val="50000"/>
-                  </a:schemeClr>
-                </a:lnRef>
-                <a:fillRef idx="1">
-                  <a:schemeClr val="accent1"/>
-                </a:fillRef>
-                <a:effectRef idx="0">
-                  <a:schemeClr val="accent1"/>
-                </a:effectRef>
-                <a:fontRef idx="minor">
-                  <a:schemeClr val="lt1"/>
-                </a:fontRef>
-              </p:style>
-              <p:txBody>
-                <a:bodyPr wrap="square" rtlCol="0" anchor="ctr">
-                  <a:noAutofit/>
-                </a:bodyPr>
-                <a:lstStyle/>
-                <a:p>
-                  <a:pPr algn="ctr"/>
-                  <a:endParaRPr lang="en-US"/>
-                </a:p>
-              </p:txBody>
-            </p:sp>
-            <p:pic>
-              <p:nvPicPr>
-                <p:cNvPr id="110" name="Picture 109" descr="Shape&#10;&#10;Description automatically generated with medium confidence">
-                  <a:extLst>
-                    <a:ext uri="{FF2B5EF4-FFF2-40B4-BE49-F238E27FC236}">
-                      <a16:creationId xmlns:a16="http://schemas.microsoft.com/office/drawing/2014/main" id="{EF53972B-FFAE-4AA4-8A47-095683E8CA5F}"/>
-                    </a:ext>
-                  </a:extLst>
-                </p:cNvPr>
-                <p:cNvPicPr>
-                  <a:picLocks noChangeAspect="1"/>
-                </p:cNvPicPr>
-                <p:nvPr/>
-              </p:nvPicPr>
-              <p:blipFill>
-                <a:blip r:embed="rId5">
-                  <a:extLst>
-                    <a:ext uri="{28A0092B-C50C-407E-A947-70E740481C1C}">
-                      <a14:useLocalDpi xmlns:a14="http://schemas.microsoft.com/office/drawing/2010/main" val="0"/>
-                    </a:ext>
-                  </a:extLst>
-                </a:blip>
-                <a:stretch>
-                  <a:fillRect/>
-                </a:stretch>
-              </p:blipFill>
-              <p:spPr>
-                <a:xfrm rot="21582343">
-                  <a:off x="5111803" y="3625465"/>
-                  <a:ext cx="290443" cy="253233"/>
-                </a:xfrm>
-                <a:prstGeom prst="rect">
-                  <a:avLst/>
-                </a:prstGeom>
-              </p:spPr>
-            </p:pic>
-          </p:grpSp>
-          <p:grpSp>
-            <p:nvGrpSpPr>
-              <p:cNvPr id="100" name="Group 99">
-                <a:extLst>
-                  <a:ext uri="{FF2B5EF4-FFF2-40B4-BE49-F238E27FC236}">
-                    <a16:creationId xmlns:a16="http://schemas.microsoft.com/office/drawing/2014/main" id="{43180E15-AF0D-45A5-BEF6-EA8CCA7E60CA}"/>
-                  </a:ext>
-                </a:extLst>
-              </p:cNvPr>
-              <p:cNvGrpSpPr/>
-              <p:nvPr/>
-            </p:nvGrpSpPr>
-            <p:grpSpPr>
-              <a:xfrm>
-                <a:off x="4803373" y="4098239"/>
-                <a:ext cx="506673" cy="411423"/>
-                <a:chOff x="4803373" y="4098239"/>
-                <a:chExt cx="506673" cy="411423"/>
-              </a:xfrm>
-            </p:grpSpPr>
-            <p:sp>
-              <p:nvSpPr>
-                <p:cNvPr id="107" name="Freeform: Shape 106">
-                  <a:extLst>
-                    <a:ext uri="{FF2B5EF4-FFF2-40B4-BE49-F238E27FC236}">
-                      <a16:creationId xmlns:a16="http://schemas.microsoft.com/office/drawing/2014/main" id="{5A616491-CF45-40B3-9D2B-0DAA040A8909}"/>
-                    </a:ext>
-                  </a:extLst>
-                </p:cNvPr>
-                <p:cNvSpPr>
-                  <a:spLocks noChangeAspect="1"/>
-                </p:cNvSpPr>
-                <p:nvPr/>
-              </p:nvSpPr>
-              <p:spPr>
-                <a:xfrm>
-                  <a:off x="4803373" y="4098239"/>
-                  <a:ext cx="506673" cy="411423"/>
-                </a:xfrm>
-                <a:custGeom>
-                  <a:avLst/>
-                  <a:gdLst>
-                    <a:gd name="connsiteX0" fmla="*/ 506673 w 506673"/>
-                    <a:gd name="connsiteY0" fmla="*/ 45363 h 411423"/>
-                    <a:gd name="connsiteX1" fmla="*/ 506673 w 506673"/>
-                    <a:gd name="connsiteY1" fmla="*/ 366060 h 411423"/>
-                    <a:gd name="connsiteX2" fmla="*/ 461310 w 506673"/>
-                    <a:gd name="connsiteY2" fmla="*/ 411423 h 411423"/>
-                    <a:gd name="connsiteX3" fmla="*/ 140613 w 506673"/>
-                    <a:gd name="connsiteY3" fmla="*/ 411423 h 411423"/>
-                    <a:gd name="connsiteX4" fmla="*/ 95250 w 506673"/>
-                    <a:gd name="connsiteY4" fmla="*/ 366060 h 411423"/>
-                    <a:gd name="connsiteX5" fmla="*/ 95250 w 506673"/>
-                    <a:gd name="connsiteY5" fmla="*/ 310247 h 411423"/>
-                    <a:gd name="connsiteX6" fmla="*/ 83571 w 506673"/>
-                    <a:gd name="connsiteY6" fmla="*/ 318121 h 411423"/>
-                    <a:gd name="connsiteX7" fmla="*/ 60156 w 506673"/>
-                    <a:gd name="connsiteY7" fmla="*/ 322848 h 411423"/>
-                    <a:gd name="connsiteX8" fmla="*/ 0 w 506673"/>
-                    <a:gd name="connsiteY8" fmla="*/ 262692 h 411423"/>
-                    <a:gd name="connsiteX9" fmla="*/ 60156 w 506673"/>
-                    <a:gd name="connsiteY9" fmla="*/ 202536 h 411423"/>
-                    <a:gd name="connsiteX10" fmla="*/ 83571 w 506673"/>
-                    <a:gd name="connsiteY10" fmla="*/ 207264 h 411423"/>
-                    <a:gd name="connsiteX11" fmla="*/ 95250 w 506673"/>
-                    <a:gd name="connsiteY11" fmla="*/ 215138 h 411423"/>
-                    <a:gd name="connsiteX12" fmla="*/ 95250 w 506673"/>
-                    <a:gd name="connsiteY12" fmla="*/ 45363 h 411423"/>
-                    <a:gd name="connsiteX13" fmla="*/ 140613 w 506673"/>
-                    <a:gd name="connsiteY13" fmla="*/ 0 h 411423"/>
-                    <a:gd name="connsiteX14" fmla="*/ 277493 w 506673"/>
-                    <a:gd name="connsiteY14" fmla="*/ 0 h 411423"/>
-                    <a:gd name="connsiteX15" fmla="*/ 274379 w 506673"/>
-                    <a:gd name="connsiteY15" fmla="*/ 15425 h 411423"/>
-                    <a:gd name="connsiteX16" fmla="*/ 359440 w 506673"/>
-                    <a:gd name="connsiteY16" fmla="*/ 100486 h 411423"/>
-                    <a:gd name="connsiteX17" fmla="*/ 444501 w 506673"/>
-                    <a:gd name="connsiteY17" fmla="*/ 15425 h 411423"/>
-                    <a:gd name="connsiteX18" fmla="*/ 441387 w 506673"/>
-                    <a:gd name="connsiteY18" fmla="*/ 0 h 411423"/>
-                    <a:gd name="connsiteX19" fmla="*/ 461310 w 506673"/>
-                    <a:gd name="connsiteY19" fmla="*/ 0 h 411423"/>
-                    <a:gd name="connsiteX20" fmla="*/ 506673 w 506673"/>
-                    <a:gd name="connsiteY20" fmla="*/ 45363 h 411423"/>
-                  </a:gdLst>
-                  <a:ahLst/>
-                  <a:cxnLst>
-                    <a:cxn ang="0">
-                      <a:pos x="connsiteX0" y="connsiteY0"/>
-                    </a:cxn>
-                    <a:cxn ang="0">
-                      <a:pos x="connsiteX1" y="connsiteY1"/>
-                    </a:cxn>
-                    <a:cxn ang="0">
-                      <a:pos x="connsiteX2" y="connsiteY2"/>
-                    </a:cxn>
-                    <a:cxn ang="0">
-                      <a:pos x="connsiteX3" y="connsiteY3"/>
-                    </a:cxn>
-                    <a:cxn ang="0">
-                      <a:pos x="connsiteX4" y="connsiteY4"/>
-                    </a:cxn>
-                    <a:cxn ang="0">
-                      <a:pos x="connsiteX5" y="connsiteY5"/>
-                    </a:cxn>
-                    <a:cxn ang="0">
-                      <a:pos x="connsiteX6" y="connsiteY6"/>
-                    </a:cxn>
-                    <a:cxn ang="0">
-                      <a:pos x="connsiteX7" y="connsiteY7"/>
-                    </a:cxn>
-                    <a:cxn ang="0">
-                      <a:pos x="connsiteX8" y="connsiteY8"/>
-                    </a:cxn>
-                    <a:cxn ang="0">
-                      <a:pos x="connsiteX9" y="connsiteY9"/>
-                    </a:cxn>
-                    <a:cxn ang="0">
-                      <a:pos x="connsiteX10" y="connsiteY10"/>
-                    </a:cxn>
-                    <a:cxn ang="0">
-                      <a:pos x="connsiteX11" y="connsiteY11"/>
-                    </a:cxn>
-                    <a:cxn ang="0">
-                      <a:pos x="connsiteX12" y="connsiteY12"/>
-                    </a:cxn>
-                    <a:cxn ang="0">
-                      <a:pos x="connsiteX13" y="connsiteY13"/>
-                    </a:cxn>
-                    <a:cxn ang="0">
-                      <a:pos x="connsiteX14" y="connsiteY14"/>
-                    </a:cxn>
-                    <a:cxn ang="0">
-                      <a:pos x="connsiteX15" y="connsiteY15"/>
-                    </a:cxn>
-                    <a:cxn ang="0">
-                      <a:pos x="connsiteX16" y="connsiteY16"/>
-                    </a:cxn>
-                    <a:cxn ang="0">
-                      <a:pos x="connsiteX17" y="connsiteY17"/>
-                    </a:cxn>
-                    <a:cxn ang="0">
-                      <a:pos x="connsiteX18" y="connsiteY18"/>
-                    </a:cxn>
-                    <a:cxn ang="0">
-                      <a:pos x="connsiteX19" y="connsiteY19"/>
-                    </a:cxn>
-                    <a:cxn ang="0">
-                      <a:pos x="connsiteX20" y="connsiteY20"/>
-                    </a:cxn>
-                  </a:cxnLst>
-                  <a:rect l="l" t="t" r="r" b="b"/>
-                  <a:pathLst>
-                    <a:path w="506673" h="411423">
-                      <a:moveTo>
-                        <a:pt x="506673" y="45363"/>
-                      </a:moveTo>
-                      <a:lnTo>
-                        <a:pt x="506673" y="366060"/>
-                      </a:lnTo>
-                      <a:cubicBezTo>
-                        <a:pt x="506673" y="391113"/>
-                        <a:pt x="486363" y="411423"/>
-                        <a:pt x="461310" y="411423"/>
-                      </a:cubicBezTo>
-                      <a:lnTo>
-                        <a:pt x="140613" y="411423"/>
-                      </a:lnTo>
-                      <a:cubicBezTo>
-                        <a:pt x="115560" y="411423"/>
-                        <a:pt x="95250" y="391113"/>
-                        <a:pt x="95250" y="366060"/>
-                      </a:cubicBezTo>
-                      <a:lnTo>
-                        <a:pt x="95250" y="310247"/>
-                      </a:lnTo>
-                      <a:lnTo>
-                        <a:pt x="83571" y="318121"/>
-                      </a:lnTo>
-                      <a:cubicBezTo>
-                        <a:pt x="76374" y="321165"/>
-                        <a:pt x="68462" y="322848"/>
-                        <a:pt x="60156" y="322848"/>
-                      </a:cubicBezTo>
-                      <a:cubicBezTo>
-                        <a:pt x="26933" y="322848"/>
-                        <a:pt x="0" y="295915"/>
-                        <a:pt x="0" y="262692"/>
-                      </a:cubicBezTo>
-                      <a:cubicBezTo>
-                        <a:pt x="0" y="229469"/>
-                        <a:pt x="26933" y="202536"/>
-                        <a:pt x="60156" y="202536"/>
-                      </a:cubicBezTo>
-                      <a:cubicBezTo>
-                        <a:pt x="68462" y="202536"/>
-                        <a:pt x="76374" y="204220"/>
-                        <a:pt x="83571" y="207264"/>
-                      </a:cubicBezTo>
-                      <a:lnTo>
-                        <a:pt x="95250" y="215138"/>
-                      </a:lnTo>
-                      <a:lnTo>
-                        <a:pt x="95250" y="45363"/>
-                      </a:lnTo>
-                      <a:cubicBezTo>
-                        <a:pt x="95250" y="20310"/>
-                        <a:pt x="115560" y="0"/>
-                        <a:pt x="140613" y="0"/>
-                      </a:cubicBezTo>
-                      <a:lnTo>
-                        <a:pt x="277493" y="0"/>
-                      </a:lnTo>
-                      <a:lnTo>
-                        <a:pt x="274379" y="15425"/>
-                      </a:lnTo>
-                      <a:cubicBezTo>
-                        <a:pt x="274379" y="62403"/>
-                        <a:pt x="312462" y="100486"/>
-                        <a:pt x="359440" y="100486"/>
-                      </a:cubicBezTo>
-                      <a:cubicBezTo>
-                        <a:pt x="406418" y="100486"/>
-                        <a:pt x="444501" y="62403"/>
-                        <a:pt x="444501" y="15425"/>
-                      </a:cubicBezTo>
-                      <a:lnTo>
-                        <a:pt x="441387" y="0"/>
-                      </a:lnTo>
-                      <a:lnTo>
-                        <a:pt x="461310" y="0"/>
-                      </a:lnTo>
-                      <a:cubicBezTo>
-                        <a:pt x="486363" y="0"/>
-                        <a:pt x="506673" y="20310"/>
-                        <a:pt x="506673" y="45363"/>
-                      </a:cubicBezTo>
-                      <a:close/>
-                    </a:path>
-                  </a:pathLst>
-                </a:custGeom>
-                <a:solidFill>
-                  <a:schemeClr val="accent4"/>
-                </a:solidFill>
-                <a:ln>
-                  <a:noFill/>
-                </a:ln>
-              </p:spPr>
-              <p:style>
-                <a:lnRef idx="2">
-                  <a:schemeClr val="accent1">
-                    <a:shade val="50000"/>
-                  </a:schemeClr>
-                </a:lnRef>
-                <a:fillRef idx="1">
-                  <a:schemeClr val="accent1"/>
-                </a:fillRef>
-                <a:effectRef idx="0">
-                  <a:schemeClr val="accent1"/>
-                </a:effectRef>
-                <a:fontRef idx="minor">
-                  <a:schemeClr val="lt1"/>
-                </a:fontRef>
-              </p:style>
-              <p:txBody>
-                <a:bodyPr wrap="square" rtlCol="0" anchor="ctr">
-                  <a:noAutofit/>
-                </a:bodyPr>
-                <a:lstStyle/>
-                <a:p>
-                  <a:pPr algn="ctr"/>
-                  <a:endParaRPr lang="en-US"/>
-                </a:p>
-              </p:txBody>
-            </p:sp>
-            <p:pic>
-              <p:nvPicPr>
-                <p:cNvPr id="108" name="Picture 107" descr="A picture containing looking, dark&#10;&#10;Description automatically generated">
-                  <a:extLst>
-                    <a:ext uri="{FF2B5EF4-FFF2-40B4-BE49-F238E27FC236}">
-                      <a16:creationId xmlns:a16="http://schemas.microsoft.com/office/drawing/2014/main" id="{FF65B8AD-B5AD-4093-BDA2-B24A0F0F3495}"/>
-                    </a:ext>
-                  </a:extLst>
-                </p:cNvPr>
-                <p:cNvPicPr>
-                  <a:picLocks noChangeAspect="1"/>
-                </p:cNvPicPr>
-                <p:nvPr/>
-              </p:nvPicPr>
-              <p:blipFill>
-                <a:blip r:embed="rId4">
-                  <a:extLst>
-                    <a:ext uri="{28A0092B-C50C-407E-A947-70E740481C1C}">
-                      <a14:useLocalDpi xmlns:a14="http://schemas.microsoft.com/office/drawing/2010/main" val="0"/>
-                    </a:ext>
-                  </a:extLst>
-                </a:blip>
-                <a:stretch>
-                  <a:fillRect/>
-                </a:stretch>
-              </p:blipFill>
-              <p:spPr>
-                <a:xfrm rot="19063852">
-                  <a:off x="4930991" y="4244038"/>
-                  <a:ext cx="323982" cy="167197"/>
-                </a:xfrm>
-                <a:prstGeom prst="rect">
-                  <a:avLst/>
-                </a:prstGeom>
-              </p:spPr>
-            </p:pic>
-          </p:grpSp>
-          <p:grpSp>
-            <p:nvGrpSpPr>
-              <p:cNvPr id="101" name="Group 100">
-                <a:extLst>
-                  <a:ext uri="{FF2B5EF4-FFF2-40B4-BE49-F238E27FC236}">
-                    <a16:creationId xmlns:a16="http://schemas.microsoft.com/office/drawing/2014/main" id="{43DE2CDF-4588-4CE5-A360-5986D7CF278C}"/>
-                  </a:ext>
-                </a:extLst>
-              </p:cNvPr>
-              <p:cNvGrpSpPr/>
-              <p:nvPr/>
-            </p:nvGrpSpPr>
-            <p:grpSpPr>
-              <a:xfrm>
-                <a:off x="4463648" y="4002989"/>
-                <a:ext cx="411423" cy="506673"/>
-                <a:chOff x="4463648" y="4002989"/>
-                <a:chExt cx="411423" cy="506673"/>
-              </a:xfrm>
-            </p:grpSpPr>
-            <p:sp>
-              <p:nvSpPr>
-                <p:cNvPr id="105" name="Freeform: Shape 104">
-                  <a:extLst>
-                    <a:ext uri="{FF2B5EF4-FFF2-40B4-BE49-F238E27FC236}">
-                      <a16:creationId xmlns:a16="http://schemas.microsoft.com/office/drawing/2014/main" id="{4DAA47DA-28CD-4D06-96E9-15CD2E0E8E49}"/>
-                    </a:ext>
-                  </a:extLst>
-                </p:cNvPr>
-                <p:cNvSpPr>
-                  <a:spLocks noChangeAspect="1"/>
-                </p:cNvSpPr>
-                <p:nvPr/>
-              </p:nvSpPr>
-              <p:spPr>
-                <a:xfrm rot="5400000">
-                  <a:off x="4416023" y="4050614"/>
-                  <a:ext cx="506673" cy="411423"/>
-                </a:xfrm>
-                <a:custGeom>
-                  <a:avLst/>
-                  <a:gdLst>
-                    <a:gd name="connsiteX0" fmla="*/ 506673 w 506673"/>
-                    <a:gd name="connsiteY0" fmla="*/ 45363 h 411423"/>
-                    <a:gd name="connsiteX1" fmla="*/ 506673 w 506673"/>
-                    <a:gd name="connsiteY1" fmla="*/ 366060 h 411423"/>
-                    <a:gd name="connsiteX2" fmla="*/ 461310 w 506673"/>
-                    <a:gd name="connsiteY2" fmla="*/ 411423 h 411423"/>
-                    <a:gd name="connsiteX3" fmla="*/ 140613 w 506673"/>
-                    <a:gd name="connsiteY3" fmla="*/ 411423 h 411423"/>
-                    <a:gd name="connsiteX4" fmla="*/ 95250 w 506673"/>
-                    <a:gd name="connsiteY4" fmla="*/ 366060 h 411423"/>
-                    <a:gd name="connsiteX5" fmla="*/ 95250 w 506673"/>
-                    <a:gd name="connsiteY5" fmla="*/ 310247 h 411423"/>
-                    <a:gd name="connsiteX6" fmla="*/ 83571 w 506673"/>
-                    <a:gd name="connsiteY6" fmla="*/ 318121 h 411423"/>
-                    <a:gd name="connsiteX7" fmla="*/ 60156 w 506673"/>
-                    <a:gd name="connsiteY7" fmla="*/ 322848 h 411423"/>
-                    <a:gd name="connsiteX8" fmla="*/ 0 w 506673"/>
-                    <a:gd name="connsiteY8" fmla="*/ 262692 h 411423"/>
-                    <a:gd name="connsiteX9" fmla="*/ 60156 w 506673"/>
-                    <a:gd name="connsiteY9" fmla="*/ 202536 h 411423"/>
-                    <a:gd name="connsiteX10" fmla="*/ 83571 w 506673"/>
-                    <a:gd name="connsiteY10" fmla="*/ 207264 h 411423"/>
-                    <a:gd name="connsiteX11" fmla="*/ 95250 w 506673"/>
-                    <a:gd name="connsiteY11" fmla="*/ 215138 h 411423"/>
-                    <a:gd name="connsiteX12" fmla="*/ 95250 w 506673"/>
-                    <a:gd name="connsiteY12" fmla="*/ 45363 h 411423"/>
-                    <a:gd name="connsiteX13" fmla="*/ 140613 w 506673"/>
-                    <a:gd name="connsiteY13" fmla="*/ 0 h 411423"/>
-                    <a:gd name="connsiteX14" fmla="*/ 277493 w 506673"/>
-                    <a:gd name="connsiteY14" fmla="*/ 0 h 411423"/>
-                    <a:gd name="connsiteX15" fmla="*/ 274379 w 506673"/>
-                    <a:gd name="connsiteY15" fmla="*/ 15425 h 411423"/>
-                    <a:gd name="connsiteX16" fmla="*/ 359440 w 506673"/>
-                    <a:gd name="connsiteY16" fmla="*/ 100486 h 411423"/>
-                    <a:gd name="connsiteX17" fmla="*/ 444501 w 506673"/>
-                    <a:gd name="connsiteY17" fmla="*/ 15425 h 411423"/>
-                    <a:gd name="connsiteX18" fmla="*/ 441387 w 506673"/>
-                    <a:gd name="connsiteY18" fmla="*/ 0 h 411423"/>
-                    <a:gd name="connsiteX19" fmla="*/ 461310 w 506673"/>
-                    <a:gd name="connsiteY19" fmla="*/ 0 h 411423"/>
-                    <a:gd name="connsiteX20" fmla="*/ 506673 w 506673"/>
-                    <a:gd name="connsiteY20" fmla="*/ 45363 h 411423"/>
-                  </a:gdLst>
-                  <a:ahLst/>
-                  <a:cxnLst>
-                    <a:cxn ang="0">
-                      <a:pos x="connsiteX0" y="connsiteY0"/>
-                    </a:cxn>
-                    <a:cxn ang="0">
-                      <a:pos x="connsiteX1" y="connsiteY1"/>
-                    </a:cxn>
-                    <a:cxn ang="0">
-                      <a:pos x="connsiteX2" y="connsiteY2"/>
-                    </a:cxn>
-                    <a:cxn ang="0">
-                      <a:pos x="connsiteX3" y="connsiteY3"/>
-                    </a:cxn>
-                    <a:cxn ang="0">
-                      <a:pos x="connsiteX4" y="connsiteY4"/>
-                    </a:cxn>
-                    <a:cxn ang="0">
-                      <a:pos x="connsiteX5" y="connsiteY5"/>
-                    </a:cxn>
-                    <a:cxn ang="0">
-                      <a:pos x="connsiteX6" y="connsiteY6"/>
-                    </a:cxn>
-                    <a:cxn ang="0">
-                      <a:pos x="connsiteX7" y="connsiteY7"/>
-                    </a:cxn>
-                    <a:cxn ang="0">
-                      <a:pos x="connsiteX8" y="connsiteY8"/>
-                    </a:cxn>
-                    <a:cxn ang="0">
-                      <a:pos x="connsiteX9" y="connsiteY9"/>
-                    </a:cxn>
-                    <a:cxn ang="0">
-                      <a:pos x="connsiteX10" y="connsiteY10"/>
-                    </a:cxn>
-                    <a:cxn ang="0">
-                      <a:pos x="connsiteX11" y="connsiteY11"/>
-                    </a:cxn>
-                    <a:cxn ang="0">
-                      <a:pos x="connsiteX12" y="connsiteY12"/>
-                    </a:cxn>
-                    <a:cxn ang="0">
-                      <a:pos x="connsiteX13" y="connsiteY13"/>
-                    </a:cxn>
-                    <a:cxn ang="0">
-                      <a:pos x="connsiteX14" y="connsiteY14"/>
-                    </a:cxn>
-                    <a:cxn ang="0">
-                      <a:pos x="connsiteX15" y="connsiteY15"/>
-                    </a:cxn>
-                    <a:cxn ang="0">
-                      <a:pos x="connsiteX16" y="connsiteY16"/>
-                    </a:cxn>
-                    <a:cxn ang="0">
-                      <a:pos x="connsiteX17" y="connsiteY17"/>
-                    </a:cxn>
-                    <a:cxn ang="0">
-                      <a:pos x="connsiteX18" y="connsiteY18"/>
-                    </a:cxn>
-                    <a:cxn ang="0">
-                      <a:pos x="connsiteX19" y="connsiteY19"/>
-                    </a:cxn>
-                    <a:cxn ang="0">
-                      <a:pos x="connsiteX20" y="connsiteY20"/>
-                    </a:cxn>
-                  </a:cxnLst>
-                  <a:rect l="l" t="t" r="r" b="b"/>
-                  <a:pathLst>
-                    <a:path w="506673" h="411423">
-                      <a:moveTo>
-                        <a:pt x="506673" y="45363"/>
-                      </a:moveTo>
-                      <a:lnTo>
-                        <a:pt x="506673" y="366060"/>
-                      </a:lnTo>
-                      <a:cubicBezTo>
-                        <a:pt x="506673" y="391113"/>
-                        <a:pt x="486363" y="411423"/>
-                        <a:pt x="461310" y="411423"/>
-                      </a:cubicBezTo>
-                      <a:lnTo>
-                        <a:pt x="140613" y="411423"/>
-                      </a:lnTo>
-                      <a:cubicBezTo>
-                        <a:pt x="115560" y="411423"/>
-                        <a:pt x="95250" y="391113"/>
-                        <a:pt x="95250" y="366060"/>
-                      </a:cubicBezTo>
-                      <a:lnTo>
-                        <a:pt x="95250" y="310247"/>
-                      </a:lnTo>
-                      <a:lnTo>
-                        <a:pt x="83571" y="318121"/>
-                      </a:lnTo>
-                      <a:cubicBezTo>
-                        <a:pt x="76374" y="321165"/>
-                        <a:pt x="68462" y="322848"/>
-                        <a:pt x="60156" y="322848"/>
-                      </a:cubicBezTo>
-                      <a:cubicBezTo>
-                        <a:pt x="26933" y="322848"/>
-                        <a:pt x="0" y="295915"/>
-                        <a:pt x="0" y="262692"/>
-                      </a:cubicBezTo>
-                      <a:cubicBezTo>
-                        <a:pt x="0" y="229469"/>
-                        <a:pt x="26933" y="202536"/>
-                        <a:pt x="60156" y="202536"/>
-                      </a:cubicBezTo>
-                      <a:cubicBezTo>
-                        <a:pt x="68462" y="202536"/>
-                        <a:pt x="76374" y="204220"/>
-                        <a:pt x="83571" y="207264"/>
-                      </a:cubicBezTo>
-                      <a:lnTo>
-                        <a:pt x="95250" y="215138"/>
-                      </a:lnTo>
-                      <a:lnTo>
-                        <a:pt x="95250" y="45363"/>
-                      </a:lnTo>
-                      <a:cubicBezTo>
-                        <a:pt x="95250" y="20310"/>
-                        <a:pt x="115560" y="0"/>
-                        <a:pt x="140613" y="0"/>
-                      </a:cubicBezTo>
-                      <a:lnTo>
-                        <a:pt x="277493" y="0"/>
-                      </a:lnTo>
-                      <a:lnTo>
-                        <a:pt x="274379" y="15425"/>
-                      </a:lnTo>
-                      <a:cubicBezTo>
-                        <a:pt x="274379" y="62403"/>
-                        <a:pt x="312462" y="100486"/>
-                        <a:pt x="359440" y="100486"/>
-                      </a:cubicBezTo>
-                      <a:cubicBezTo>
-                        <a:pt x="406418" y="100486"/>
-                        <a:pt x="444501" y="62403"/>
-                        <a:pt x="444501" y="15425"/>
-                      </a:cubicBezTo>
-                      <a:lnTo>
-                        <a:pt x="441387" y="0"/>
-                      </a:lnTo>
-                      <a:lnTo>
-                        <a:pt x="461310" y="0"/>
-                      </a:lnTo>
-                      <a:cubicBezTo>
-                        <a:pt x="486363" y="0"/>
-                        <a:pt x="506673" y="20310"/>
-                        <a:pt x="506673" y="45363"/>
-                      </a:cubicBezTo>
-                      <a:close/>
-                    </a:path>
-                  </a:pathLst>
-                </a:custGeom>
-                <a:solidFill>
-                  <a:srgbClr val="3399FF"/>
-                </a:solidFill>
-                <a:ln>
-                  <a:noFill/>
-                </a:ln>
-              </p:spPr>
-              <p:style>
-                <a:lnRef idx="2">
-                  <a:schemeClr val="accent1">
-                    <a:shade val="50000"/>
-                  </a:schemeClr>
-                </a:lnRef>
-                <a:fillRef idx="1">
-                  <a:schemeClr val="accent1"/>
-                </a:fillRef>
-                <a:effectRef idx="0">
-                  <a:schemeClr val="accent1"/>
-                </a:effectRef>
-                <a:fontRef idx="minor">
-                  <a:schemeClr val="lt1"/>
-                </a:fontRef>
-              </p:style>
-              <p:txBody>
-                <a:bodyPr wrap="square" rtlCol="0" anchor="ctr">
-                  <a:noAutofit/>
-                </a:bodyPr>
-                <a:lstStyle/>
-                <a:p>
-                  <a:pPr algn="ctr"/>
-                  <a:endParaRPr lang="en-US"/>
-                </a:p>
-              </p:txBody>
-            </p:sp>
-            <p:pic>
-              <p:nvPicPr>
-                <p:cNvPr id="106" name="Picture 105" descr="A black rectangle with a black background&#10;&#10;Description automatically generated with low confidence">
-                  <a:extLst>
-                    <a:ext uri="{FF2B5EF4-FFF2-40B4-BE49-F238E27FC236}">
-                      <a16:creationId xmlns:a16="http://schemas.microsoft.com/office/drawing/2014/main" id="{48AE7624-6B10-4F7C-ADE1-A919BC7CC552}"/>
-                    </a:ext>
-                  </a:extLst>
-                </p:cNvPr>
-                <p:cNvPicPr>
-                  <a:picLocks noChangeAspect="1"/>
-                </p:cNvPicPr>
-                <p:nvPr/>
-              </p:nvPicPr>
-              <p:blipFill>
-                <a:blip r:embed="rId3">
-                  <a:extLst>
-                    <a:ext uri="{28A0092B-C50C-407E-A947-70E740481C1C}">
-                      <a14:useLocalDpi xmlns:a14="http://schemas.microsoft.com/office/drawing/2010/main" val="0"/>
-                    </a:ext>
-                  </a:extLst>
-                </a:blip>
-                <a:stretch>
-                  <a:fillRect/>
-                </a:stretch>
-              </p:blipFill>
-              <p:spPr>
-                <a:xfrm>
-                  <a:off x="4483625" y="4140358"/>
-                  <a:ext cx="303301" cy="303902"/>
-                </a:xfrm>
-                <a:prstGeom prst="rect">
-                  <a:avLst/>
-                </a:prstGeom>
-              </p:spPr>
-            </p:pic>
-          </p:grpSp>
-          <p:grpSp>
-            <p:nvGrpSpPr>
-              <p:cNvPr id="102" name="Group 101">
-                <a:extLst>
-                  <a:ext uri="{FF2B5EF4-FFF2-40B4-BE49-F238E27FC236}">
-                    <a16:creationId xmlns:a16="http://schemas.microsoft.com/office/drawing/2014/main" id="{FB4E3961-9210-4944-91C4-4AFF022200DF}"/>
-                  </a:ext>
-                </a:extLst>
-              </p:cNvPr>
-              <p:cNvGrpSpPr/>
-              <p:nvPr/>
-            </p:nvGrpSpPr>
-            <p:grpSpPr>
-              <a:xfrm>
-                <a:off x="4463648" y="3663533"/>
-                <a:ext cx="506673" cy="411423"/>
-                <a:chOff x="4463648" y="3663533"/>
-                <a:chExt cx="506673" cy="411423"/>
-              </a:xfrm>
-            </p:grpSpPr>
-            <p:sp>
-              <p:nvSpPr>
-                <p:cNvPr id="103" name="Freeform: Shape 102">
-                  <a:extLst>
-                    <a:ext uri="{FF2B5EF4-FFF2-40B4-BE49-F238E27FC236}">
-                      <a16:creationId xmlns:a16="http://schemas.microsoft.com/office/drawing/2014/main" id="{3BEAE887-D749-4CB5-B630-35F4D20B82F8}"/>
-                    </a:ext>
-                  </a:extLst>
-                </p:cNvPr>
-                <p:cNvSpPr>
-                  <a:spLocks noChangeAspect="1"/>
-                </p:cNvSpPr>
-                <p:nvPr/>
-              </p:nvSpPr>
-              <p:spPr>
-                <a:xfrm rot="10800000">
-                  <a:off x="4463648" y="3663533"/>
-                  <a:ext cx="506673" cy="411423"/>
-                </a:xfrm>
-                <a:custGeom>
-                  <a:avLst/>
-                  <a:gdLst>
-                    <a:gd name="connsiteX0" fmla="*/ 506673 w 506673"/>
-                    <a:gd name="connsiteY0" fmla="*/ 45363 h 411423"/>
-                    <a:gd name="connsiteX1" fmla="*/ 506673 w 506673"/>
-                    <a:gd name="connsiteY1" fmla="*/ 366060 h 411423"/>
-                    <a:gd name="connsiteX2" fmla="*/ 461310 w 506673"/>
-                    <a:gd name="connsiteY2" fmla="*/ 411423 h 411423"/>
-                    <a:gd name="connsiteX3" fmla="*/ 140613 w 506673"/>
-                    <a:gd name="connsiteY3" fmla="*/ 411423 h 411423"/>
-                    <a:gd name="connsiteX4" fmla="*/ 95250 w 506673"/>
-                    <a:gd name="connsiteY4" fmla="*/ 366060 h 411423"/>
-                    <a:gd name="connsiteX5" fmla="*/ 95250 w 506673"/>
-                    <a:gd name="connsiteY5" fmla="*/ 310247 h 411423"/>
-                    <a:gd name="connsiteX6" fmla="*/ 83571 w 506673"/>
-                    <a:gd name="connsiteY6" fmla="*/ 318121 h 411423"/>
-                    <a:gd name="connsiteX7" fmla="*/ 60156 w 506673"/>
-                    <a:gd name="connsiteY7" fmla="*/ 322848 h 411423"/>
-                    <a:gd name="connsiteX8" fmla="*/ 0 w 506673"/>
-                    <a:gd name="connsiteY8" fmla="*/ 262692 h 411423"/>
-                    <a:gd name="connsiteX9" fmla="*/ 60156 w 506673"/>
-                    <a:gd name="connsiteY9" fmla="*/ 202536 h 411423"/>
-                    <a:gd name="connsiteX10" fmla="*/ 83571 w 506673"/>
-                    <a:gd name="connsiteY10" fmla="*/ 207264 h 411423"/>
-                    <a:gd name="connsiteX11" fmla="*/ 95250 w 506673"/>
-                    <a:gd name="connsiteY11" fmla="*/ 215138 h 411423"/>
-                    <a:gd name="connsiteX12" fmla="*/ 95250 w 506673"/>
-                    <a:gd name="connsiteY12" fmla="*/ 45363 h 411423"/>
-                    <a:gd name="connsiteX13" fmla="*/ 140613 w 506673"/>
-                    <a:gd name="connsiteY13" fmla="*/ 0 h 411423"/>
-                    <a:gd name="connsiteX14" fmla="*/ 277493 w 506673"/>
-                    <a:gd name="connsiteY14" fmla="*/ 0 h 411423"/>
-                    <a:gd name="connsiteX15" fmla="*/ 274379 w 506673"/>
-                    <a:gd name="connsiteY15" fmla="*/ 15425 h 411423"/>
-                    <a:gd name="connsiteX16" fmla="*/ 359440 w 506673"/>
-                    <a:gd name="connsiteY16" fmla="*/ 100486 h 411423"/>
-                    <a:gd name="connsiteX17" fmla="*/ 444501 w 506673"/>
-                    <a:gd name="connsiteY17" fmla="*/ 15425 h 411423"/>
-                    <a:gd name="connsiteX18" fmla="*/ 441387 w 506673"/>
-                    <a:gd name="connsiteY18" fmla="*/ 0 h 411423"/>
-                    <a:gd name="connsiteX19" fmla="*/ 461310 w 506673"/>
-                    <a:gd name="connsiteY19" fmla="*/ 0 h 411423"/>
-                    <a:gd name="connsiteX20" fmla="*/ 506673 w 506673"/>
-                    <a:gd name="connsiteY20" fmla="*/ 45363 h 411423"/>
-                  </a:gdLst>
-                  <a:ahLst/>
-                  <a:cxnLst>
-                    <a:cxn ang="0">
-                      <a:pos x="connsiteX0" y="connsiteY0"/>
-                    </a:cxn>
-                    <a:cxn ang="0">
-                      <a:pos x="connsiteX1" y="connsiteY1"/>
-                    </a:cxn>
-                    <a:cxn ang="0">
-                      <a:pos x="connsiteX2" y="connsiteY2"/>
-                    </a:cxn>
-                    <a:cxn ang="0">
-                      <a:pos x="connsiteX3" y="connsiteY3"/>
-                    </a:cxn>
-                    <a:cxn ang="0">
-                      <a:pos x="connsiteX4" y="connsiteY4"/>
-                    </a:cxn>
-                    <a:cxn ang="0">
-                      <a:pos x="connsiteX5" y="connsiteY5"/>
-                    </a:cxn>
-                    <a:cxn ang="0">
-                      <a:pos x="connsiteX6" y="connsiteY6"/>
-                    </a:cxn>
-                    <a:cxn ang="0">
-                      <a:pos x="connsiteX7" y="connsiteY7"/>
-                    </a:cxn>
-                    <a:cxn ang="0">
-                      <a:pos x="connsiteX8" y="connsiteY8"/>
-                    </a:cxn>
-                    <a:cxn ang="0">
-                      <a:pos x="connsiteX9" y="connsiteY9"/>
-                    </a:cxn>
-                    <a:cxn ang="0">
-                      <a:pos x="connsiteX10" y="connsiteY10"/>
-                    </a:cxn>
-                    <a:cxn ang="0">
-                      <a:pos x="connsiteX11" y="connsiteY11"/>
-                    </a:cxn>
-                    <a:cxn ang="0">
-                      <a:pos x="connsiteX12" y="connsiteY12"/>
-                    </a:cxn>
-                    <a:cxn ang="0">
-                      <a:pos x="connsiteX13" y="connsiteY13"/>
-                    </a:cxn>
-                    <a:cxn ang="0">
-                      <a:pos x="connsiteX14" y="connsiteY14"/>
-                    </a:cxn>
-                    <a:cxn ang="0">
-                      <a:pos x="connsiteX15" y="connsiteY15"/>
-                    </a:cxn>
-                    <a:cxn ang="0">
-                      <a:pos x="connsiteX16" y="connsiteY16"/>
-                    </a:cxn>
-                    <a:cxn ang="0">
-                      <a:pos x="connsiteX17" y="connsiteY17"/>
-                    </a:cxn>
-                    <a:cxn ang="0">
-                      <a:pos x="connsiteX18" y="connsiteY18"/>
-                    </a:cxn>
-                    <a:cxn ang="0">
-                      <a:pos x="connsiteX19" y="connsiteY19"/>
-                    </a:cxn>
-                    <a:cxn ang="0">
-                      <a:pos x="connsiteX20" y="connsiteY20"/>
-                    </a:cxn>
-                  </a:cxnLst>
-                  <a:rect l="l" t="t" r="r" b="b"/>
-                  <a:pathLst>
-                    <a:path w="506673" h="411423">
-                      <a:moveTo>
-                        <a:pt x="506673" y="45363"/>
-                      </a:moveTo>
-                      <a:lnTo>
-                        <a:pt x="506673" y="366060"/>
-                      </a:lnTo>
-                      <a:cubicBezTo>
-                        <a:pt x="506673" y="391113"/>
-                        <a:pt x="486363" y="411423"/>
-                        <a:pt x="461310" y="411423"/>
-                      </a:cubicBezTo>
-                      <a:lnTo>
-                        <a:pt x="140613" y="411423"/>
-                      </a:lnTo>
-                      <a:cubicBezTo>
-                        <a:pt x="115560" y="411423"/>
-                        <a:pt x="95250" y="391113"/>
-                        <a:pt x="95250" y="366060"/>
-                      </a:cubicBezTo>
-                      <a:lnTo>
-                        <a:pt x="95250" y="310247"/>
-                      </a:lnTo>
-                      <a:lnTo>
-                        <a:pt x="83571" y="318121"/>
-                      </a:lnTo>
-                      <a:cubicBezTo>
-                        <a:pt x="76374" y="321165"/>
-                        <a:pt x="68462" y="322848"/>
-                        <a:pt x="60156" y="322848"/>
-                      </a:cubicBezTo>
-                      <a:cubicBezTo>
-                        <a:pt x="26933" y="322848"/>
-                        <a:pt x="0" y="295915"/>
-                        <a:pt x="0" y="262692"/>
-                      </a:cubicBezTo>
-                      <a:cubicBezTo>
-                        <a:pt x="0" y="229469"/>
-                        <a:pt x="26933" y="202536"/>
-                        <a:pt x="60156" y="202536"/>
-                      </a:cubicBezTo>
-                      <a:cubicBezTo>
-                        <a:pt x="68462" y="202536"/>
-                        <a:pt x="76374" y="204220"/>
-                        <a:pt x="83571" y="207264"/>
-                      </a:cubicBezTo>
-                      <a:lnTo>
-                        <a:pt x="95250" y="215138"/>
-                      </a:lnTo>
-                      <a:lnTo>
-                        <a:pt x="95250" y="45363"/>
-                      </a:lnTo>
-                      <a:cubicBezTo>
-                        <a:pt x="95250" y="20310"/>
-                        <a:pt x="115560" y="0"/>
-                        <a:pt x="140613" y="0"/>
-                      </a:cubicBezTo>
-                      <a:lnTo>
-                        <a:pt x="277493" y="0"/>
-                      </a:lnTo>
-                      <a:lnTo>
-                        <a:pt x="274379" y="15425"/>
-                      </a:lnTo>
-                      <a:cubicBezTo>
-                        <a:pt x="274379" y="62403"/>
-                        <a:pt x="312462" y="100486"/>
-                        <a:pt x="359440" y="100486"/>
-                      </a:cubicBezTo>
-                      <a:cubicBezTo>
-                        <a:pt x="406418" y="100486"/>
-                        <a:pt x="444501" y="62403"/>
-                        <a:pt x="444501" y="15425"/>
-                      </a:cubicBezTo>
-                      <a:lnTo>
-                        <a:pt x="441387" y="0"/>
-                      </a:lnTo>
-                      <a:lnTo>
-                        <a:pt x="461310" y="0"/>
-                      </a:lnTo>
-                      <a:cubicBezTo>
-                        <a:pt x="486363" y="0"/>
-                        <a:pt x="506673" y="20310"/>
-                        <a:pt x="506673" y="45363"/>
-                      </a:cubicBezTo>
-                      <a:close/>
-                    </a:path>
-                  </a:pathLst>
-                </a:custGeom>
-                <a:solidFill>
-                  <a:srgbClr val="FF3399"/>
-                </a:solidFill>
-                <a:ln>
-                  <a:noFill/>
-                </a:ln>
-              </p:spPr>
-              <p:style>
-                <a:lnRef idx="2">
-                  <a:schemeClr val="accent1">
-                    <a:shade val="50000"/>
-                  </a:schemeClr>
-                </a:lnRef>
-                <a:fillRef idx="1">
-                  <a:schemeClr val="accent1"/>
-                </a:fillRef>
-                <a:effectRef idx="0">
-                  <a:schemeClr val="accent1"/>
-                </a:effectRef>
-                <a:fontRef idx="minor">
-                  <a:schemeClr val="lt1"/>
-                </a:fontRef>
-              </p:style>
-              <p:txBody>
-                <a:bodyPr wrap="square" rtlCol="0" anchor="ctr">
-                  <a:noAutofit/>
-                </a:bodyPr>
-                <a:lstStyle/>
-                <a:p>
-                  <a:pPr algn="ctr"/>
-                  <a:endParaRPr lang="en-US"/>
-                </a:p>
-              </p:txBody>
-            </p:sp>
-            <p:pic>
-              <p:nvPicPr>
-                <p:cNvPr id="104" name="Picture 103" descr="A picture containing night sky&#10;&#10;Description automatically generated">
-                  <a:extLst>
-                    <a:ext uri="{FF2B5EF4-FFF2-40B4-BE49-F238E27FC236}">
-                      <a16:creationId xmlns:a16="http://schemas.microsoft.com/office/drawing/2014/main" id="{685C376C-E0BA-4639-A3EC-8897766F3EF4}"/>
-                    </a:ext>
-                  </a:extLst>
-                </p:cNvPr>
-                <p:cNvPicPr>
-                  <a:picLocks noChangeAspect="1"/>
-                </p:cNvPicPr>
-                <p:nvPr/>
-              </p:nvPicPr>
-              <p:blipFill>
-                <a:blip r:embed="rId2">
-                  <a:extLst>
-                    <a:ext uri="{28A0092B-C50C-407E-A947-70E740481C1C}">
-                      <a14:useLocalDpi xmlns:a14="http://schemas.microsoft.com/office/drawing/2010/main" val="0"/>
-                    </a:ext>
-                  </a:extLst>
-                </a:blip>
-                <a:stretch>
-                  <a:fillRect/>
-                </a:stretch>
-              </p:blipFill>
-              <p:spPr>
-                <a:xfrm flipH="1">
-                  <a:off x="4531795" y="3692954"/>
-                  <a:ext cx="262895" cy="273138"/>
-                </a:xfrm>
-                <a:prstGeom prst="rect">
-                  <a:avLst/>
-                </a:prstGeom>
-                <a:noFill/>
-                <a:ln>
-                  <a:noFill/>
-                </a:ln>
-              </p:spPr>
-            </p:pic>
-          </p:grpSp>
-        </p:grpSp>
         <p:sp>
           <p:nvSpPr>
             <p:cNvPr id="111" name="Rectangle 110">
@@ -7107,7 +5784,7 @@
           </p:nvSpPr>
           <p:spPr>
             <a:xfrm>
-              <a:off x="6307764" y="5709516"/>
+              <a:off x="6366357" y="5746333"/>
               <a:ext cx="1898179" cy="338554"/>
             </a:xfrm>
             <a:prstGeom prst="rect">
@@ -7231,6 +5908,1252 @@
             </a:p>
           </p:txBody>
         </p:sp>
+        <p:grpSp>
+          <p:nvGrpSpPr>
+            <p:cNvPr id="116" name="Group 115">
+              <a:extLst>
+                <a:ext uri="{FF2B5EF4-FFF2-40B4-BE49-F238E27FC236}">
+                  <a16:creationId xmlns:a16="http://schemas.microsoft.com/office/drawing/2014/main" id="{DEBDF376-3F2D-4AA9-8016-4636BB1CEC1B}"/>
+                </a:ext>
+              </a:extLst>
+            </p:cNvPr>
+            <p:cNvGrpSpPr>
+              <a:grpSpLocks noChangeAspect="1"/>
+            </p:cNvGrpSpPr>
+            <p:nvPr/>
+          </p:nvGrpSpPr>
+          <p:grpSpPr>
+            <a:xfrm>
+              <a:off x="6507289" y="4140358"/>
+              <a:ext cx="1650465" cy="1556431"/>
+              <a:chOff x="4439019" y="4922007"/>
+              <a:chExt cx="960399" cy="905681"/>
+            </a:xfrm>
+          </p:grpSpPr>
+          <p:grpSp>
+            <p:nvGrpSpPr>
+              <p:cNvPr id="117" name="Group 116">
+                <a:extLst>
+                  <a:ext uri="{FF2B5EF4-FFF2-40B4-BE49-F238E27FC236}">
+                    <a16:creationId xmlns:a16="http://schemas.microsoft.com/office/drawing/2014/main" id="{8A2F5183-F910-4791-9F1E-CB33922EA768}"/>
+                  </a:ext>
+                </a:extLst>
+              </p:cNvPr>
+              <p:cNvGrpSpPr/>
+              <p:nvPr/>
+            </p:nvGrpSpPr>
+            <p:grpSpPr>
+              <a:xfrm rot="1593285">
+                <a:off x="4987995" y="4922007"/>
+                <a:ext cx="411423" cy="496911"/>
+                <a:chOff x="4923821" y="4941359"/>
+                <a:chExt cx="411423" cy="496911"/>
+              </a:xfrm>
+            </p:grpSpPr>
+            <p:sp>
+              <p:nvSpPr>
+                <p:cNvPr id="126" name="Freeform: Shape 125">
+                  <a:extLst>
+                    <a:ext uri="{FF2B5EF4-FFF2-40B4-BE49-F238E27FC236}">
+                      <a16:creationId xmlns:a16="http://schemas.microsoft.com/office/drawing/2014/main" id="{C5E3D4C4-3508-4239-AB80-98B82520F272}"/>
+                    </a:ext>
+                  </a:extLst>
+                </p:cNvPr>
+                <p:cNvSpPr>
+                  <a:spLocks noChangeAspect="1"/>
+                </p:cNvSpPr>
+                <p:nvPr/>
+              </p:nvSpPr>
+              <p:spPr>
+                <a:xfrm rot="16200000">
+                  <a:off x="4881077" y="4984103"/>
+                  <a:ext cx="496911" cy="411423"/>
+                </a:xfrm>
+                <a:custGeom>
+                  <a:avLst/>
+                  <a:gdLst>
+                    <a:gd name="connsiteX0" fmla="*/ 0 w 496911"/>
+                    <a:gd name="connsiteY0" fmla="*/ 205713 h 411423"/>
+                    <a:gd name="connsiteX1" fmla="*/ 55842 w 496911"/>
+                    <a:gd name="connsiteY1" fmla="*/ 149871 h 411423"/>
+                    <a:gd name="connsiteX2" fmla="*/ 77579 w 496911"/>
+                    <a:gd name="connsiteY2" fmla="*/ 154260 h 411423"/>
+                    <a:gd name="connsiteX3" fmla="*/ 85488 w 496911"/>
+                    <a:gd name="connsiteY3" fmla="*/ 159592 h 411423"/>
+                    <a:gd name="connsiteX4" fmla="*/ 85488 w 496911"/>
+                    <a:gd name="connsiteY4" fmla="*/ 45363 h 411423"/>
+                    <a:gd name="connsiteX5" fmla="*/ 130851 w 496911"/>
+                    <a:gd name="connsiteY5" fmla="*/ 0 h 411423"/>
+                    <a:gd name="connsiteX6" fmla="*/ 210713 w 496911"/>
+                    <a:gd name="connsiteY6" fmla="*/ 0 h 411423"/>
+                    <a:gd name="connsiteX7" fmla="*/ 214845 w 496911"/>
+                    <a:gd name="connsiteY7" fmla="*/ 20470 h 411423"/>
+                    <a:gd name="connsiteX8" fmla="*/ 291199 w 496911"/>
+                    <a:gd name="connsiteY8" fmla="*/ 71080 h 411423"/>
+                    <a:gd name="connsiteX9" fmla="*/ 367553 w 496911"/>
+                    <a:gd name="connsiteY9" fmla="*/ 20470 h 411423"/>
+                    <a:gd name="connsiteX10" fmla="*/ 371686 w 496911"/>
+                    <a:gd name="connsiteY10" fmla="*/ 0 h 411423"/>
+                    <a:gd name="connsiteX11" fmla="*/ 451548 w 496911"/>
+                    <a:gd name="connsiteY11" fmla="*/ 0 h 411423"/>
+                    <a:gd name="connsiteX12" fmla="*/ 496911 w 496911"/>
+                    <a:gd name="connsiteY12" fmla="*/ 45363 h 411423"/>
+                    <a:gd name="connsiteX13" fmla="*/ 496911 w 496911"/>
+                    <a:gd name="connsiteY13" fmla="*/ 366060 h 411423"/>
+                    <a:gd name="connsiteX14" fmla="*/ 451548 w 496911"/>
+                    <a:gd name="connsiteY14" fmla="*/ 411423 h 411423"/>
+                    <a:gd name="connsiteX15" fmla="*/ 130851 w 496911"/>
+                    <a:gd name="connsiteY15" fmla="*/ 411423 h 411423"/>
+                    <a:gd name="connsiteX16" fmla="*/ 85488 w 496911"/>
+                    <a:gd name="connsiteY16" fmla="*/ 366060 h 411423"/>
+                    <a:gd name="connsiteX17" fmla="*/ 85488 w 496911"/>
+                    <a:gd name="connsiteY17" fmla="*/ 251834 h 411423"/>
+                    <a:gd name="connsiteX18" fmla="*/ 77579 w 496911"/>
+                    <a:gd name="connsiteY18" fmla="*/ 257167 h 411423"/>
+                    <a:gd name="connsiteX19" fmla="*/ 55842 w 496911"/>
+                    <a:gd name="connsiteY19" fmla="*/ 261555 h 411423"/>
+                    <a:gd name="connsiteX20" fmla="*/ 0 w 496911"/>
+                    <a:gd name="connsiteY20" fmla="*/ 205713 h 411423"/>
+                  </a:gdLst>
+                  <a:ahLst/>
+                  <a:cxnLst>
+                    <a:cxn ang="0">
+                      <a:pos x="connsiteX0" y="connsiteY0"/>
+                    </a:cxn>
+                    <a:cxn ang="0">
+                      <a:pos x="connsiteX1" y="connsiteY1"/>
+                    </a:cxn>
+                    <a:cxn ang="0">
+                      <a:pos x="connsiteX2" y="connsiteY2"/>
+                    </a:cxn>
+                    <a:cxn ang="0">
+                      <a:pos x="connsiteX3" y="connsiteY3"/>
+                    </a:cxn>
+                    <a:cxn ang="0">
+                      <a:pos x="connsiteX4" y="connsiteY4"/>
+                    </a:cxn>
+                    <a:cxn ang="0">
+                      <a:pos x="connsiteX5" y="connsiteY5"/>
+                    </a:cxn>
+                    <a:cxn ang="0">
+                      <a:pos x="connsiteX6" y="connsiteY6"/>
+                    </a:cxn>
+                    <a:cxn ang="0">
+                      <a:pos x="connsiteX7" y="connsiteY7"/>
+                    </a:cxn>
+                    <a:cxn ang="0">
+                      <a:pos x="connsiteX8" y="connsiteY8"/>
+                    </a:cxn>
+                    <a:cxn ang="0">
+                      <a:pos x="connsiteX9" y="connsiteY9"/>
+                    </a:cxn>
+                    <a:cxn ang="0">
+                      <a:pos x="connsiteX10" y="connsiteY10"/>
+                    </a:cxn>
+                    <a:cxn ang="0">
+                      <a:pos x="connsiteX11" y="connsiteY11"/>
+                    </a:cxn>
+                    <a:cxn ang="0">
+                      <a:pos x="connsiteX12" y="connsiteY12"/>
+                    </a:cxn>
+                    <a:cxn ang="0">
+                      <a:pos x="connsiteX13" y="connsiteY13"/>
+                    </a:cxn>
+                    <a:cxn ang="0">
+                      <a:pos x="connsiteX14" y="connsiteY14"/>
+                    </a:cxn>
+                    <a:cxn ang="0">
+                      <a:pos x="connsiteX15" y="connsiteY15"/>
+                    </a:cxn>
+                    <a:cxn ang="0">
+                      <a:pos x="connsiteX16" y="connsiteY16"/>
+                    </a:cxn>
+                    <a:cxn ang="0">
+                      <a:pos x="connsiteX17" y="connsiteY17"/>
+                    </a:cxn>
+                    <a:cxn ang="0">
+                      <a:pos x="connsiteX18" y="connsiteY18"/>
+                    </a:cxn>
+                    <a:cxn ang="0">
+                      <a:pos x="connsiteX19" y="connsiteY19"/>
+                    </a:cxn>
+                    <a:cxn ang="0">
+                      <a:pos x="connsiteX20" y="connsiteY20"/>
+                    </a:cxn>
+                  </a:cxnLst>
+                  <a:rect l="l" t="t" r="r" b="b"/>
+                  <a:pathLst>
+                    <a:path w="496911" h="411423">
+                      <a:moveTo>
+                        <a:pt x="0" y="205713"/>
+                      </a:moveTo>
+                      <a:cubicBezTo>
+                        <a:pt x="0" y="174872"/>
+                        <a:pt x="25001" y="149871"/>
+                        <a:pt x="55842" y="149871"/>
+                      </a:cubicBezTo>
+                      <a:cubicBezTo>
+                        <a:pt x="63553" y="149871"/>
+                        <a:pt x="70898" y="151434"/>
+                        <a:pt x="77579" y="154260"/>
+                      </a:cubicBezTo>
+                      <a:lnTo>
+                        <a:pt x="85488" y="159592"/>
+                      </a:lnTo>
+                      <a:lnTo>
+                        <a:pt x="85488" y="45363"/>
+                      </a:lnTo>
+                      <a:cubicBezTo>
+                        <a:pt x="85488" y="20310"/>
+                        <a:pt x="105798" y="0"/>
+                        <a:pt x="130851" y="0"/>
+                      </a:cubicBezTo>
+                      <a:lnTo>
+                        <a:pt x="210713" y="0"/>
+                      </a:lnTo>
+                      <a:lnTo>
+                        <a:pt x="214845" y="20470"/>
+                      </a:lnTo>
+                      <a:cubicBezTo>
+                        <a:pt x="227425" y="50212"/>
+                        <a:pt x="256875" y="71080"/>
+                        <a:pt x="291199" y="71080"/>
+                      </a:cubicBezTo>
+                      <a:cubicBezTo>
+                        <a:pt x="325524" y="71080"/>
+                        <a:pt x="354974" y="50212"/>
+                        <a:pt x="367553" y="20470"/>
+                      </a:cubicBezTo>
+                      <a:lnTo>
+                        <a:pt x="371686" y="0"/>
+                      </a:lnTo>
+                      <a:lnTo>
+                        <a:pt x="451548" y="0"/>
+                      </a:lnTo>
+                      <a:cubicBezTo>
+                        <a:pt x="476601" y="0"/>
+                        <a:pt x="496911" y="20310"/>
+                        <a:pt x="496911" y="45363"/>
+                      </a:cubicBezTo>
+                      <a:lnTo>
+                        <a:pt x="496911" y="366060"/>
+                      </a:lnTo>
+                      <a:cubicBezTo>
+                        <a:pt x="496911" y="391113"/>
+                        <a:pt x="476601" y="411423"/>
+                        <a:pt x="451548" y="411423"/>
+                      </a:cubicBezTo>
+                      <a:lnTo>
+                        <a:pt x="130851" y="411423"/>
+                      </a:lnTo>
+                      <a:cubicBezTo>
+                        <a:pt x="105798" y="411423"/>
+                        <a:pt x="85488" y="391113"/>
+                        <a:pt x="85488" y="366060"/>
+                      </a:cubicBezTo>
+                      <a:lnTo>
+                        <a:pt x="85488" y="251834"/>
+                      </a:lnTo>
+                      <a:lnTo>
+                        <a:pt x="77579" y="257167"/>
+                      </a:lnTo>
+                      <a:cubicBezTo>
+                        <a:pt x="70898" y="259993"/>
+                        <a:pt x="63553" y="261555"/>
+                        <a:pt x="55842" y="261555"/>
+                      </a:cubicBezTo>
+                      <a:cubicBezTo>
+                        <a:pt x="25001" y="261555"/>
+                        <a:pt x="0" y="236554"/>
+                        <a:pt x="0" y="205713"/>
+                      </a:cubicBezTo>
+                      <a:close/>
+                    </a:path>
+                  </a:pathLst>
+                </a:custGeom>
+                <a:solidFill>
+                  <a:srgbClr val="92D050"/>
+                </a:solidFill>
+                <a:ln>
+                  <a:noFill/>
+                </a:ln>
+              </p:spPr>
+              <p:style>
+                <a:lnRef idx="2">
+                  <a:schemeClr val="accent1">
+                    <a:shade val="50000"/>
+                  </a:schemeClr>
+                </a:lnRef>
+                <a:fillRef idx="1">
+                  <a:schemeClr val="accent1"/>
+                </a:fillRef>
+                <a:effectRef idx="0">
+                  <a:schemeClr val="accent1"/>
+                </a:effectRef>
+                <a:fontRef idx="minor">
+                  <a:schemeClr val="lt1"/>
+                </a:fontRef>
+              </p:style>
+              <p:txBody>
+                <a:bodyPr rtlCol="0" anchor="ctr"/>
+                <a:lstStyle/>
+                <a:p>
+                  <a:pPr algn="ctr"/>
+                  <a:endParaRPr lang="en-US"/>
+                </a:p>
+              </p:txBody>
+            </p:sp>
+            <p:pic>
+              <p:nvPicPr>
+                <p:cNvPr id="127" name="Picture 126" descr="Shape&#10;&#10;Description automatically generated with medium confidence">
+                  <a:extLst>
+                    <a:ext uri="{FF2B5EF4-FFF2-40B4-BE49-F238E27FC236}">
+                      <a16:creationId xmlns:a16="http://schemas.microsoft.com/office/drawing/2014/main" id="{AE6C66D0-97F8-437C-A778-CD7C0FE0D988}"/>
+                    </a:ext>
+                  </a:extLst>
+                </p:cNvPr>
+                <p:cNvPicPr>
+                  <a:picLocks noChangeAspect="1"/>
+                </p:cNvPicPr>
+                <p:nvPr/>
+              </p:nvPicPr>
+              <p:blipFill>
+                <a:blip r:embed="rId5">
+                  <a:extLst>
+                    <a:ext uri="{28A0092B-C50C-407E-A947-70E740481C1C}">
+                      <a14:useLocalDpi xmlns:a14="http://schemas.microsoft.com/office/drawing/2010/main" val="0"/>
+                    </a:ext>
+                  </a:extLst>
+                </a:blip>
+                <a:stretch>
+                  <a:fillRect/>
+                </a:stretch>
+              </p:blipFill>
+              <p:spPr>
+                <a:xfrm>
+                  <a:off x="4997691" y="5020454"/>
+                  <a:ext cx="290443" cy="253233"/>
+                </a:xfrm>
+                <a:prstGeom prst="rect">
+                  <a:avLst/>
+                </a:prstGeom>
+              </p:spPr>
+            </p:pic>
+          </p:grpSp>
+          <p:grpSp>
+            <p:nvGrpSpPr>
+              <p:cNvPr id="118" name="Group 117">
+                <a:extLst>
+                  <a:ext uri="{FF2B5EF4-FFF2-40B4-BE49-F238E27FC236}">
+                    <a16:creationId xmlns:a16="http://schemas.microsoft.com/office/drawing/2014/main" id="{897D9B94-2012-4A5F-817D-1BF6E436E791}"/>
+                  </a:ext>
+                </a:extLst>
+              </p:cNvPr>
+              <p:cNvGrpSpPr/>
+              <p:nvPr/>
+            </p:nvGrpSpPr>
+            <p:grpSpPr>
+              <a:xfrm>
+                <a:off x="4439462" y="5330608"/>
+                <a:ext cx="411423" cy="496911"/>
+                <a:chOff x="4439462" y="5330608"/>
+                <a:chExt cx="411423" cy="496911"/>
+              </a:xfrm>
+            </p:grpSpPr>
+            <p:sp>
+              <p:nvSpPr>
+                <p:cNvPr id="124" name="Freeform: Shape 123">
+                  <a:extLst>
+                    <a:ext uri="{FF2B5EF4-FFF2-40B4-BE49-F238E27FC236}">
+                      <a16:creationId xmlns:a16="http://schemas.microsoft.com/office/drawing/2014/main" id="{8D5DC81F-FE28-4B3F-AAD1-9852FBC2EE35}"/>
+                    </a:ext>
+                  </a:extLst>
+                </p:cNvPr>
+                <p:cNvSpPr>
+                  <a:spLocks noChangeAspect="1"/>
+                </p:cNvSpPr>
+                <p:nvPr/>
+              </p:nvSpPr>
+              <p:spPr>
+                <a:xfrm rot="5400000">
+                  <a:off x="4396718" y="5373352"/>
+                  <a:ext cx="496911" cy="411423"/>
+                </a:xfrm>
+                <a:custGeom>
+                  <a:avLst/>
+                  <a:gdLst>
+                    <a:gd name="connsiteX0" fmla="*/ 0 w 496911"/>
+                    <a:gd name="connsiteY0" fmla="*/ 205713 h 411423"/>
+                    <a:gd name="connsiteX1" fmla="*/ 55842 w 496911"/>
+                    <a:gd name="connsiteY1" fmla="*/ 149871 h 411423"/>
+                    <a:gd name="connsiteX2" fmla="*/ 77579 w 496911"/>
+                    <a:gd name="connsiteY2" fmla="*/ 154260 h 411423"/>
+                    <a:gd name="connsiteX3" fmla="*/ 85488 w 496911"/>
+                    <a:gd name="connsiteY3" fmla="*/ 159592 h 411423"/>
+                    <a:gd name="connsiteX4" fmla="*/ 85488 w 496911"/>
+                    <a:gd name="connsiteY4" fmla="*/ 45363 h 411423"/>
+                    <a:gd name="connsiteX5" fmla="*/ 130851 w 496911"/>
+                    <a:gd name="connsiteY5" fmla="*/ 0 h 411423"/>
+                    <a:gd name="connsiteX6" fmla="*/ 210713 w 496911"/>
+                    <a:gd name="connsiteY6" fmla="*/ 0 h 411423"/>
+                    <a:gd name="connsiteX7" fmla="*/ 214845 w 496911"/>
+                    <a:gd name="connsiteY7" fmla="*/ 20470 h 411423"/>
+                    <a:gd name="connsiteX8" fmla="*/ 291199 w 496911"/>
+                    <a:gd name="connsiteY8" fmla="*/ 71080 h 411423"/>
+                    <a:gd name="connsiteX9" fmla="*/ 367553 w 496911"/>
+                    <a:gd name="connsiteY9" fmla="*/ 20470 h 411423"/>
+                    <a:gd name="connsiteX10" fmla="*/ 371686 w 496911"/>
+                    <a:gd name="connsiteY10" fmla="*/ 0 h 411423"/>
+                    <a:gd name="connsiteX11" fmla="*/ 451548 w 496911"/>
+                    <a:gd name="connsiteY11" fmla="*/ 0 h 411423"/>
+                    <a:gd name="connsiteX12" fmla="*/ 496911 w 496911"/>
+                    <a:gd name="connsiteY12" fmla="*/ 45363 h 411423"/>
+                    <a:gd name="connsiteX13" fmla="*/ 496911 w 496911"/>
+                    <a:gd name="connsiteY13" fmla="*/ 366060 h 411423"/>
+                    <a:gd name="connsiteX14" fmla="*/ 451548 w 496911"/>
+                    <a:gd name="connsiteY14" fmla="*/ 411423 h 411423"/>
+                    <a:gd name="connsiteX15" fmla="*/ 130851 w 496911"/>
+                    <a:gd name="connsiteY15" fmla="*/ 411423 h 411423"/>
+                    <a:gd name="connsiteX16" fmla="*/ 85488 w 496911"/>
+                    <a:gd name="connsiteY16" fmla="*/ 366060 h 411423"/>
+                    <a:gd name="connsiteX17" fmla="*/ 85488 w 496911"/>
+                    <a:gd name="connsiteY17" fmla="*/ 251834 h 411423"/>
+                    <a:gd name="connsiteX18" fmla="*/ 77579 w 496911"/>
+                    <a:gd name="connsiteY18" fmla="*/ 257167 h 411423"/>
+                    <a:gd name="connsiteX19" fmla="*/ 55842 w 496911"/>
+                    <a:gd name="connsiteY19" fmla="*/ 261555 h 411423"/>
+                    <a:gd name="connsiteX20" fmla="*/ 0 w 496911"/>
+                    <a:gd name="connsiteY20" fmla="*/ 205713 h 411423"/>
+                  </a:gdLst>
+                  <a:ahLst/>
+                  <a:cxnLst>
+                    <a:cxn ang="0">
+                      <a:pos x="connsiteX0" y="connsiteY0"/>
+                    </a:cxn>
+                    <a:cxn ang="0">
+                      <a:pos x="connsiteX1" y="connsiteY1"/>
+                    </a:cxn>
+                    <a:cxn ang="0">
+                      <a:pos x="connsiteX2" y="connsiteY2"/>
+                    </a:cxn>
+                    <a:cxn ang="0">
+                      <a:pos x="connsiteX3" y="connsiteY3"/>
+                    </a:cxn>
+                    <a:cxn ang="0">
+                      <a:pos x="connsiteX4" y="connsiteY4"/>
+                    </a:cxn>
+                    <a:cxn ang="0">
+                      <a:pos x="connsiteX5" y="connsiteY5"/>
+                    </a:cxn>
+                    <a:cxn ang="0">
+                      <a:pos x="connsiteX6" y="connsiteY6"/>
+                    </a:cxn>
+                    <a:cxn ang="0">
+                      <a:pos x="connsiteX7" y="connsiteY7"/>
+                    </a:cxn>
+                    <a:cxn ang="0">
+                      <a:pos x="connsiteX8" y="connsiteY8"/>
+                    </a:cxn>
+                    <a:cxn ang="0">
+                      <a:pos x="connsiteX9" y="connsiteY9"/>
+                    </a:cxn>
+                    <a:cxn ang="0">
+                      <a:pos x="connsiteX10" y="connsiteY10"/>
+                    </a:cxn>
+                    <a:cxn ang="0">
+                      <a:pos x="connsiteX11" y="connsiteY11"/>
+                    </a:cxn>
+                    <a:cxn ang="0">
+                      <a:pos x="connsiteX12" y="connsiteY12"/>
+                    </a:cxn>
+                    <a:cxn ang="0">
+                      <a:pos x="connsiteX13" y="connsiteY13"/>
+                    </a:cxn>
+                    <a:cxn ang="0">
+                      <a:pos x="connsiteX14" y="connsiteY14"/>
+                    </a:cxn>
+                    <a:cxn ang="0">
+                      <a:pos x="connsiteX15" y="connsiteY15"/>
+                    </a:cxn>
+                    <a:cxn ang="0">
+                      <a:pos x="connsiteX16" y="connsiteY16"/>
+                    </a:cxn>
+                    <a:cxn ang="0">
+                      <a:pos x="connsiteX17" y="connsiteY17"/>
+                    </a:cxn>
+                    <a:cxn ang="0">
+                      <a:pos x="connsiteX18" y="connsiteY18"/>
+                    </a:cxn>
+                    <a:cxn ang="0">
+                      <a:pos x="connsiteX19" y="connsiteY19"/>
+                    </a:cxn>
+                    <a:cxn ang="0">
+                      <a:pos x="connsiteX20" y="connsiteY20"/>
+                    </a:cxn>
+                  </a:cxnLst>
+                  <a:rect l="l" t="t" r="r" b="b"/>
+                  <a:pathLst>
+                    <a:path w="496911" h="411423">
+                      <a:moveTo>
+                        <a:pt x="0" y="205713"/>
+                      </a:moveTo>
+                      <a:cubicBezTo>
+                        <a:pt x="0" y="174872"/>
+                        <a:pt x="25001" y="149871"/>
+                        <a:pt x="55842" y="149871"/>
+                      </a:cubicBezTo>
+                      <a:cubicBezTo>
+                        <a:pt x="63553" y="149871"/>
+                        <a:pt x="70898" y="151434"/>
+                        <a:pt x="77579" y="154260"/>
+                      </a:cubicBezTo>
+                      <a:lnTo>
+                        <a:pt x="85488" y="159592"/>
+                      </a:lnTo>
+                      <a:lnTo>
+                        <a:pt x="85488" y="45363"/>
+                      </a:lnTo>
+                      <a:cubicBezTo>
+                        <a:pt x="85488" y="20310"/>
+                        <a:pt x="105798" y="0"/>
+                        <a:pt x="130851" y="0"/>
+                      </a:cubicBezTo>
+                      <a:lnTo>
+                        <a:pt x="210713" y="0"/>
+                      </a:lnTo>
+                      <a:lnTo>
+                        <a:pt x="214845" y="20470"/>
+                      </a:lnTo>
+                      <a:cubicBezTo>
+                        <a:pt x="227425" y="50212"/>
+                        <a:pt x="256875" y="71080"/>
+                        <a:pt x="291199" y="71080"/>
+                      </a:cubicBezTo>
+                      <a:cubicBezTo>
+                        <a:pt x="325524" y="71080"/>
+                        <a:pt x="354974" y="50212"/>
+                        <a:pt x="367553" y="20470"/>
+                      </a:cubicBezTo>
+                      <a:lnTo>
+                        <a:pt x="371686" y="0"/>
+                      </a:lnTo>
+                      <a:lnTo>
+                        <a:pt x="451548" y="0"/>
+                      </a:lnTo>
+                      <a:cubicBezTo>
+                        <a:pt x="476601" y="0"/>
+                        <a:pt x="496911" y="20310"/>
+                        <a:pt x="496911" y="45363"/>
+                      </a:cubicBezTo>
+                      <a:lnTo>
+                        <a:pt x="496911" y="366060"/>
+                      </a:lnTo>
+                      <a:cubicBezTo>
+                        <a:pt x="496911" y="391113"/>
+                        <a:pt x="476601" y="411423"/>
+                        <a:pt x="451548" y="411423"/>
+                      </a:cubicBezTo>
+                      <a:lnTo>
+                        <a:pt x="130851" y="411423"/>
+                      </a:lnTo>
+                      <a:cubicBezTo>
+                        <a:pt x="105798" y="411423"/>
+                        <a:pt x="85488" y="391113"/>
+                        <a:pt x="85488" y="366060"/>
+                      </a:cubicBezTo>
+                      <a:lnTo>
+                        <a:pt x="85488" y="251834"/>
+                      </a:lnTo>
+                      <a:lnTo>
+                        <a:pt x="77579" y="257167"/>
+                      </a:lnTo>
+                      <a:cubicBezTo>
+                        <a:pt x="70898" y="259993"/>
+                        <a:pt x="63553" y="261555"/>
+                        <a:pt x="55842" y="261555"/>
+                      </a:cubicBezTo>
+                      <a:cubicBezTo>
+                        <a:pt x="25001" y="261555"/>
+                        <a:pt x="0" y="236554"/>
+                        <a:pt x="0" y="205713"/>
+                      </a:cubicBezTo>
+                      <a:close/>
+                    </a:path>
+                  </a:pathLst>
+                </a:custGeom>
+                <a:solidFill>
+                  <a:srgbClr val="3399FF"/>
+                </a:solidFill>
+                <a:ln>
+                  <a:noFill/>
+                </a:ln>
+              </p:spPr>
+              <p:style>
+                <a:lnRef idx="2">
+                  <a:schemeClr val="accent1">
+                    <a:shade val="50000"/>
+                  </a:schemeClr>
+                </a:lnRef>
+                <a:fillRef idx="1">
+                  <a:schemeClr val="accent1"/>
+                </a:fillRef>
+                <a:effectRef idx="0">
+                  <a:schemeClr val="accent1"/>
+                </a:effectRef>
+                <a:fontRef idx="minor">
+                  <a:schemeClr val="lt1"/>
+                </a:fontRef>
+              </p:style>
+              <p:txBody>
+                <a:bodyPr rtlCol="0" anchor="ctr"/>
+                <a:lstStyle/>
+                <a:p>
+                  <a:pPr algn="ctr"/>
+                  <a:endParaRPr lang="en-US"/>
+                </a:p>
+              </p:txBody>
+            </p:sp>
+            <p:pic>
+              <p:nvPicPr>
+                <p:cNvPr id="125" name="Picture 124" descr="A black rectangle with a black background&#10;&#10;Description automatically generated with low confidence">
+                  <a:extLst>
+                    <a:ext uri="{FF2B5EF4-FFF2-40B4-BE49-F238E27FC236}">
+                      <a16:creationId xmlns:a16="http://schemas.microsoft.com/office/drawing/2014/main" id="{51F04BAA-A7A2-42B7-A13F-94A791F02A54}"/>
+                    </a:ext>
+                  </a:extLst>
+                </p:cNvPr>
+                <p:cNvPicPr>
+                  <a:picLocks noChangeAspect="1"/>
+                </p:cNvPicPr>
+                <p:nvPr/>
+              </p:nvPicPr>
+              <p:blipFill>
+                <a:blip r:embed="rId3">
+                  <a:extLst>
+                    <a:ext uri="{28A0092B-C50C-407E-A947-70E740481C1C}">
+                      <a14:useLocalDpi xmlns:a14="http://schemas.microsoft.com/office/drawing/2010/main" val="0"/>
+                    </a:ext>
+                  </a:extLst>
+                </a:blip>
+                <a:stretch>
+                  <a:fillRect/>
+                </a:stretch>
+              </p:blipFill>
+              <p:spPr>
+                <a:xfrm>
+                  <a:off x="4491389" y="5466170"/>
+                  <a:ext cx="303301" cy="303902"/>
+                </a:xfrm>
+                <a:prstGeom prst="rect">
+                  <a:avLst/>
+                </a:prstGeom>
+              </p:spPr>
+            </p:pic>
+          </p:grpSp>
+          <p:grpSp>
+            <p:nvGrpSpPr>
+              <p:cNvPr id="119" name="Group 118">
+                <a:extLst>
+                  <a:ext uri="{FF2B5EF4-FFF2-40B4-BE49-F238E27FC236}">
+                    <a16:creationId xmlns:a16="http://schemas.microsoft.com/office/drawing/2014/main" id="{C403C225-1823-40A4-8043-1E46B545F8E6}"/>
+                  </a:ext>
+                </a:extLst>
+              </p:cNvPr>
+              <p:cNvGrpSpPr/>
+              <p:nvPr/>
+            </p:nvGrpSpPr>
+            <p:grpSpPr>
+              <a:xfrm>
+                <a:off x="4439019" y="4941359"/>
+                <a:ext cx="496911" cy="411423"/>
+                <a:chOff x="4439019" y="4941359"/>
+                <a:chExt cx="496911" cy="411423"/>
+              </a:xfrm>
+            </p:grpSpPr>
+            <p:sp>
+              <p:nvSpPr>
+                <p:cNvPr id="122" name="Freeform: Shape 121">
+                  <a:extLst>
+                    <a:ext uri="{FF2B5EF4-FFF2-40B4-BE49-F238E27FC236}">
+                      <a16:creationId xmlns:a16="http://schemas.microsoft.com/office/drawing/2014/main" id="{69CF5728-ABA6-41C3-98F3-04BBBA1DFB2B}"/>
+                    </a:ext>
+                  </a:extLst>
+                </p:cNvPr>
+                <p:cNvSpPr>
+                  <a:spLocks noChangeAspect="1"/>
+                </p:cNvSpPr>
+                <p:nvPr/>
+              </p:nvSpPr>
+              <p:spPr>
+                <a:xfrm rot="10800000">
+                  <a:off x="4439019" y="4941359"/>
+                  <a:ext cx="496911" cy="411423"/>
+                </a:xfrm>
+                <a:custGeom>
+                  <a:avLst/>
+                  <a:gdLst>
+                    <a:gd name="connsiteX0" fmla="*/ 0 w 496911"/>
+                    <a:gd name="connsiteY0" fmla="*/ 205713 h 411423"/>
+                    <a:gd name="connsiteX1" fmla="*/ 55842 w 496911"/>
+                    <a:gd name="connsiteY1" fmla="*/ 149871 h 411423"/>
+                    <a:gd name="connsiteX2" fmla="*/ 77579 w 496911"/>
+                    <a:gd name="connsiteY2" fmla="*/ 154260 h 411423"/>
+                    <a:gd name="connsiteX3" fmla="*/ 85488 w 496911"/>
+                    <a:gd name="connsiteY3" fmla="*/ 159592 h 411423"/>
+                    <a:gd name="connsiteX4" fmla="*/ 85488 w 496911"/>
+                    <a:gd name="connsiteY4" fmla="*/ 45363 h 411423"/>
+                    <a:gd name="connsiteX5" fmla="*/ 130851 w 496911"/>
+                    <a:gd name="connsiteY5" fmla="*/ 0 h 411423"/>
+                    <a:gd name="connsiteX6" fmla="*/ 210713 w 496911"/>
+                    <a:gd name="connsiteY6" fmla="*/ 0 h 411423"/>
+                    <a:gd name="connsiteX7" fmla="*/ 214845 w 496911"/>
+                    <a:gd name="connsiteY7" fmla="*/ 20470 h 411423"/>
+                    <a:gd name="connsiteX8" fmla="*/ 291199 w 496911"/>
+                    <a:gd name="connsiteY8" fmla="*/ 71080 h 411423"/>
+                    <a:gd name="connsiteX9" fmla="*/ 367553 w 496911"/>
+                    <a:gd name="connsiteY9" fmla="*/ 20470 h 411423"/>
+                    <a:gd name="connsiteX10" fmla="*/ 371686 w 496911"/>
+                    <a:gd name="connsiteY10" fmla="*/ 0 h 411423"/>
+                    <a:gd name="connsiteX11" fmla="*/ 451548 w 496911"/>
+                    <a:gd name="connsiteY11" fmla="*/ 0 h 411423"/>
+                    <a:gd name="connsiteX12" fmla="*/ 496911 w 496911"/>
+                    <a:gd name="connsiteY12" fmla="*/ 45363 h 411423"/>
+                    <a:gd name="connsiteX13" fmla="*/ 496911 w 496911"/>
+                    <a:gd name="connsiteY13" fmla="*/ 366060 h 411423"/>
+                    <a:gd name="connsiteX14" fmla="*/ 451548 w 496911"/>
+                    <a:gd name="connsiteY14" fmla="*/ 411423 h 411423"/>
+                    <a:gd name="connsiteX15" fmla="*/ 130851 w 496911"/>
+                    <a:gd name="connsiteY15" fmla="*/ 411423 h 411423"/>
+                    <a:gd name="connsiteX16" fmla="*/ 85488 w 496911"/>
+                    <a:gd name="connsiteY16" fmla="*/ 366060 h 411423"/>
+                    <a:gd name="connsiteX17" fmla="*/ 85488 w 496911"/>
+                    <a:gd name="connsiteY17" fmla="*/ 251834 h 411423"/>
+                    <a:gd name="connsiteX18" fmla="*/ 77579 w 496911"/>
+                    <a:gd name="connsiteY18" fmla="*/ 257167 h 411423"/>
+                    <a:gd name="connsiteX19" fmla="*/ 55842 w 496911"/>
+                    <a:gd name="connsiteY19" fmla="*/ 261555 h 411423"/>
+                    <a:gd name="connsiteX20" fmla="*/ 0 w 496911"/>
+                    <a:gd name="connsiteY20" fmla="*/ 205713 h 411423"/>
+                  </a:gdLst>
+                  <a:ahLst/>
+                  <a:cxnLst>
+                    <a:cxn ang="0">
+                      <a:pos x="connsiteX0" y="connsiteY0"/>
+                    </a:cxn>
+                    <a:cxn ang="0">
+                      <a:pos x="connsiteX1" y="connsiteY1"/>
+                    </a:cxn>
+                    <a:cxn ang="0">
+                      <a:pos x="connsiteX2" y="connsiteY2"/>
+                    </a:cxn>
+                    <a:cxn ang="0">
+                      <a:pos x="connsiteX3" y="connsiteY3"/>
+                    </a:cxn>
+                    <a:cxn ang="0">
+                      <a:pos x="connsiteX4" y="connsiteY4"/>
+                    </a:cxn>
+                    <a:cxn ang="0">
+                      <a:pos x="connsiteX5" y="connsiteY5"/>
+                    </a:cxn>
+                    <a:cxn ang="0">
+                      <a:pos x="connsiteX6" y="connsiteY6"/>
+                    </a:cxn>
+                    <a:cxn ang="0">
+                      <a:pos x="connsiteX7" y="connsiteY7"/>
+                    </a:cxn>
+                    <a:cxn ang="0">
+                      <a:pos x="connsiteX8" y="connsiteY8"/>
+                    </a:cxn>
+                    <a:cxn ang="0">
+                      <a:pos x="connsiteX9" y="connsiteY9"/>
+                    </a:cxn>
+                    <a:cxn ang="0">
+                      <a:pos x="connsiteX10" y="connsiteY10"/>
+                    </a:cxn>
+                    <a:cxn ang="0">
+                      <a:pos x="connsiteX11" y="connsiteY11"/>
+                    </a:cxn>
+                    <a:cxn ang="0">
+                      <a:pos x="connsiteX12" y="connsiteY12"/>
+                    </a:cxn>
+                    <a:cxn ang="0">
+                      <a:pos x="connsiteX13" y="connsiteY13"/>
+                    </a:cxn>
+                    <a:cxn ang="0">
+                      <a:pos x="connsiteX14" y="connsiteY14"/>
+                    </a:cxn>
+                    <a:cxn ang="0">
+                      <a:pos x="connsiteX15" y="connsiteY15"/>
+                    </a:cxn>
+                    <a:cxn ang="0">
+                      <a:pos x="connsiteX16" y="connsiteY16"/>
+                    </a:cxn>
+                    <a:cxn ang="0">
+                      <a:pos x="connsiteX17" y="connsiteY17"/>
+                    </a:cxn>
+                    <a:cxn ang="0">
+                      <a:pos x="connsiteX18" y="connsiteY18"/>
+                    </a:cxn>
+                    <a:cxn ang="0">
+                      <a:pos x="connsiteX19" y="connsiteY19"/>
+                    </a:cxn>
+                    <a:cxn ang="0">
+                      <a:pos x="connsiteX20" y="connsiteY20"/>
+                    </a:cxn>
+                  </a:cxnLst>
+                  <a:rect l="l" t="t" r="r" b="b"/>
+                  <a:pathLst>
+                    <a:path w="496911" h="411423">
+                      <a:moveTo>
+                        <a:pt x="0" y="205713"/>
+                      </a:moveTo>
+                      <a:cubicBezTo>
+                        <a:pt x="0" y="174872"/>
+                        <a:pt x="25001" y="149871"/>
+                        <a:pt x="55842" y="149871"/>
+                      </a:cubicBezTo>
+                      <a:cubicBezTo>
+                        <a:pt x="63553" y="149871"/>
+                        <a:pt x="70898" y="151434"/>
+                        <a:pt x="77579" y="154260"/>
+                      </a:cubicBezTo>
+                      <a:lnTo>
+                        <a:pt x="85488" y="159592"/>
+                      </a:lnTo>
+                      <a:lnTo>
+                        <a:pt x="85488" y="45363"/>
+                      </a:lnTo>
+                      <a:cubicBezTo>
+                        <a:pt x="85488" y="20310"/>
+                        <a:pt x="105798" y="0"/>
+                        <a:pt x="130851" y="0"/>
+                      </a:cubicBezTo>
+                      <a:lnTo>
+                        <a:pt x="210713" y="0"/>
+                      </a:lnTo>
+                      <a:lnTo>
+                        <a:pt x="214845" y="20470"/>
+                      </a:lnTo>
+                      <a:cubicBezTo>
+                        <a:pt x="227425" y="50212"/>
+                        <a:pt x="256875" y="71080"/>
+                        <a:pt x="291199" y="71080"/>
+                      </a:cubicBezTo>
+                      <a:cubicBezTo>
+                        <a:pt x="325524" y="71080"/>
+                        <a:pt x="354974" y="50212"/>
+                        <a:pt x="367553" y="20470"/>
+                      </a:cubicBezTo>
+                      <a:lnTo>
+                        <a:pt x="371686" y="0"/>
+                      </a:lnTo>
+                      <a:lnTo>
+                        <a:pt x="451548" y="0"/>
+                      </a:lnTo>
+                      <a:cubicBezTo>
+                        <a:pt x="476601" y="0"/>
+                        <a:pt x="496911" y="20310"/>
+                        <a:pt x="496911" y="45363"/>
+                      </a:cubicBezTo>
+                      <a:lnTo>
+                        <a:pt x="496911" y="366060"/>
+                      </a:lnTo>
+                      <a:cubicBezTo>
+                        <a:pt x="496911" y="391113"/>
+                        <a:pt x="476601" y="411423"/>
+                        <a:pt x="451548" y="411423"/>
+                      </a:cubicBezTo>
+                      <a:lnTo>
+                        <a:pt x="130851" y="411423"/>
+                      </a:lnTo>
+                      <a:cubicBezTo>
+                        <a:pt x="105798" y="411423"/>
+                        <a:pt x="85488" y="391113"/>
+                        <a:pt x="85488" y="366060"/>
+                      </a:cubicBezTo>
+                      <a:lnTo>
+                        <a:pt x="85488" y="251834"/>
+                      </a:lnTo>
+                      <a:lnTo>
+                        <a:pt x="77579" y="257167"/>
+                      </a:lnTo>
+                      <a:cubicBezTo>
+                        <a:pt x="70898" y="259993"/>
+                        <a:pt x="63553" y="261555"/>
+                        <a:pt x="55842" y="261555"/>
+                      </a:cubicBezTo>
+                      <a:cubicBezTo>
+                        <a:pt x="25001" y="261555"/>
+                        <a:pt x="0" y="236554"/>
+                        <a:pt x="0" y="205713"/>
+                      </a:cubicBezTo>
+                      <a:close/>
+                    </a:path>
+                  </a:pathLst>
+                </a:custGeom>
+                <a:solidFill>
+                  <a:srgbClr val="FF3399"/>
+                </a:solidFill>
+                <a:ln>
+                  <a:noFill/>
+                </a:ln>
+              </p:spPr>
+              <p:style>
+                <a:lnRef idx="2">
+                  <a:schemeClr val="accent1">
+                    <a:shade val="50000"/>
+                  </a:schemeClr>
+                </a:lnRef>
+                <a:fillRef idx="1">
+                  <a:schemeClr val="accent1"/>
+                </a:fillRef>
+                <a:effectRef idx="0">
+                  <a:schemeClr val="accent1"/>
+                </a:effectRef>
+                <a:fontRef idx="minor">
+                  <a:schemeClr val="lt1"/>
+                </a:fontRef>
+              </p:style>
+              <p:txBody>
+                <a:bodyPr rtlCol="0" anchor="ctr"/>
+                <a:lstStyle/>
+                <a:p>
+                  <a:pPr algn="ctr"/>
+                  <a:endParaRPr lang="en-US"/>
+                </a:p>
+              </p:txBody>
+            </p:sp>
+            <p:pic>
+              <p:nvPicPr>
+                <p:cNvPr id="123" name="Picture 122" descr="A picture containing night sky&#10;&#10;Description automatically generated">
+                  <a:extLst>
+                    <a:ext uri="{FF2B5EF4-FFF2-40B4-BE49-F238E27FC236}">
+                      <a16:creationId xmlns:a16="http://schemas.microsoft.com/office/drawing/2014/main" id="{5CFFF642-DA33-43B4-9DE3-85C5C471E1F8}"/>
+                    </a:ext>
+                  </a:extLst>
+                </p:cNvPr>
+                <p:cNvPicPr>
+                  <a:picLocks noChangeAspect="1"/>
+                </p:cNvPicPr>
+                <p:nvPr/>
+              </p:nvPicPr>
+              <p:blipFill>
+                <a:blip r:embed="rId2">
+                  <a:extLst>
+                    <a:ext uri="{28A0092B-C50C-407E-A947-70E740481C1C}">
+                      <a14:useLocalDpi xmlns:a14="http://schemas.microsoft.com/office/drawing/2010/main" val="0"/>
+                    </a:ext>
+                  </a:extLst>
+                </a:blip>
+                <a:stretch>
+                  <a:fillRect/>
+                </a:stretch>
+              </p:blipFill>
+              <p:spPr>
+                <a:xfrm>
+                  <a:off x="4496657" y="4987677"/>
+                  <a:ext cx="275503" cy="286237"/>
+                </a:xfrm>
+                <a:prstGeom prst="rect">
+                  <a:avLst/>
+                </a:prstGeom>
+                <a:noFill/>
+                <a:ln>
+                  <a:noFill/>
+                </a:ln>
+              </p:spPr>
+            </p:pic>
+          </p:grpSp>
+          <p:sp>
+            <p:nvSpPr>
+              <p:cNvPr id="120" name="Freeform: Shape 119">
+                <a:extLst>
+                  <a:ext uri="{FF2B5EF4-FFF2-40B4-BE49-F238E27FC236}">
+                    <a16:creationId xmlns:a16="http://schemas.microsoft.com/office/drawing/2014/main" id="{02A98E75-CEE8-4761-8B3F-1D03F040CED8}"/>
+                  </a:ext>
+                </a:extLst>
+              </p:cNvPr>
+              <p:cNvSpPr>
+                <a:spLocks noChangeAspect="1"/>
+              </p:cNvSpPr>
+              <p:nvPr/>
+            </p:nvSpPr>
+            <p:spPr>
+              <a:xfrm>
+                <a:off x="4822423" y="5416265"/>
+                <a:ext cx="496911" cy="411423"/>
+              </a:xfrm>
+              <a:custGeom>
+                <a:avLst/>
+                <a:gdLst>
+                  <a:gd name="connsiteX0" fmla="*/ 0 w 496911"/>
+                  <a:gd name="connsiteY0" fmla="*/ 205713 h 411423"/>
+                  <a:gd name="connsiteX1" fmla="*/ 55842 w 496911"/>
+                  <a:gd name="connsiteY1" fmla="*/ 149871 h 411423"/>
+                  <a:gd name="connsiteX2" fmla="*/ 77579 w 496911"/>
+                  <a:gd name="connsiteY2" fmla="*/ 154260 h 411423"/>
+                  <a:gd name="connsiteX3" fmla="*/ 85488 w 496911"/>
+                  <a:gd name="connsiteY3" fmla="*/ 159592 h 411423"/>
+                  <a:gd name="connsiteX4" fmla="*/ 85488 w 496911"/>
+                  <a:gd name="connsiteY4" fmla="*/ 45363 h 411423"/>
+                  <a:gd name="connsiteX5" fmla="*/ 130851 w 496911"/>
+                  <a:gd name="connsiteY5" fmla="*/ 0 h 411423"/>
+                  <a:gd name="connsiteX6" fmla="*/ 210713 w 496911"/>
+                  <a:gd name="connsiteY6" fmla="*/ 0 h 411423"/>
+                  <a:gd name="connsiteX7" fmla="*/ 214845 w 496911"/>
+                  <a:gd name="connsiteY7" fmla="*/ 20470 h 411423"/>
+                  <a:gd name="connsiteX8" fmla="*/ 291199 w 496911"/>
+                  <a:gd name="connsiteY8" fmla="*/ 71080 h 411423"/>
+                  <a:gd name="connsiteX9" fmla="*/ 367553 w 496911"/>
+                  <a:gd name="connsiteY9" fmla="*/ 20470 h 411423"/>
+                  <a:gd name="connsiteX10" fmla="*/ 371686 w 496911"/>
+                  <a:gd name="connsiteY10" fmla="*/ 0 h 411423"/>
+                  <a:gd name="connsiteX11" fmla="*/ 451548 w 496911"/>
+                  <a:gd name="connsiteY11" fmla="*/ 0 h 411423"/>
+                  <a:gd name="connsiteX12" fmla="*/ 496911 w 496911"/>
+                  <a:gd name="connsiteY12" fmla="*/ 45363 h 411423"/>
+                  <a:gd name="connsiteX13" fmla="*/ 496911 w 496911"/>
+                  <a:gd name="connsiteY13" fmla="*/ 366060 h 411423"/>
+                  <a:gd name="connsiteX14" fmla="*/ 451548 w 496911"/>
+                  <a:gd name="connsiteY14" fmla="*/ 411423 h 411423"/>
+                  <a:gd name="connsiteX15" fmla="*/ 130851 w 496911"/>
+                  <a:gd name="connsiteY15" fmla="*/ 411423 h 411423"/>
+                  <a:gd name="connsiteX16" fmla="*/ 85488 w 496911"/>
+                  <a:gd name="connsiteY16" fmla="*/ 366060 h 411423"/>
+                  <a:gd name="connsiteX17" fmla="*/ 85488 w 496911"/>
+                  <a:gd name="connsiteY17" fmla="*/ 251834 h 411423"/>
+                  <a:gd name="connsiteX18" fmla="*/ 77579 w 496911"/>
+                  <a:gd name="connsiteY18" fmla="*/ 257167 h 411423"/>
+                  <a:gd name="connsiteX19" fmla="*/ 55842 w 496911"/>
+                  <a:gd name="connsiteY19" fmla="*/ 261555 h 411423"/>
+                  <a:gd name="connsiteX20" fmla="*/ 0 w 496911"/>
+                  <a:gd name="connsiteY20" fmla="*/ 205713 h 411423"/>
+                </a:gdLst>
+                <a:ahLst/>
+                <a:cxnLst>
+                  <a:cxn ang="0">
+                    <a:pos x="connsiteX0" y="connsiteY0"/>
+                  </a:cxn>
+                  <a:cxn ang="0">
+                    <a:pos x="connsiteX1" y="connsiteY1"/>
+                  </a:cxn>
+                  <a:cxn ang="0">
+                    <a:pos x="connsiteX2" y="connsiteY2"/>
+                  </a:cxn>
+                  <a:cxn ang="0">
+                    <a:pos x="connsiteX3" y="connsiteY3"/>
+                  </a:cxn>
+                  <a:cxn ang="0">
+                    <a:pos x="connsiteX4" y="connsiteY4"/>
+                  </a:cxn>
+                  <a:cxn ang="0">
+                    <a:pos x="connsiteX5" y="connsiteY5"/>
+                  </a:cxn>
+                  <a:cxn ang="0">
+                    <a:pos x="connsiteX6" y="connsiteY6"/>
+                  </a:cxn>
+                  <a:cxn ang="0">
+                    <a:pos x="connsiteX7" y="connsiteY7"/>
+                  </a:cxn>
+                  <a:cxn ang="0">
+                    <a:pos x="connsiteX8" y="connsiteY8"/>
+                  </a:cxn>
+                  <a:cxn ang="0">
+                    <a:pos x="connsiteX9" y="connsiteY9"/>
+                  </a:cxn>
+                  <a:cxn ang="0">
+                    <a:pos x="connsiteX10" y="connsiteY10"/>
+                  </a:cxn>
+                  <a:cxn ang="0">
+                    <a:pos x="connsiteX11" y="connsiteY11"/>
+                  </a:cxn>
+                  <a:cxn ang="0">
+                    <a:pos x="connsiteX12" y="connsiteY12"/>
+                  </a:cxn>
+                  <a:cxn ang="0">
+                    <a:pos x="connsiteX13" y="connsiteY13"/>
+                  </a:cxn>
+                  <a:cxn ang="0">
+                    <a:pos x="connsiteX14" y="connsiteY14"/>
+                  </a:cxn>
+                  <a:cxn ang="0">
+                    <a:pos x="connsiteX15" y="connsiteY15"/>
+                  </a:cxn>
+                  <a:cxn ang="0">
+                    <a:pos x="connsiteX16" y="connsiteY16"/>
+                  </a:cxn>
+                  <a:cxn ang="0">
+                    <a:pos x="connsiteX17" y="connsiteY17"/>
+                  </a:cxn>
+                  <a:cxn ang="0">
+                    <a:pos x="connsiteX18" y="connsiteY18"/>
+                  </a:cxn>
+                  <a:cxn ang="0">
+                    <a:pos x="connsiteX19" y="connsiteY19"/>
+                  </a:cxn>
+                  <a:cxn ang="0">
+                    <a:pos x="connsiteX20" y="connsiteY20"/>
+                  </a:cxn>
+                </a:cxnLst>
+                <a:rect l="l" t="t" r="r" b="b"/>
+                <a:pathLst>
+                  <a:path w="496911" h="411423">
+                    <a:moveTo>
+                      <a:pt x="0" y="205713"/>
+                    </a:moveTo>
+                    <a:cubicBezTo>
+                      <a:pt x="0" y="174872"/>
+                      <a:pt x="25001" y="149871"/>
+                      <a:pt x="55842" y="149871"/>
+                    </a:cubicBezTo>
+                    <a:cubicBezTo>
+                      <a:pt x="63553" y="149871"/>
+                      <a:pt x="70898" y="151434"/>
+                      <a:pt x="77579" y="154260"/>
+                    </a:cubicBezTo>
+                    <a:lnTo>
+                      <a:pt x="85488" y="159592"/>
+                    </a:lnTo>
+                    <a:lnTo>
+                      <a:pt x="85488" y="45363"/>
+                    </a:lnTo>
+                    <a:cubicBezTo>
+                      <a:pt x="85488" y="20310"/>
+                      <a:pt x="105798" y="0"/>
+                      <a:pt x="130851" y="0"/>
+                    </a:cubicBezTo>
+                    <a:lnTo>
+                      <a:pt x="210713" y="0"/>
+                    </a:lnTo>
+                    <a:lnTo>
+                      <a:pt x="214845" y="20470"/>
+                    </a:lnTo>
+                    <a:cubicBezTo>
+                      <a:pt x="227425" y="50212"/>
+                      <a:pt x="256875" y="71080"/>
+                      <a:pt x="291199" y="71080"/>
+                    </a:cubicBezTo>
+                    <a:cubicBezTo>
+                      <a:pt x="325524" y="71080"/>
+                      <a:pt x="354974" y="50212"/>
+                      <a:pt x="367553" y="20470"/>
+                    </a:cubicBezTo>
+                    <a:lnTo>
+                      <a:pt x="371686" y="0"/>
+                    </a:lnTo>
+                    <a:lnTo>
+                      <a:pt x="451548" y="0"/>
+                    </a:lnTo>
+                    <a:cubicBezTo>
+                      <a:pt x="476601" y="0"/>
+                      <a:pt x="496911" y="20310"/>
+                      <a:pt x="496911" y="45363"/>
+                    </a:cubicBezTo>
+                    <a:lnTo>
+                      <a:pt x="496911" y="366060"/>
+                    </a:lnTo>
+                    <a:cubicBezTo>
+                      <a:pt x="496911" y="391113"/>
+                      <a:pt x="476601" y="411423"/>
+                      <a:pt x="451548" y="411423"/>
+                    </a:cubicBezTo>
+                    <a:lnTo>
+                      <a:pt x="130851" y="411423"/>
+                    </a:lnTo>
+                    <a:cubicBezTo>
+                      <a:pt x="105798" y="411423"/>
+                      <a:pt x="85488" y="391113"/>
+                      <a:pt x="85488" y="366060"/>
+                    </a:cubicBezTo>
+                    <a:lnTo>
+                      <a:pt x="85488" y="251834"/>
+                    </a:lnTo>
+                    <a:lnTo>
+                      <a:pt x="77579" y="257167"/>
+                    </a:lnTo>
+                    <a:cubicBezTo>
+                      <a:pt x="70898" y="259993"/>
+                      <a:pt x="63553" y="261555"/>
+                      <a:pt x="55842" y="261555"/>
+                    </a:cubicBezTo>
+                    <a:cubicBezTo>
+                      <a:pt x="25001" y="261555"/>
+                      <a:pt x="0" y="236554"/>
+                      <a:pt x="0" y="205713"/>
+                    </a:cubicBezTo>
+                    <a:close/>
+                  </a:path>
+                </a:pathLst>
+              </a:custGeom>
+              <a:solidFill>
+                <a:srgbClr val="FFC000"/>
+              </a:solidFill>
+              <a:ln>
+                <a:noFill/>
+              </a:ln>
+            </p:spPr>
+            <p:style>
+              <a:lnRef idx="2">
+                <a:schemeClr val="accent1">
+                  <a:shade val="50000"/>
+                </a:schemeClr>
+              </a:lnRef>
+              <a:fillRef idx="1">
+                <a:schemeClr val="accent1"/>
+              </a:fillRef>
+              <a:effectRef idx="0">
+                <a:schemeClr val="accent1"/>
+              </a:effectRef>
+              <a:fontRef idx="minor">
+                <a:schemeClr val="lt1"/>
+              </a:fontRef>
+            </p:style>
+            <p:txBody>
+              <a:bodyPr rtlCol="0" anchor="ctr"/>
+              <a:lstStyle/>
+              <a:p>
+                <a:pPr algn="ctr"/>
+                <a:endParaRPr lang="en-US"/>
+              </a:p>
+            </p:txBody>
+          </p:sp>
+          <p:pic>
+            <p:nvPicPr>
+              <p:cNvPr id="121" name="Picture 120" descr="A picture containing looking, dark&#10;&#10;Description automatically generated">
+                <a:extLst>
+                  <a:ext uri="{FF2B5EF4-FFF2-40B4-BE49-F238E27FC236}">
+                    <a16:creationId xmlns:a16="http://schemas.microsoft.com/office/drawing/2014/main" id="{043D8F50-CF92-4DFD-88D2-D99A8FC62978}"/>
+                  </a:ext>
+                </a:extLst>
+              </p:cNvPr>
+              <p:cNvPicPr>
+                <a:picLocks noChangeAspect="1"/>
+              </p:cNvPicPr>
+              <p:nvPr/>
+            </p:nvPicPr>
+            <p:blipFill>
+              <a:blip r:embed="rId4">
+                <a:extLst>
+                  <a:ext uri="{28A0092B-C50C-407E-A947-70E740481C1C}">
+                    <a14:useLocalDpi xmlns:a14="http://schemas.microsoft.com/office/drawing/2010/main" val="0"/>
+                  </a:ext>
+                </a:extLst>
+              </a:blip>
+              <a:stretch>
+                <a:fillRect/>
+              </a:stretch>
+            </p:blipFill>
+            <p:spPr>
+              <a:xfrm rot="19063852">
+                <a:off x="4950042" y="5532484"/>
+                <a:ext cx="323982" cy="167197"/>
+              </a:xfrm>
+              <a:prstGeom prst="rect">
+                <a:avLst/>
+              </a:prstGeom>
+            </p:spPr>
+          </p:pic>
+        </p:grpSp>
       </p:grpSp>
     </p:spTree>
     <p:extLst>

</xml_diff>

<commit_message>
Deploying to gh-pages from @ Minee-Liane-Choi/MineeChoiLab@5e48d2defbfb499b4f2bc8f484d5c2c5dc0c0002 🚀
</commit_message>
<xml_diff>
--- a/images/BRePAIR.pptx
+++ b/images/BRePAIR.pptx
@@ -3345,7 +3345,7 @@
         </p:nvSpPr>
         <p:spPr>
           <a:xfrm>
-            <a:off x="4448910" y="2389444"/>
+            <a:off x="3929364" y="1160924"/>
             <a:ext cx="411423" cy="411423"/>
           </a:xfrm>
           <a:prstGeom prst="roundRect">
@@ -3413,7 +3413,7 @@
         </p:blipFill>
         <p:spPr>
           <a:xfrm>
-            <a:off x="4471131" y="2417212"/>
+            <a:off x="3951585" y="1188692"/>
             <a:ext cx="355374" cy="369220"/>
           </a:xfrm>
           <a:prstGeom prst="rect">
@@ -3441,7 +3441,7 @@
         </p:nvSpPr>
         <p:spPr>
           <a:xfrm>
-            <a:off x="4448910" y="2835996"/>
+            <a:off x="3929364" y="1607476"/>
             <a:ext cx="411423" cy="411423"/>
           </a:xfrm>
           <a:prstGeom prst="roundRect">
@@ -3509,7 +3509,7 @@
         </p:blipFill>
         <p:spPr>
           <a:xfrm>
-            <a:off x="4467857" y="2849033"/>
+            <a:off x="3948311" y="1620513"/>
             <a:ext cx="377595" cy="378343"/>
           </a:xfrm>
           <a:prstGeom prst="rect">
@@ -3531,7 +3531,7 @@
         </p:nvGrpSpPr>
         <p:grpSpPr>
           <a:xfrm>
-            <a:off x="4892449" y="2835996"/>
+            <a:off x="4372903" y="1607476"/>
             <a:ext cx="423768" cy="411423"/>
             <a:chOff x="3372084" y="3453994"/>
             <a:chExt cx="423768" cy="411423"/>
@@ -3644,7 +3644,7 @@
         </p:nvGrpSpPr>
         <p:grpSpPr>
           <a:xfrm rot="1720764">
-            <a:off x="4990047" y="2336663"/>
+            <a:off x="4470501" y="1108143"/>
             <a:ext cx="411423" cy="411423"/>
             <a:chOff x="3378258" y="3001902"/>
             <a:chExt cx="411423" cy="411423"/>
@@ -3757,7 +3757,7 @@
         </p:nvGrpSpPr>
         <p:grpSpPr>
           <a:xfrm>
-            <a:off x="6349242" y="1527921"/>
+            <a:off x="5829696" y="299401"/>
             <a:ext cx="1898179" cy="1961232"/>
             <a:chOff x="3525873" y="613521"/>
             <a:chExt cx="1898179" cy="1961232"/>
@@ -4520,7 +4520,7 @@
         </p:nvGrpSpPr>
         <p:grpSpPr>
           <a:xfrm>
-            <a:off x="4478115" y="4437588"/>
+            <a:off x="3912849" y="3006082"/>
             <a:ext cx="960399" cy="905681"/>
             <a:chOff x="4439019" y="4922007"/>
             <a:chExt cx="960399" cy="905681"/>
@@ -5759,15 +5759,17 @@
               </a:ext>
             </a:extLst>
           </p:cNvPr>
-          <p:cNvGrpSpPr/>
+          <p:cNvGrpSpPr>
+            <a:grpSpLocks noChangeAspect="1"/>
+          </p:cNvGrpSpPr>
           <p:nvPr/>
         </p:nvGrpSpPr>
         <p:grpSpPr>
           <a:xfrm>
-            <a:off x="6366357" y="4140358"/>
-            <a:ext cx="1898179" cy="1944529"/>
-            <a:chOff x="6366357" y="4140358"/>
-            <a:chExt cx="1898179" cy="1944529"/>
+            <a:off x="5769919" y="2708852"/>
+            <a:ext cx="3618200" cy="3538272"/>
+            <a:chOff x="6338541" y="4140358"/>
+            <a:chExt cx="1898179" cy="1856247"/>
           </a:xfrm>
         </p:grpSpPr>
         <p:sp>
@@ -5784,8 +5786,8 @@
           </p:nvSpPr>
           <p:spPr>
             <a:xfrm>
-              <a:off x="6366357" y="5746333"/>
-              <a:ext cx="1898179" cy="338554"/>
+              <a:off x="6338541" y="5746333"/>
+              <a:ext cx="1898179" cy="250272"/>
             </a:xfrm>
             <a:prstGeom prst="rect">
               <a:avLst/>
@@ -5799,7 +5801,7 @@
             <a:p>
               <a:pPr algn="ctr"/>
               <a:r>
-                <a:rPr lang="en-US" sz="1600" b="1" dirty="0">
+                <a:rPr lang="en-US" sz="2500" b="1" dirty="0">
                   <a:solidFill>
                     <a:srgbClr val="FF3399"/>
                   </a:solidFill>
@@ -5808,7 +5810,7 @@
                 <a:t>BR</a:t>
               </a:r>
               <a:r>
-                <a:rPr lang="en-US" sz="1600" b="1" i="1" dirty="0">
+                <a:rPr lang="en-US" sz="2500" b="1" i="1" dirty="0">
                   <a:solidFill>
                     <a:schemeClr val="bg1"/>
                   </a:solidFill>
@@ -5820,7 +5822,7 @@
                 <a:t>A</a:t>
               </a:r>
               <a:r>
-                <a:rPr lang="en-US" sz="1600" b="1" dirty="0">
+                <a:rPr lang="en-US" sz="2500" b="1" dirty="0">
                   <a:solidFill>
                     <a:schemeClr val="bg1"/>
                   </a:solidFill>
@@ -5832,7 +5834,7 @@
                 <a:t>I</a:t>
               </a:r>
               <a:r>
-                <a:rPr lang="en-US" sz="1600" b="1" dirty="0">
+                <a:rPr lang="en-US" sz="2500" b="1" dirty="0">
                   <a:solidFill>
                     <a:srgbClr val="FF3399"/>
                   </a:solidFill>
@@ -5841,7 +5843,7 @@
                 <a:t>N</a:t>
               </a:r>
               <a:r>
-                <a:rPr lang="en-US" sz="1600" b="1" dirty="0">
+                <a:rPr lang="en-US" sz="2500" b="1" dirty="0">
                   <a:solidFill>
                     <a:srgbClr val="000000"/>
                   </a:solidFill>
@@ -5850,7 +5852,7 @@
                 <a:t> </a:t>
               </a:r>
               <a:r>
-                <a:rPr lang="en-US" sz="1600" b="1" i="1" dirty="0" err="1">
+                <a:rPr lang="en-US" sz="2500" b="1" i="1" dirty="0" err="1">
                   <a:solidFill>
                     <a:srgbClr val="3399FF"/>
                   </a:solidFill>
@@ -5859,7 +5861,7 @@
                 <a:t>Re</a:t>
               </a:r>
               <a:r>
-                <a:rPr lang="en-US" sz="1600" b="1" dirty="0" err="1">
+                <a:rPr lang="en-US" sz="2500" b="1" dirty="0" err="1">
                   <a:solidFill>
                     <a:srgbClr val="3399FF"/>
                   </a:solidFill>
@@ -5868,7 +5870,7 @@
                 <a:t>P</a:t>
               </a:r>
               <a:r>
-                <a:rPr lang="en-US" sz="1600" b="1" i="1" dirty="0" err="1">
+                <a:rPr lang="en-US" sz="2500" b="1" i="1" dirty="0" err="1">
                   <a:solidFill>
                     <a:schemeClr val="bg1"/>
                   </a:solidFill>
@@ -5880,7 +5882,7 @@
                 <a:t>A</a:t>
               </a:r>
               <a:r>
-                <a:rPr lang="en-US" sz="1600" b="1" dirty="0" err="1">
+                <a:rPr lang="en-US" sz="2500" b="1" dirty="0" err="1">
                   <a:solidFill>
                     <a:schemeClr val="bg1"/>
                   </a:solidFill>
@@ -5892,7 +5894,7 @@
                 <a:t>I</a:t>
               </a:r>
               <a:r>
-                <a:rPr lang="en-US" sz="1600" b="1" dirty="0" err="1">
+                <a:rPr lang="en-US" sz="2500" b="1" dirty="0" err="1">
                   <a:solidFill>
                     <a:srgbClr val="3399FF"/>
                   </a:solidFill>
@@ -5900,7 +5902,7 @@
                 </a:rPr>
                 <a:t>R</a:t>
               </a:r>
-              <a:endParaRPr lang="en-US" sz="1600" dirty="0">
+              <a:endParaRPr lang="en-US" sz="2500" dirty="0">
                 <a:solidFill>
                   <a:srgbClr val="3399FF"/>
                 </a:solidFill>

</xml_diff>

<commit_message>
Deploying to gh-pages from @ Minee-Liane-Choi/MineeChoiLab@50fea896b99959c80cc68ac51e9e13e0ed89bef4 🚀
</commit_message>
<xml_diff>
--- a/images/BRePAIR.pptx
+++ b/images/BRePAIR.pptx
@@ -4827,7 +4827,7 @@
             </p:blipFill>
             <p:spPr>
               <a:xfrm>
-                <a:off x="4997691" y="5020454"/>
+                <a:off x="5009308" y="5020457"/>
                 <a:ext cx="290443" cy="253233"/>
               </a:xfrm>
               <a:prstGeom prst="rect">
@@ -5766,10 +5766,10 @@
         </p:nvGrpSpPr>
         <p:grpSpPr>
           <a:xfrm>
-            <a:off x="5769919" y="2708852"/>
-            <a:ext cx="3618200" cy="3538272"/>
-            <a:chOff x="6338541" y="4140358"/>
-            <a:chExt cx="1898179" cy="1856247"/>
+            <a:off x="5780307" y="2708850"/>
+            <a:ext cx="3618200" cy="3594825"/>
+            <a:chOff x="6343991" y="4140358"/>
+            <a:chExt cx="1898179" cy="1885916"/>
           </a:xfrm>
         </p:grpSpPr>
         <p:sp>
@@ -5786,8 +5786,8 @@
           </p:nvSpPr>
           <p:spPr>
             <a:xfrm>
-              <a:off x="6338541" y="5746333"/>
-              <a:ext cx="1898179" cy="250272"/>
+              <a:off x="6343991" y="5751783"/>
+              <a:ext cx="1898179" cy="274491"/>
             </a:xfrm>
             <a:prstGeom prst="rect">
               <a:avLst/>
@@ -5801,7 +5801,7 @@
             <a:p>
               <a:pPr algn="ctr"/>
               <a:r>
-                <a:rPr lang="en-US" sz="2500" b="1" dirty="0">
+                <a:rPr lang="en-US" sz="2800" b="1" dirty="0">
                   <a:solidFill>
                     <a:srgbClr val="FF3399"/>
                   </a:solidFill>
@@ -5810,7 +5810,7 @@
                 <a:t>BR</a:t>
               </a:r>
               <a:r>
-                <a:rPr lang="en-US" sz="2500" b="1" i="1" dirty="0">
+                <a:rPr lang="en-US" sz="2800" b="1" i="1" dirty="0">
                   <a:solidFill>
                     <a:schemeClr val="bg1"/>
                   </a:solidFill>
@@ -5822,7 +5822,7 @@
                 <a:t>A</a:t>
               </a:r>
               <a:r>
-                <a:rPr lang="en-US" sz="2500" b="1" dirty="0">
+                <a:rPr lang="en-US" sz="2800" b="1" dirty="0">
                   <a:solidFill>
                     <a:schemeClr val="bg1"/>
                   </a:solidFill>
@@ -5834,7 +5834,7 @@
                 <a:t>I</a:t>
               </a:r>
               <a:r>
-                <a:rPr lang="en-US" sz="2500" b="1" dirty="0">
+                <a:rPr lang="en-US" sz="2800" b="1" dirty="0">
                   <a:solidFill>
                     <a:srgbClr val="FF3399"/>
                   </a:solidFill>
@@ -5843,7 +5843,7 @@
                 <a:t>N</a:t>
               </a:r>
               <a:r>
-                <a:rPr lang="en-US" sz="2500" b="1" dirty="0">
+                <a:rPr lang="en-US" sz="2800" b="1" dirty="0">
                   <a:solidFill>
                     <a:srgbClr val="000000"/>
                   </a:solidFill>
@@ -5852,7 +5852,7 @@
                 <a:t> </a:t>
               </a:r>
               <a:r>
-                <a:rPr lang="en-US" sz="2500" b="1" i="1" dirty="0" err="1">
+                <a:rPr lang="en-US" sz="2800" b="1" i="1" dirty="0" err="1">
                   <a:solidFill>
                     <a:srgbClr val="3399FF"/>
                   </a:solidFill>
@@ -5861,7 +5861,7 @@
                 <a:t>Re</a:t>
               </a:r>
               <a:r>
-                <a:rPr lang="en-US" sz="2500" b="1" dirty="0" err="1">
+                <a:rPr lang="en-US" sz="2800" b="1" dirty="0" err="1">
                   <a:solidFill>
                     <a:srgbClr val="3399FF"/>
                   </a:solidFill>
@@ -5870,7 +5870,7 @@
                 <a:t>P</a:t>
               </a:r>
               <a:r>
-                <a:rPr lang="en-US" sz="2500" b="1" i="1" dirty="0" err="1">
+                <a:rPr lang="en-US" sz="2800" b="1" i="1" dirty="0" err="1">
                   <a:solidFill>
                     <a:schemeClr val="bg1"/>
                   </a:solidFill>
@@ -5882,7 +5882,7 @@
                 <a:t>A</a:t>
               </a:r>
               <a:r>
-                <a:rPr lang="en-US" sz="2500" b="1" dirty="0" err="1">
+                <a:rPr lang="en-US" sz="2800" b="1" dirty="0" err="1">
                   <a:solidFill>
                     <a:schemeClr val="bg1"/>
                   </a:solidFill>
@@ -5894,7 +5894,7 @@
                 <a:t>I</a:t>
               </a:r>
               <a:r>
-                <a:rPr lang="en-US" sz="2500" b="1" dirty="0" err="1">
+                <a:rPr lang="en-US" sz="2800" b="1" dirty="0" err="1">
                   <a:solidFill>
                     <a:srgbClr val="3399FF"/>
                   </a:solidFill>
@@ -5902,7 +5902,7 @@
                 </a:rPr>
                 <a:t>R</a:t>
               </a:r>
-              <a:endParaRPr lang="en-US" sz="2500" dirty="0">
+              <a:endParaRPr lang="en-US" sz="2800" dirty="0">
                 <a:solidFill>
                   <a:srgbClr val="3399FF"/>
                 </a:solidFill>
@@ -6233,7 +6233,7 @@
               </p:blipFill>
               <p:spPr>
                 <a:xfrm>
-                  <a:off x="4997691" y="5020454"/>
+                  <a:off x="5008332" y="5020456"/>
                   <a:ext cx="290443" cy="253233"/>
                 </a:xfrm>
                 <a:prstGeom prst="rect">

</xml_diff>